<commit_message>
additional EBS information - untested but noted.
</commit_message>
<xml_diff>
--- a/aws-ec2/aws-ec2.pptx
+++ b/aws-ec2/aws-ec2.pptx
@@ -5,7 +5,7 @@
     <p:sldMasterId id="2147483677" r:id="rId1"/>
   </p:sldMasterIdLst>
   <p:notesMasterIdLst>
-    <p:notesMasterId r:id="rId29"/>
+    <p:notesMasterId r:id="rId33"/>
   </p:notesMasterIdLst>
   <p:sldIdLst>
     <p:sldId id="256" r:id="rId2"/>
@@ -32,9 +32,13 @@
     <p:sldId id="290" r:id="rId23"/>
     <p:sldId id="305" r:id="rId24"/>
     <p:sldId id="306" r:id="rId25"/>
-    <p:sldId id="291" r:id="rId26"/>
-    <p:sldId id="304" r:id="rId27"/>
-    <p:sldId id="292" r:id="rId28"/>
+    <p:sldId id="311" r:id="rId26"/>
+    <p:sldId id="291" r:id="rId27"/>
+    <p:sldId id="312" r:id="rId28"/>
+    <p:sldId id="308" r:id="rId29"/>
+    <p:sldId id="309" r:id="rId30"/>
+    <p:sldId id="310" r:id="rId31"/>
+    <p:sldId id="292" r:id="rId32"/>
   </p:sldIdLst>
   <p:sldSz cx="9144000" cy="6858000" type="screen4x3"/>
   <p:notesSz cx="6858000" cy="9144000"/>
@@ -218,7 +222,7 @@
           <a:p>
             <a:fld id="{1B6676A5-1300-B945-98B1-DD92DDC3A3CB}" type="datetimeFigureOut">
               <a:rPr lang="en-US" smtClean="0"/>
-              <a:t>4/20/15</a:t>
+              <a:t>4/22/15</a:t>
             </a:fld>
             <a:endParaRPr lang="en-US"/>
           </a:p>
@@ -1790,7 +1794,80 @@
           <a:bodyPr/>
           <a:lstStyle/>
           <a:p>
-            <a:endParaRPr lang="en-US" dirty="0"/>
+            <a:pPr marL="171450" marR="0" indent="-171450" algn="l" defTabSz="457200" rtl="0" eaLnBrk="1" fontAlgn="auto" latinLnBrk="0" hangingPunct="1">
+              <a:lnSpc>
+                <a:spcPct val="100000"/>
+              </a:lnSpc>
+              <a:spcBef>
+                <a:spcPts val="0"/>
+              </a:spcBef>
+              <a:spcAft>
+                <a:spcPts val="0"/>
+              </a:spcAft>
+              <a:buClrTx/>
+              <a:buSzTx/>
+              <a:buFont typeface="Arial"/>
+              <a:buChar char="•"/>
+              <a:tabLst/>
+              <a:defRPr/>
+            </a:pPr>
+            <a:r>
+              <a:rPr lang="en-US" dirty="0" smtClean="0"/>
+              <a:t>Don’t use RAID</a:t>
+            </a:r>
+            <a:r>
+              <a:rPr lang="en-US" baseline="0" dirty="0" smtClean="0"/>
+              <a:t>-1 - from SDD416 Presentation at </a:t>
+            </a:r>
+            <a:r>
+              <a:rPr lang="en-US" baseline="0" dirty="0" err="1" smtClean="0"/>
+              <a:t>re:Invent</a:t>
+            </a:r>
+            <a:r>
+              <a:rPr lang="en-US" baseline="0" dirty="0" smtClean="0"/>
+              <a:t> 2014, 36 minutes</a:t>
+            </a:r>
+            <a:endParaRPr lang="en-US" dirty="0" smtClean="0"/>
+          </a:p>
+          <a:p>
+            <a:pPr marL="171450" marR="0" indent="-171450" algn="l" defTabSz="457200" rtl="0" eaLnBrk="1" fontAlgn="auto" latinLnBrk="0" hangingPunct="1">
+              <a:lnSpc>
+                <a:spcPct val="100000"/>
+              </a:lnSpc>
+              <a:spcBef>
+                <a:spcPts val="0"/>
+              </a:spcBef>
+              <a:spcAft>
+                <a:spcPts val="0"/>
+              </a:spcAft>
+              <a:buClrTx/>
+              <a:buSzTx/>
+              <a:buFont typeface="Arial"/>
+              <a:buChar char="•"/>
+              <a:tabLst/>
+              <a:defRPr/>
+            </a:pPr>
+            <a:r>
+              <a:rPr lang="en-US" dirty="0" smtClean="0"/>
+              <a:t>99.9995% Available</a:t>
+            </a:r>
+            <a:r>
+              <a:rPr lang="en-US" baseline="0" dirty="0"/>
+              <a:t> </a:t>
+            </a:r>
+            <a:r>
+              <a:rPr lang="en-US" baseline="0" dirty="0" smtClean="0"/>
+              <a:t>over an unknown period – from SDD416 Presentation at </a:t>
+            </a:r>
+            <a:r>
+              <a:rPr lang="en-US" baseline="0" dirty="0" err="1" smtClean="0"/>
+              <a:t>re:Invent</a:t>
+            </a:r>
+            <a:r>
+              <a:rPr lang="en-US" baseline="0" dirty="0" smtClean="0"/>
+              <a:t> 2014</a:t>
+            </a:r>
+            <a:endParaRPr lang="en-US" dirty="0" smtClean="0"/>
           </a:p>
         </p:txBody>
       </p:sp>
@@ -1958,34 +2035,6 @@
           <a:bodyPr/>
           <a:lstStyle/>
           <a:p>
-            <a:r>
-              <a:rPr lang="en-US" dirty="0" smtClean="0"/>
-              <a:t>Provisioned IOPS RAID</a:t>
-            </a:r>
-            <a:r>
-              <a:rPr lang="en-US" baseline="0" dirty="0" smtClean="0"/>
-              <a:t> numbers: </a:t>
-            </a:r>
-            <a:r>
-              <a:rPr lang="en-US" dirty="0" smtClean="0"/>
-              <a:t>http://</a:t>
-            </a:r>
-            <a:r>
-              <a:rPr lang="en-US" dirty="0" err="1" smtClean="0"/>
-              <a:t>aws.amazon.com</a:t>
-            </a:r>
-            <a:r>
-              <a:rPr lang="en-US" dirty="0" smtClean="0"/>
-              <a:t>/</a:t>
-            </a:r>
-            <a:r>
-              <a:rPr lang="en-US" dirty="0" err="1" smtClean="0"/>
-              <a:t>ebs</a:t>
-            </a:r>
-            <a:r>
-              <a:rPr lang="en-US" dirty="0" smtClean="0"/>
-              <a:t>/details/</a:t>
-            </a:r>
             <a:endParaRPr lang="en-US" dirty="0"/>
           </a:p>
         </p:txBody>
@@ -2070,6 +2119,34 @@
           <a:bodyPr/>
           <a:lstStyle/>
           <a:p>
+            <a:r>
+              <a:rPr lang="en-US" dirty="0" smtClean="0"/>
+              <a:t>Provisioned IOPS RAID</a:t>
+            </a:r>
+            <a:r>
+              <a:rPr lang="en-US" baseline="0" dirty="0" smtClean="0"/>
+              <a:t> numbers: </a:t>
+            </a:r>
+            <a:r>
+              <a:rPr lang="en-US" dirty="0" smtClean="0"/>
+              <a:t>http://</a:t>
+            </a:r>
+            <a:r>
+              <a:rPr lang="en-US" dirty="0" err="1" smtClean="0"/>
+              <a:t>aws.amazon.com</a:t>
+            </a:r>
+            <a:r>
+              <a:rPr lang="en-US" dirty="0" smtClean="0"/>
+              <a:t>/</a:t>
+            </a:r>
+            <a:r>
+              <a:rPr lang="en-US" dirty="0" err="1" smtClean="0"/>
+              <a:t>ebs</a:t>
+            </a:r>
+            <a:r>
+              <a:rPr lang="en-US" dirty="0" smtClean="0"/>
+              <a:t>/details/</a:t>
+            </a:r>
             <a:endParaRPr lang="en-US" dirty="0"/>
           </a:p>
         </p:txBody>
@@ -2154,49 +2231,67 @@
           <a:bodyPr/>
           <a:lstStyle/>
           <a:p>
-            <a:r>
-              <a:rPr lang="en-US" dirty="0" smtClean="0"/>
+            <a:pPr marL="0" marR="0" indent="0" algn="l" defTabSz="457200" rtl="0" eaLnBrk="1" fontAlgn="auto" latinLnBrk="0" hangingPunct="1">
+              <a:lnSpc>
+                <a:spcPct val="100000"/>
+              </a:lnSpc>
+              <a:spcBef>
+                <a:spcPts val="0"/>
+              </a:spcBef>
+              <a:spcAft>
+                <a:spcPts val="0"/>
+              </a:spcAft>
+              <a:buClrTx/>
+              <a:buSzTx/>
+              <a:buFont typeface="Arial"/>
+              <a:buNone/>
+              <a:tabLst/>
+              <a:defRPr/>
+            </a:pPr>
+            <a:r>
+              <a:rPr lang="en-US" baseline="0" dirty="0" smtClean="0"/>
               <a:t>Reference:</a:t>
             </a:r>
           </a:p>
           <a:p>
-            <a:pPr marL="171450" indent="-171450">
+            <a:pPr marL="171450" marR="0" indent="-171450" algn="l" defTabSz="457200" rtl="0" eaLnBrk="1" fontAlgn="auto" latinLnBrk="0" hangingPunct="1">
+              <a:lnSpc>
+                <a:spcPct val="100000"/>
+              </a:lnSpc>
+              <a:spcBef>
+                <a:spcPts val="0"/>
+              </a:spcBef>
+              <a:spcAft>
+                <a:spcPts val="0"/>
+              </a:spcAft>
+              <a:buClrTx/>
+              <a:buSzTx/>
               <a:buFont typeface="Arial"/>
               <a:buChar char="•"/>
+              <a:tabLst/>
+              <a:defRPr/>
             </a:pPr>
             <a:r>
-              <a:rPr lang="en-US" dirty="0" smtClean="0"/>
-              <a:t>http://</a:t>
-            </a:r>
-            <a:r>
-              <a:rPr lang="en-US" dirty="0" err="1" smtClean="0"/>
-              <a:t>docs.aws.amazon.com</a:t>
-            </a:r>
-            <a:r>
-              <a:rPr lang="en-US" dirty="0" smtClean="0"/>
-              <a:t>/AWSEC2/latest/</a:t>
-            </a:r>
-            <a:r>
-              <a:rPr lang="en-US" dirty="0" err="1" smtClean="0"/>
-              <a:t>UserGuide</a:t>
-            </a:r>
-            <a:r>
-              <a:rPr lang="en-US" dirty="0" smtClean="0"/>
-              <a:t>/</a:t>
-            </a:r>
-            <a:r>
-              <a:rPr lang="en-US" dirty="0" err="1" smtClean="0"/>
-              <a:t>ebs</a:t>
-            </a:r>
-            <a:r>
-              <a:rPr lang="en-US" dirty="0" smtClean="0"/>
-              <a:t>-using-</a:t>
-            </a:r>
-            <a:r>
-              <a:rPr lang="en-US" dirty="0" err="1" smtClean="0"/>
-              <a:t>volumes.html</a:t>
-            </a:r>
-            <a:endParaRPr lang="en-US" dirty="0"/>
+              <a:rPr lang="en-US" baseline="0" dirty="0" smtClean="0"/>
+              <a:t>SDD416, Douglass </a:t>
+            </a:r>
+            <a:r>
+              <a:rPr lang="en-US" baseline="0" dirty="0" err="1" smtClean="0"/>
+              <a:t>Balentyne</a:t>
+            </a:r>
+            <a:r>
+              <a:rPr lang="en-US" baseline="0" dirty="0" smtClean="0"/>
+              <a:t>, </a:t>
+            </a:r>
+            <a:r>
+              <a:rPr lang="en-US" baseline="0" dirty="0" err="1" smtClean="0"/>
+              <a:t>reInvent</a:t>
+            </a:r>
+            <a:r>
+              <a:rPr lang="en-US" baseline="0" dirty="0" smtClean="0"/>
+              <a:t> 2014</a:t>
+            </a:r>
+            <a:endParaRPr lang="en-US" baseline="0" dirty="0" smtClean="0"/>
           </a:p>
         </p:txBody>
       </p:sp>
@@ -2218,6 +2313,678 @@
             <a:fld id="{BFB43062-714D-1146-A97F-0D45BD9E7BF0}" type="slidenum">
               <a:rPr lang="en-US" smtClean="0"/>
               <a:t>27</a:t>
+            </a:fld>
+            <a:endParaRPr lang="en-US"/>
+          </a:p>
+        </p:txBody>
+      </p:sp>
+    </p:spTree>
+    <p:extLst>
+      <p:ext uri="{BB962C8B-B14F-4D97-AF65-F5344CB8AC3E}">
+        <p14:creationId xmlns:p14="http://schemas.microsoft.com/office/powerpoint/2010/main" val="494559740"/>
+      </p:ext>
+    </p:extLst>
+  </p:cSld>
+  <p:clrMapOvr>
+    <a:masterClrMapping/>
+  </p:clrMapOvr>
+</p:notes>
+</file>
+
+<file path=ppt/notesSlides/notesSlide26.xml><?xml version="1.0" encoding="utf-8"?>
+<p:notes xmlns:a="http://schemas.openxmlformats.org/drawingml/2006/main" xmlns:r="http://schemas.openxmlformats.org/officeDocument/2006/relationships" xmlns:p="http://schemas.openxmlformats.org/presentationml/2006/main">
+  <p:cSld>
+    <p:spTree>
+      <p:nvGrpSpPr>
+        <p:cNvPr id="1" name=""/>
+        <p:cNvGrpSpPr/>
+        <p:nvPr/>
+      </p:nvGrpSpPr>
+      <p:grpSpPr>
+        <a:xfrm>
+          <a:off x="0" y="0"/>
+          <a:ext cx="0" cy="0"/>
+          <a:chOff x="0" y="0"/>
+          <a:chExt cx="0" cy="0"/>
+        </a:xfrm>
+      </p:grpSpPr>
+      <p:sp>
+        <p:nvSpPr>
+          <p:cNvPr id="2" name="Slide Image Placeholder 1"/>
+          <p:cNvSpPr>
+            <a:spLocks noGrp="1" noRot="1" noChangeAspect="1"/>
+          </p:cNvSpPr>
+          <p:nvPr>
+            <p:ph type="sldImg"/>
+          </p:nvPr>
+        </p:nvSpPr>
+        <p:spPr/>
+      </p:sp>
+      <p:sp>
+        <p:nvSpPr>
+          <p:cNvPr id="3" name="Notes Placeholder 2"/>
+          <p:cNvSpPr>
+            <a:spLocks noGrp="1"/>
+          </p:cNvSpPr>
+          <p:nvPr>
+            <p:ph type="body" idx="1"/>
+          </p:nvPr>
+        </p:nvSpPr>
+        <p:spPr/>
+        <p:txBody>
+          <a:bodyPr/>
+          <a:lstStyle/>
+          <a:p>
+            <a:pPr marL="171450" marR="0" indent="-171450" algn="l" defTabSz="457200" rtl="0" eaLnBrk="1" fontAlgn="auto" latinLnBrk="0" hangingPunct="1">
+              <a:lnSpc>
+                <a:spcPct val="100000"/>
+              </a:lnSpc>
+              <a:spcBef>
+                <a:spcPts val="0"/>
+              </a:spcBef>
+              <a:spcAft>
+                <a:spcPts val="0"/>
+              </a:spcAft>
+              <a:buClrTx/>
+              <a:buSzTx/>
+              <a:buFont typeface="Arial"/>
+              <a:buChar char="•"/>
+              <a:tabLst/>
+              <a:defRPr/>
+            </a:pPr>
+            <a:r>
+              <a:rPr lang="en-US" dirty="0" smtClean="0"/>
+              <a:t>Throughput</a:t>
+            </a:r>
+            <a:r>
+              <a:rPr lang="en-US" baseline="0" dirty="0" smtClean="0"/>
+              <a:t>: </a:t>
+            </a:r>
+            <a:r>
+              <a:rPr lang="en-US" dirty="0" smtClean="0"/>
+              <a:t>128 MB/s (</a:t>
+            </a:r>
+            <a:r>
+              <a:rPr lang="en-US" baseline="0" dirty="0" smtClean="0"/>
+              <a:t>SDD416, Douglass </a:t>
+            </a:r>
+            <a:r>
+              <a:rPr lang="en-US" baseline="0" dirty="0" err="1" smtClean="0"/>
+              <a:t>Balentyne</a:t>
+            </a:r>
+            <a:r>
+              <a:rPr lang="en-US" baseline="0" dirty="0" smtClean="0"/>
+              <a:t>, </a:t>
+            </a:r>
+            <a:r>
+              <a:rPr lang="en-US" baseline="0" dirty="0" err="1" smtClean="0"/>
+              <a:t>reInvent</a:t>
+            </a:r>
+            <a:r>
+              <a:rPr lang="en-US" baseline="0" dirty="0" smtClean="0"/>
+              <a:t> 2014) / 160 MB/s http://</a:t>
+            </a:r>
+            <a:r>
+              <a:rPr lang="en-US" baseline="0" dirty="0" err="1" smtClean="0"/>
+              <a:t>aws.amazon.com</a:t>
+            </a:r>
+            <a:r>
+              <a:rPr lang="en-US" baseline="0" dirty="0" smtClean="0"/>
+              <a:t>/</a:t>
+            </a:r>
+            <a:r>
+              <a:rPr lang="en-US" baseline="0" dirty="0" err="1" smtClean="0"/>
+              <a:t>ebs</a:t>
+            </a:r>
+            <a:r>
+              <a:rPr lang="en-US" baseline="0" dirty="0" smtClean="0"/>
+              <a:t>/details/</a:t>
+            </a:r>
+            <a:endParaRPr lang="en-US" dirty="0" smtClean="0"/>
+          </a:p>
+          <a:p>
+            <a:pPr marL="171450" indent="-171450">
+              <a:buFont typeface="Arial"/>
+              <a:buChar char="•"/>
+            </a:pPr>
+            <a:r>
+              <a:rPr lang="en-US" dirty="0" smtClean="0"/>
+              <a:t>“Larger volumes</a:t>
+            </a:r>
+            <a:r>
+              <a:rPr lang="en-US" baseline="0" dirty="0" smtClean="0"/>
+              <a:t> can burst longer” – desire clarity from Amazon on if this means EBS accumulates IOPS credits more quickly or if the “burst” – SDD416, Douglass </a:t>
+            </a:r>
+            <a:r>
+              <a:rPr lang="en-US" baseline="0" dirty="0" err="1" smtClean="0"/>
+              <a:t>Balentyne</a:t>
+            </a:r>
+            <a:r>
+              <a:rPr lang="en-US" baseline="0" dirty="0" smtClean="0"/>
+              <a:t>, </a:t>
+            </a:r>
+            <a:r>
+              <a:rPr lang="en-US" baseline="0" dirty="0" err="1" smtClean="0"/>
+              <a:t>reInvent</a:t>
+            </a:r>
+            <a:r>
+              <a:rPr lang="en-US" baseline="0" dirty="0" smtClean="0"/>
+              <a:t> 2014</a:t>
+            </a:r>
+          </a:p>
+          <a:p>
+            <a:pPr marL="171450" marR="0" indent="-171450" algn="l" defTabSz="457200" rtl="0" eaLnBrk="1" fontAlgn="auto" latinLnBrk="0" hangingPunct="1">
+              <a:lnSpc>
+                <a:spcPct val="100000"/>
+              </a:lnSpc>
+              <a:spcBef>
+                <a:spcPts val="0"/>
+              </a:spcBef>
+              <a:spcAft>
+                <a:spcPts val="0"/>
+              </a:spcAft>
+              <a:buClrTx/>
+              <a:buSzTx/>
+              <a:buFont typeface="Arial"/>
+              <a:buChar char="•"/>
+              <a:tabLst/>
+              <a:defRPr/>
+            </a:pPr>
+            <a:r>
+              <a:rPr lang="en-US" baseline="0" dirty="0" smtClean="0"/>
+              <a:t>99.7% of all EBS volumes on Amazon have “Burst Credit” left – meaning 0.3% of all volumes have exhausted credits. – SDD416, Douglass </a:t>
+            </a:r>
+            <a:r>
+              <a:rPr lang="en-US" baseline="0" dirty="0" err="1" smtClean="0"/>
+              <a:t>Balentyne</a:t>
+            </a:r>
+            <a:r>
+              <a:rPr lang="en-US" baseline="0" dirty="0" smtClean="0"/>
+              <a:t>, </a:t>
+            </a:r>
+            <a:r>
+              <a:rPr lang="en-US" baseline="0" dirty="0" err="1" smtClean="0"/>
+              <a:t>reInvent</a:t>
+            </a:r>
+            <a:r>
+              <a:rPr lang="en-US" baseline="0" dirty="0" smtClean="0"/>
+              <a:t> 2014</a:t>
+            </a:r>
+          </a:p>
+          <a:p>
+            <a:pPr marL="171450" indent="-171450">
+              <a:buFont typeface="Arial"/>
+              <a:buChar char="•"/>
+            </a:pPr>
+            <a:endParaRPr lang="en-US" dirty="0"/>
+          </a:p>
+        </p:txBody>
+      </p:sp>
+      <p:sp>
+        <p:nvSpPr>
+          <p:cNvPr id="4" name="Slide Number Placeholder 3"/>
+          <p:cNvSpPr>
+            <a:spLocks noGrp="1"/>
+          </p:cNvSpPr>
+          <p:nvPr>
+            <p:ph type="sldNum" sz="quarter" idx="10"/>
+          </p:nvPr>
+        </p:nvSpPr>
+        <p:spPr/>
+        <p:txBody>
+          <a:bodyPr/>
+          <a:lstStyle/>
+          <a:p>
+            <a:fld id="{BFB43062-714D-1146-A97F-0D45BD9E7BF0}" type="slidenum">
+              <a:rPr lang="en-US" smtClean="0"/>
+              <a:t>28</a:t>
+            </a:fld>
+            <a:endParaRPr lang="en-US"/>
+          </a:p>
+        </p:txBody>
+      </p:sp>
+    </p:spTree>
+    <p:extLst>
+      <p:ext uri="{BB962C8B-B14F-4D97-AF65-F5344CB8AC3E}">
+        <p14:creationId xmlns:p14="http://schemas.microsoft.com/office/powerpoint/2010/main" val="494559740"/>
+      </p:ext>
+    </p:extLst>
+  </p:cSld>
+  <p:clrMapOvr>
+    <a:masterClrMapping/>
+  </p:clrMapOvr>
+</p:notes>
+</file>
+
+<file path=ppt/notesSlides/notesSlide27.xml><?xml version="1.0" encoding="utf-8"?>
+<p:notes xmlns:a="http://schemas.openxmlformats.org/drawingml/2006/main" xmlns:r="http://schemas.openxmlformats.org/officeDocument/2006/relationships" xmlns:p="http://schemas.openxmlformats.org/presentationml/2006/main">
+  <p:cSld>
+    <p:spTree>
+      <p:nvGrpSpPr>
+        <p:cNvPr id="1" name=""/>
+        <p:cNvGrpSpPr/>
+        <p:nvPr/>
+      </p:nvGrpSpPr>
+      <p:grpSpPr>
+        <a:xfrm>
+          <a:off x="0" y="0"/>
+          <a:ext cx="0" cy="0"/>
+          <a:chOff x="0" y="0"/>
+          <a:chExt cx="0" cy="0"/>
+        </a:xfrm>
+      </p:grpSpPr>
+      <p:sp>
+        <p:nvSpPr>
+          <p:cNvPr id="2" name="Slide Image Placeholder 1"/>
+          <p:cNvSpPr>
+            <a:spLocks noGrp="1" noRot="1" noChangeAspect="1"/>
+          </p:cNvSpPr>
+          <p:nvPr>
+            <p:ph type="sldImg"/>
+          </p:nvPr>
+        </p:nvSpPr>
+        <p:spPr/>
+      </p:sp>
+      <p:sp>
+        <p:nvSpPr>
+          <p:cNvPr id="3" name="Notes Placeholder 2"/>
+          <p:cNvSpPr>
+            <a:spLocks noGrp="1"/>
+          </p:cNvSpPr>
+          <p:nvPr>
+            <p:ph type="body" idx="1"/>
+          </p:nvPr>
+        </p:nvSpPr>
+        <p:spPr/>
+        <p:txBody>
+          <a:bodyPr/>
+          <a:lstStyle/>
+          <a:p>
+            <a:pPr marL="0" indent="0">
+              <a:buFont typeface="Arial"/>
+              <a:buNone/>
+            </a:pPr>
+            <a:r>
+              <a:rPr lang="en-US" dirty="0" smtClean="0"/>
+              <a:t>Reference:</a:t>
+            </a:r>
+          </a:p>
+          <a:p>
+            <a:pPr marL="171450" marR="0" indent="-171450" algn="l" defTabSz="457200" rtl="0" eaLnBrk="1" fontAlgn="auto" latinLnBrk="0" hangingPunct="1">
+              <a:lnSpc>
+                <a:spcPct val="100000"/>
+              </a:lnSpc>
+              <a:spcBef>
+                <a:spcPts val="0"/>
+              </a:spcBef>
+              <a:spcAft>
+                <a:spcPts val="0"/>
+              </a:spcAft>
+              <a:buClrTx/>
+              <a:buSzTx/>
+              <a:buFont typeface="Arial"/>
+              <a:buChar char="•"/>
+              <a:tabLst/>
+              <a:defRPr/>
+            </a:pPr>
+            <a:r>
+              <a:rPr lang="en-US" dirty="0" smtClean="0"/>
+              <a:t>Throughput:</a:t>
+            </a:r>
+            <a:r>
+              <a:rPr lang="en-US" baseline="0" dirty="0" smtClean="0"/>
+              <a:t> </a:t>
+            </a:r>
+            <a:r>
+              <a:rPr lang="en-US" dirty="0" smtClean="0"/>
+              <a:t>320 MB/s http://</a:t>
+            </a:r>
+            <a:r>
+              <a:rPr lang="en-US" dirty="0" err="1" smtClean="0"/>
+              <a:t>aws.amazon.com</a:t>
+            </a:r>
+            <a:r>
+              <a:rPr lang="en-US" dirty="0" smtClean="0"/>
+              <a:t>/</a:t>
+            </a:r>
+            <a:r>
+              <a:rPr lang="en-US" dirty="0" err="1" smtClean="0"/>
+              <a:t>ebs</a:t>
+            </a:r>
+            <a:r>
+              <a:rPr lang="en-US" dirty="0" smtClean="0"/>
+              <a:t>/details/</a:t>
+            </a:r>
+          </a:p>
+          <a:p>
+            <a:pPr marL="171450" marR="0" indent="-171450" algn="l" defTabSz="457200" rtl="0" eaLnBrk="1" fontAlgn="auto" latinLnBrk="0" hangingPunct="1">
+              <a:lnSpc>
+                <a:spcPct val="100000"/>
+              </a:lnSpc>
+              <a:spcBef>
+                <a:spcPts val="0"/>
+              </a:spcBef>
+              <a:spcAft>
+                <a:spcPts val="0"/>
+              </a:spcAft>
+              <a:buClrTx/>
+              <a:buSzTx/>
+              <a:buFont typeface="Arial"/>
+              <a:buChar char="•"/>
+              <a:tabLst/>
+              <a:defRPr/>
+            </a:pPr>
+            <a:r>
+              <a:rPr lang="en-US" baseline="0" dirty="0" smtClean="0"/>
+              <a:t>Metrics are from SDD416, Douglass </a:t>
+            </a:r>
+            <a:r>
+              <a:rPr lang="en-US" baseline="0" dirty="0" err="1" smtClean="0"/>
+              <a:t>Balentyne</a:t>
+            </a:r>
+            <a:r>
+              <a:rPr lang="en-US" baseline="0" dirty="0" smtClean="0"/>
+              <a:t>, </a:t>
+            </a:r>
+            <a:r>
+              <a:rPr lang="en-US" baseline="0" dirty="0" err="1" smtClean="0"/>
+              <a:t>reInvent</a:t>
+            </a:r>
+            <a:r>
+              <a:rPr lang="en-US" baseline="0" dirty="0" smtClean="0"/>
+              <a:t> 2014</a:t>
+            </a:r>
+          </a:p>
+          <a:p>
+            <a:pPr marL="171450" indent="-171450">
+              <a:buFont typeface="Arial"/>
+              <a:buChar char="•"/>
+            </a:pPr>
+            <a:endParaRPr lang="en-US" dirty="0"/>
+          </a:p>
+        </p:txBody>
+      </p:sp>
+      <p:sp>
+        <p:nvSpPr>
+          <p:cNvPr id="4" name="Slide Number Placeholder 3"/>
+          <p:cNvSpPr>
+            <a:spLocks noGrp="1"/>
+          </p:cNvSpPr>
+          <p:nvPr>
+            <p:ph type="sldNum" sz="quarter" idx="10"/>
+          </p:nvPr>
+        </p:nvSpPr>
+        <p:spPr/>
+        <p:txBody>
+          <a:bodyPr/>
+          <a:lstStyle/>
+          <a:p>
+            <a:fld id="{BFB43062-714D-1146-A97F-0D45BD9E7BF0}" type="slidenum">
+              <a:rPr lang="en-US" smtClean="0"/>
+              <a:t>29</a:t>
+            </a:fld>
+            <a:endParaRPr lang="en-US"/>
+          </a:p>
+        </p:txBody>
+      </p:sp>
+    </p:spTree>
+    <p:extLst>
+      <p:ext uri="{BB962C8B-B14F-4D97-AF65-F5344CB8AC3E}">
+        <p14:creationId xmlns:p14="http://schemas.microsoft.com/office/powerpoint/2010/main" val="494559740"/>
+      </p:ext>
+    </p:extLst>
+  </p:cSld>
+  <p:clrMapOvr>
+    <a:masterClrMapping/>
+  </p:clrMapOvr>
+</p:notes>
+</file>
+
+<file path=ppt/notesSlides/notesSlide28.xml><?xml version="1.0" encoding="utf-8"?>
+<p:notes xmlns:a="http://schemas.openxmlformats.org/drawingml/2006/main" xmlns:r="http://schemas.openxmlformats.org/officeDocument/2006/relationships" xmlns:p="http://schemas.openxmlformats.org/presentationml/2006/main">
+  <p:cSld>
+    <p:spTree>
+      <p:nvGrpSpPr>
+        <p:cNvPr id="1" name=""/>
+        <p:cNvGrpSpPr/>
+        <p:nvPr/>
+      </p:nvGrpSpPr>
+      <p:grpSpPr>
+        <a:xfrm>
+          <a:off x="0" y="0"/>
+          <a:ext cx="0" cy="0"/>
+          <a:chOff x="0" y="0"/>
+          <a:chExt cx="0" cy="0"/>
+        </a:xfrm>
+      </p:grpSpPr>
+      <p:sp>
+        <p:nvSpPr>
+          <p:cNvPr id="2" name="Slide Image Placeholder 1"/>
+          <p:cNvSpPr>
+            <a:spLocks noGrp="1" noRot="1" noChangeAspect="1"/>
+          </p:cNvSpPr>
+          <p:nvPr>
+            <p:ph type="sldImg"/>
+          </p:nvPr>
+        </p:nvSpPr>
+        <p:spPr/>
+      </p:sp>
+      <p:sp>
+        <p:nvSpPr>
+          <p:cNvPr id="3" name="Notes Placeholder 2"/>
+          <p:cNvSpPr>
+            <a:spLocks noGrp="1"/>
+          </p:cNvSpPr>
+          <p:nvPr>
+            <p:ph type="body" idx="1"/>
+          </p:nvPr>
+        </p:nvSpPr>
+        <p:spPr/>
+        <p:txBody>
+          <a:bodyPr/>
+          <a:lstStyle/>
+          <a:p>
+            <a:pPr marL="0" indent="0">
+              <a:buFont typeface="Arial"/>
+              <a:buNone/>
+            </a:pPr>
+            <a:r>
+              <a:rPr lang="en-US" dirty="0" smtClean="0"/>
+              <a:t>Reference:</a:t>
+            </a:r>
+          </a:p>
+          <a:p>
+            <a:pPr marL="171450" marR="0" indent="-171450" algn="l" defTabSz="457200" rtl="0" eaLnBrk="1" fontAlgn="auto" latinLnBrk="0" hangingPunct="1">
+              <a:lnSpc>
+                <a:spcPct val="100000"/>
+              </a:lnSpc>
+              <a:spcBef>
+                <a:spcPts val="0"/>
+              </a:spcBef>
+              <a:spcAft>
+                <a:spcPts val="0"/>
+              </a:spcAft>
+              <a:buClrTx/>
+              <a:buSzTx/>
+              <a:buFont typeface="Arial"/>
+              <a:buChar char="•"/>
+              <a:tabLst/>
+              <a:defRPr/>
+            </a:pPr>
+            <a:r>
+              <a:rPr lang="en-US" baseline="0" dirty="0" smtClean="0"/>
+              <a:t>Metrics are from SDD416, Douglass </a:t>
+            </a:r>
+            <a:r>
+              <a:rPr lang="en-US" baseline="0" dirty="0" err="1" smtClean="0"/>
+              <a:t>Balentyne</a:t>
+            </a:r>
+            <a:r>
+              <a:rPr lang="en-US" baseline="0" dirty="0" smtClean="0"/>
+              <a:t>, </a:t>
+            </a:r>
+            <a:r>
+              <a:rPr lang="en-US" baseline="0" dirty="0" err="1" smtClean="0"/>
+              <a:t>reInvent</a:t>
+            </a:r>
+            <a:r>
+              <a:rPr lang="en-US" baseline="0" dirty="0" smtClean="0"/>
+              <a:t> 2014</a:t>
+            </a:r>
+          </a:p>
+          <a:p>
+            <a:pPr marL="171450" indent="-171450">
+              <a:buFont typeface="Arial"/>
+              <a:buChar char="•"/>
+            </a:pPr>
+            <a:endParaRPr lang="en-US" dirty="0"/>
+          </a:p>
+        </p:txBody>
+      </p:sp>
+      <p:sp>
+        <p:nvSpPr>
+          <p:cNvPr id="4" name="Slide Number Placeholder 3"/>
+          <p:cNvSpPr>
+            <a:spLocks noGrp="1"/>
+          </p:cNvSpPr>
+          <p:nvPr>
+            <p:ph type="sldNum" sz="quarter" idx="10"/>
+          </p:nvPr>
+        </p:nvSpPr>
+        <p:spPr/>
+        <p:txBody>
+          <a:bodyPr/>
+          <a:lstStyle/>
+          <a:p>
+            <a:fld id="{BFB43062-714D-1146-A97F-0D45BD9E7BF0}" type="slidenum">
+              <a:rPr lang="en-US" smtClean="0"/>
+              <a:t>30</a:t>
+            </a:fld>
+            <a:endParaRPr lang="en-US"/>
+          </a:p>
+        </p:txBody>
+      </p:sp>
+    </p:spTree>
+    <p:extLst>
+      <p:ext uri="{BB962C8B-B14F-4D97-AF65-F5344CB8AC3E}">
+        <p14:creationId xmlns:p14="http://schemas.microsoft.com/office/powerpoint/2010/main" val="494559740"/>
+      </p:ext>
+    </p:extLst>
+  </p:cSld>
+  <p:clrMapOvr>
+    <a:masterClrMapping/>
+  </p:clrMapOvr>
+</p:notes>
+</file>
+
+<file path=ppt/notesSlides/notesSlide29.xml><?xml version="1.0" encoding="utf-8"?>
+<p:notes xmlns:a="http://schemas.openxmlformats.org/drawingml/2006/main" xmlns:r="http://schemas.openxmlformats.org/officeDocument/2006/relationships" xmlns:p="http://schemas.openxmlformats.org/presentationml/2006/main">
+  <p:cSld>
+    <p:spTree>
+      <p:nvGrpSpPr>
+        <p:cNvPr id="1" name=""/>
+        <p:cNvGrpSpPr/>
+        <p:nvPr/>
+      </p:nvGrpSpPr>
+      <p:grpSpPr>
+        <a:xfrm>
+          <a:off x="0" y="0"/>
+          <a:ext cx="0" cy="0"/>
+          <a:chOff x="0" y="0"/>
+          <a:chExt cx="0" cy="0"/>
+        </a:xfrm>
+      </p:grpSpPr>
+      <p:sp>
+        <p:nvSpPr>
+          <p:cNvPr id="2" name="Slide Image Placeholder 1"/>
+          <p:cNvSpPr>
+            <a:spLocks noGrp="1" noRot="1" noChangeAspect="1"/>
+          </p:cNvSpPr>
+          <p:nvPr>
+            <p:ph type="sldImg"/>
+          </p:nvPr>
+        </p:nvSpPr>
+        <p:spPr/>
+      </p:sp>
+      <p:sp>
+        <p:nvSpPr>
+          <p:cNvPr id="3" name="Notes Placeholder 2"/>
+          <p:cNvSpPr>
+            <a:spLocks noGrp="1"/>
+          </p:cNvSpPr>
+          <p:nvPr>
+            <p:ph type="body" idx="1"/>
+          </p:nvPr>
+        </p:nvSpPr>
+        <p:spPr/>
+        <p:txBody>
+          <a:bodyPr/>
+          <a:lstStyle/>
+          <a:p>
+            <a:r>
+              <a:rPr lang="en-US" dirty="0" smtClean="0"/>
+              <a:t>Reference:</a:t>
+            </a:r>
+          </a:p>
+          <a:p>
+            <a:pPr marL="171450" indent="-171450">
+              <a:buFont typeface="Arial"/>
+              <a:buChar char="•"/>
+            </a:pPr>
+            <a:r>
+              <a:rPr lang="en-US" dirty="0" smtClean="0"/>
+              <a:t>http://</a:t>
+            </a:r>
+            <a:r>
+              <a:rPr lang="en-US" dirty="0" err="1" smtClean="0"/>
+              <a:t>docs.aws.amazon.com</a:t>
+            </a:r>
+            <a:r>
+              <a:rPr lang="en-US" dirty="0" smtClean="0"/>
+              <a:t>/AWSEC2/latest/</a:t>
+            </a:r>
+            <a:r>
+              <a:rPr lang="en-US" dirty="0" err="1" smtClean="0"/>
+              <a:t>UserGuide</a:t>
+            </a:r>
+            <a:r>
+              <a:rPr lang="en-US" dirty="0" smtClean="0"/>
+              <a:t>/</a:t>
+            </a:r>
+            <a:r>
+              <a:rPr lang="en-US" dirty="0" err="1" smtClean="0"/>
+              <a:t>ebs</a:t>
+            </a:r>
+            <a:r>
+              <a:rPr lang="en-US" dirty="0" smtClean="0"/>
+              <a:t>-using-</a:t>
+            </a:r>
+            <a:r>
+              <a:rPr lang="en-US" dirty="0" err="1" smtClean="0"/>
+              <a:t>volumes.html</a:t>
+            </a:r>
+            <a:endParaRPr lang="en-US" dirty="0"/>
+          </a:p>
+        </p:txBody>
+      </p:sp>
+      <p:sp>
+        <p:nvSpPr>
+          <p:cNvPr id="4" name="Slide Number Placeholder 3"/>
+          <p:cNvSpPr>
+            <a:spLocks noGrp="1"/>
+          </p:cNvSpPr>
+          <p:nvPr>
+            <p:ph type="sldNum" sz="quarter" idx="10"/>
+          </p:nvPr>
+        </p:nvSpPr>
+        <p:spPr/>
+        <p:txBody>
+          <a:bodyPr/>
+          <a:lstStyle/>
+          <a:p>
+            <a:fld id="{BFB43062-714D-1146-A97F-0D45BD9E7BF0}" type="slidenum">
+              <a:rPr lang="en-US" smtClean="0"/>
+              <a:t>31</a:t>
             </a:fld>
             <a:endParaRPr lang="en-US"/>
           </a:p>
@@ -4909,7 +5676,7 @@
           <a:p>
             <a:fld id="{7CE38E4D-051A-41E1-86A4-E56916468FD0}" type="datetimeFigureOut">
               <a:rPr lang="en-US" smtClean="0"/>
-              <a:t>4/20/15</a:t>
+              <a:t>4/22/15</a:t>
             </a:fld>
             <a:endParaRPr lang="en-US"/>
           </a:p>
@@ -5090,7 +5857,7 @@
           <a:p>
             <a:fld id="{7CE38E4D-051A-41E1-86A4-E56916468FD0}" type="datetimeFigureOut">
               <a:rPr lang="en-US" smtClean="0"/>
-              <a:t>4/20/15</a:t>
+              <a:t>4/22/15</a:t>
             </a:fld>
             <a:endParaRPr lang="en-US"/>
           </a:p>
@@ -5241,7 +6008,7 @@
           <a:p>
             <a:fld id="{7CE38E4D-051A-41E1-86A4-E56916468FD0}" type="datetimeFigureOut">
               <a:rPr lang="en-US" smtClean="0"/>
-              <a:t>4/20/15</a:t>
+              <a:t>4/22/15</a:t>
             </a:fld>
             <a:endParaRPr lang="en-US"/>
           </a:p>
@@ -7067,7 +7834,7 @@
           <a:p>
             <a:fld id="{7CE38E4D-051A-41E1-86A4-E56916468FD0}" type="datetimeFigureOut">
               <a:rPr lang="en-US" smtClean="0"/>
-              <a:t>4/20/15</a:t>
+              <a:t>4/22/15</a:t>
             </a:fld>
             <a:endParaRPr lang="en-US"/>
           </a:p>
@@ -8937,7 +9704,7 @@
           <a:p>
             <a:fld id="{7CE38E4D-051A-41E1-86A4-E56916468FD0}" type="datetimeFigureOut">
               <a:rPr lang="en-US" smtClean="0"/>
-              <a:t>4/20/15</a:t>
+              <a:t>4/22/15</a:t>
             </a:fld>
             <a:endParaRPr lang="en-US"/>
           </a:p>
@@ -9050,7 +9817,7 @@
           <a:p>
             <a:fld id="{7CE38E4D-051A-41E1-86A4-E56916468FD0}" type="datetimeFigureOut">
               <a:rPr lang="en-US" smtClean="0"/>
-              <a:t>4/20/15</a:t>
+              <a:t>4/22/15</a:t>
             </a:fld>
             <a:endParaRPr lang="en-US"/>
           </a:p>
@@ -9591,7 +10358,7 @@
           <a:p>
             <a:fld id="{7CE38E4D-051A-41E1-86A4-E56916468FD0}" type="datetimeFigureOut">
               <a:rPr lang="en-US" smtClean="0"/>
-              <a:t>4/20/15</a:t>
+              <a:t>4/22/15</a:t>
             </a:fld>
             <a:endParaRPr lang="en-US"/>
           </a:p>
@@ -9704,7 +10471,7 @@
           <a:p>
             <a:fld id="{7CE38E4D-051A-41E1-86A4-E56916468FD0}" type="datetimeFigureOut">
               <a:rPr lang="en-US" smtClean="0"/>
-              <a:t>4/20/15</a:t>
+              <a:t>4/22/15</a:t>
             </a:fld>
             <a:endParaRPr lang="en-US"/>
           </a:p>
@@ -11415,7 +12182,7 @@
           <a:p>
             <a:fld id="{7CE38E4D-051A-41E1-86A4-E56916468FD0}" type="datetimeFigureOut">
               <a:rPr lang="en-US" smtClean="0"/>
-              <a:t>4/20/15</a:t>
+              <a:t>4/22/15</a:t>
             </a:fld>
             <a:endParaRPr lang="en-US"/>
           </a:p>
@@ -11566,7 +12333,7 @@
           <a:p>
             <a:fld id="{7CE38E4D-051A-41E1-86A4-E56916468FD0}" type="datetimeFigureOut">
               <a:rPr lang="en-US" smtClean="0"/>
-              <a:t>4/20/15</a:t>
+              <a:t>4/22/15</a:t>
             </a:fld>
             <a:endParaRPr lang="en-US"/>
           </a:p>
@@ -15181,7 +15948,7 @@
           <a:p>
             <a:fld id="{7CE38E4D-051A-41E1-86A4-E56916468FD0}" type="datetimeFigureOut">
               <a:rPr lang="en-US" smtClean="0"/>
-              <a:t>4/20/15</a:t>
+              <a:t>4/22/15</a:t>
             </a:fld>
             <a:endParaRPr lang="en-US"/>
           </a:p>
@@ -17040,7 +17807,7 @@
           <a:p>
             <a:fld id="{7CE38E4D-051A-41E1-86A4-E56916468FD0}" type="datetimeFigureOut">
               <a:rPr lang="en-US" smtClean="0"/>
-              <a:t>4/20/15</a:t>
+              <a:t>4/22/15</a:t>
             </a:fld>
             <a:endParaRPr lang="en-US"/>
           </a:p>
@@ -17602,11 +18369,7 @@
             </a:r>
             <a:r>
               <a:rPr lang="en-US" smtClean="0"/>
-              <a:t>Colin </a:t>
-            </a:r>
-            <a:r>
-              <a:rPr lang="en-US" smtClean="0"/>
-              <a:t>Johnson</a:t>
+              <a:t>Colin Johnson</a:t>
             </a:r>
             <a:endParaRPr lang="en-US" dirty="0" smtClean="0"/>
           </a:p>
@@ -19998,13 +20761,44 @@
         <p:spPr/>
         <p:txBody>
           <a:bodyPr>
-            <a:normAutofit/>
+            <a:normAutofit fontScale="92500" lnSpcReduction="10000"/>
           </a:bodyPr>
           <a:lstStyle/>
           <a:p>
             <a:r>
               <a:rPr lang="en-US" dirty="0" smtClean="0"/>
-              <a:t>Provision storage in minutes</a:t>
+              <a:t>Encrypted Volumes if Required</a:t>
+            </a:r>
+          </a:p>
+          <a:p>
+            <a:r>
+              <a:rPr lang="en-US" dirty="0" smtClean="0"/>
+              <a:t>Availability: 99.9995% Available</a:t>
+            </a:r>
+          </a:p>
+          <a:p>
+            <a:pPr lvl="1"/>
+            <a:r>
+              <a:rPr lang="en-US" i="1" dirty="0" smtClean="0"/>
+              <a:t>Don’t use RAID-1 – you don’t know if this will increase the availability of underlying hardware</a:t>
+            </a:r>
+          </a:p>
+          <a:p>
+            <a:pPr lvl="1"/>
+            <a:r>
+              <a:rPr lang="en-US" i="1" dirty="0" smtClean="0"/>
+              <a:t>RAID-1 will ½ network bandwidth as 2x network is used</a:t>
+            </a:r>
+            <a:endParaRPr lang="en-US" i="1" dirty="0" smtClean="0"/>
+          </a:p>
+          <a:p>
+            <a:r>
+              <a:rPr lang="en-US" dirty="0" smtClean="0"/>
+              <a:t>Provision </a:t>
+            </a:r>
+            <a:r>
+              <a:rPr lang="en-US" dirty="0" smtClean="0"/>
+              <a:t>storage in minutes</a:t>
             </a:r>
           </a:p>
           <a:p>
@@ -20023,14 +20817,13 @@
             <a:pPr lvl="1"/>
             <a:r>
               <a:rPr lang="en-US" dirty="0" smtClean="0"/>
-              <a:t>Tag EBS volumes with “Backup=true” then utilize a script to backup all matching EBS volumes</a:t>
-            </a:r>
-          </a:p>
-          <a:p>
-            <a:r>
-              <a:rPr lang="en-US" dirty="0" smtClean="0"/>
-              <a:t>On event of instance failure, attach EBS volume to another node to investigate</a:t>
-            </a:r>
+              <a:t>Tag EBS volumes with “Backup=true” then utilize a script to backup all matching EBS </a:t>
+            </a:r>
+            <a:r>
+              <a:rPr lang="en-US" dirty="0" smtClean="0"/>
+              <a:t>volumes</a:t>
+            </a:r>
+            <a:endParaRPr lang="en-US" dirty="0" smtClean="0"/>
           </a:p>
         </p:txBody>
       </p:sp>
@@ -20219,7 +21012,7 @@
         <p:spPr/>
         <p:txBody>
           <a:bodyPr>
-            <a:normAutofit fontScale="85000" lnSpcReduction="20000"/>
+            <a:normAutofit/>
           </a:bodyPr>
           <a:lstStyle/>
           <a:p>
@@ -20228,87 +21021,51 @@
             </a:pPr>
             <a:r>
               <a:rPr lang="en-US" dirty="0" smtClean="0"/>
-              <a:t>6 Storage Configuration options on AWS:</a:t>
+              <a:t>Snapshot Storage:</a:t>
+            </a:r>
+          </a:p>
+          <a:p>
+            <a:r>
+              <a:rPr lang="en-US" dirty="0" smtClean="0"/>
+              <a:t>Stored in S3</a:t>
+            </a:r>
+          </a:p>
+          <a:p>
+            <a:r>
+              <a:rPr lang="en-US" dirty="0" smtClean="0"/>
+              <a:t>Copy between Regions</a:t>
             </a:r>
           </a:p>
           <a:p>
             <a:pPr marL="0" indent="0">
               <a:buNone/>
             </a:pPr>
-            <a:endParaRPr lang="en-US" dirty="0" smtClean="0"/>
-          </a:p>
-          <a:p>
-            <a:r>
-              <a:rPr lang="en-US" dirty="0" smtClean="0"/>
-              <a:t>Magnetic (HDD):</a:t>
-            </a:r>
-          </a:p>
-          <a:p>
-            <a:r>
-              <a:rPr lang="en-US" dirty="0" smtClean="0"/>
-              <a:t>EBS General Purpose (SSD)</a:t>
-            </a:r>
-          </a:p>
-          <a:p>
-            <a:r>
-              <a:rPr lang="en-US" dirty="0" smtClean="0"/>
-              <a:t>EBS Provisioned IOPS (SSD)</a:t>
-            </a:r>
-          </a:p>
-          <a:p>
-            <a:r>
-              <a:rPr lang="en-US" dirty="0" smtClean="0"/>
-              <a:t>EBS Provisioned IOPS (SSD) RAID</a:t>
-            </a:r>
-          </a:p>
-          <a:p>
-            <a:r>
-              <a:rPr lang="en-US" dirty="0" smtClean="0"/>
-              <a:t>Instance Store</a:t>
-            </a:r>
-          </a:p>
-          <a:p>
-            <a:r>
-              <a:rPr lang="en-US" dirty="0"/>
-              <a:t>Instance </a:t>
-            </a:r>
-            <a:r>
-              <a:rPr lang="en-US" dirty="0" smtClean="0"/>
-              <a:t>Store (RAID)</a:t>
-            </a:r>
-          </a:p>
-          <a:p>
-            <a:endParaRPr lang="en-US" dirty="0" smtClean="0"/>
-          </a:p>
-          <a:p>
-            <a:pPr marL="0" indent="0">
-              <a:buNone/>
-            </a:pPr>
-            <a:r>
-              <a:rPr lang="en-US" dirty="0"/>
-              <a:t>Performance Details for EBS are available here: http://</a:t>
-            </a:r>
-            <a:r>
-              <a:rPr lang="en-US" dirty="0" err="1"/>
-              <a:t>aws.amazon.com</a:t>
-            </a:r>
-            <a:r>
-              <a:rPr lang="en-US" dirty="0"/>
-              <a:t>/</a:t>
-            </a:r>
-            <a:r>
-              <a:rPr lang="en-US" dirty="0" err="1"/>
-              <a:t>ebs</a:t>
-            </a:r>
-            <a:r>
-              <a:rPr lang="en-US" dirty="0"/>
-              <a:t>/details/</a:t>
-            </a:r>
-          </a:p>
-          <a:p>
-            <a:pPr marL="0" indent="0">
-              <a:buNone/>
-            </a:pPr>
+            <a:r>
+              <a:rPr lang="en-US" dirty="0" smtClean="0"/>
+              <a:t>Snapshot Pricing:</a:t>
+            </a:r>
+          </a:p>
+          <a:p>
+            <a:r>
+              <a:rPr lang="en-US" dirty="0" smtClean="0"/>
+              <a:t>First Snapshot = compressed size of </a:t>
+            </a:r>
+            <a:r>
+              <a:rPr lang="en-US" i="1" dirty="0" smtClean="0"/>
+              <a:t>used</a:t>
+            </a:r>
+            <a:r>
+              <a:rPr lang="en-US" dirty="0" smtClean="0"/>
+              <a:t> volume * price/GB/month</a:t>
+            </a:r>
+          </a:p>
+          <a:p>
+            <a:r>
+              <a:rPr lang="en-US" dirty="0" smtClean="0"/>
+              <a:t>Subsequent Snapshots = difference * price/GB/month</a:t>
+            </a:r>
+          </a:p>
+          <a:p>
             <a:endParaRPr lang="en-US" dirty="0" smtClean="0"/>
           </a:p>
         </p:txBody>
@@ -20326,13 +21083,17 @@
         <p:spPr/>
         <p:txBody>
           <a:bodyPr>
-            <a:normAutofit fontScale="90000"/>
+            <a:normAutofit/>
           </a:bodyPr>
           <a:lstStyle/>
           <a:p>
             <a:r>
               <a:rPr lang="en-US" dirty="0" smtClean="0"/>
-              <a:t>EBS and Instance Store: Performance</a:t>
+              <a:t>EBS: </a:t>
+            </a:r>
+            <a:r>
+              <a:rPr lang="en-US" dirty="0" smtClean="0"/>
+              <a:t>Snapshots</a:t>
             </a:r>
             <a:endParaRPr lang="en-US" dirty="0"/>
           </a:p>
@@ -20341,7 +21102,7 @@
     </p:spTree>
     <p:extLst>
       <p:ext uri="{BB962C8B-B14F-4D97-AF65-F5344CB8AC3E}">
-        <p14:creationId xmlns:p14="http://schemas.microsoft.com/office/powerpoint/2010/main" val="138577976"/>
+        <p14:creationId xmlns:p14="http://schemas.microsoft.com/office/powerpoint/2010/main" val="4151956704"/>
       </p:ext>
     </p:extLst>
   </p:cSld>
@@ -20388,55 +21149,96 @@
         <p:spPr/>
         <p:txBody>
           <a:bodyPr>
-            <a:normAutofit/>
+            <a:normAutofit fontScale="85000" lnSpcReduction="20000"/>
           </a:bodyPr>
           <a:lstStyle/>
           <a:p>
+            <a:pPr marL="0" indent="0">
+              <a:buNone/>
+            </a:pPr>
+            <a:r>
+              <a:rPr lang="en-US" dirty="0" smtClean="0"/>
+              <a:t>6 Storage Configuration options on AWS:</a:t>
+            </a:r>
+          </a:p>
+          <a:p>
+            <a:pPr marL="0" indent="0">
+              <a:buNone/>
+            </a:pPr>
+            <a:endParaRPr lang="en-US" dirty="0" smtClean="0"/>
+          </a:p>
+          <a:p>
+            <a:r>
+              <a:rPr lang="en-US" dirty="0" smtClean="0"/>
+              <a:t>Magnetic (HDD):</a:t>
+            </a:r>
+          </a:p>
+          <a:p>
+            <a:r>
+              <a:rPr lang="en-US" dirty="0" smtClean="0"/>
+              <a:t>EBS General Purpose (SSD)</a:t>
+            </a:r>
+          </a:p>
+          <a:p>
+            <a:r>
+              <a:rPr lang="en-US" dirty="0" smtClean="0"/>
+              <a:t>EBS Provisioned IOPS (SSD)</a:t>
+            </a:r>
+          </a:p>
+          <a:p>
+            <a:r>
+              <a:rPr lang="en-US" dirty="0" smtClean="0"/>
+              <a:t>EBS Provisioned IOPS (SSD) RAID</a:t>
+            </a:r>
+          </a:p>
+          <a:p>
+            <a:r>
+              <a:rPr lang="en-US" dirty="0" smtClean="0"/>
+              <a:t>Instance Store</a:t>
+            </a:r>
+          </a:p>
+          <a:p>
             <a:r>
               <a:rPr lang="en-US" dirty="0"/>
-              <a:t>Used Instance Store in RAID configuration on i2.4xlarge for collection of application metrics</a:t>
-            </a:r>
-          </a:p>
-          <a:p>
-            <a:pPr lvl="1"/>
+              <a:t>Instance </a:t>
+            </a:r>
+            <a:r>
+              <a:rPr lang="en-US" dirty="0" smtClean="0"/>
+              <a:t>Store (RAID)</a:t>
+            </a:r>
+          </a:p>
+          <a:p>
+            <a:endParaRPr lang="en-US" dirty="0" smtClean="0"/>
+          </a:p>
+          <a:p>
+            <a:pPr marL="0" indent="0">
+              <a:buNone/>
+            </a:pPr>
             <a:r>
               <a:rPr lang="en-US" dirty="0"/>
-              <a:t>I became aware of these machines when a client needed to move from an </a:t>
-            </a:r>
-            <a:r>
-              <a:rPr lang="en-US" dirty="0" smtClean="0"/>
-              <a:t>hi1.4xlarge to </a:t>
+              <a:t>Performance Details for EBS are available here: http://</a:t>
+            </a:r>
+            <a:r>
+              <a:rPr lang="en-US" dirty="0" err="1"/>
+              <a:t>aws.amazon.com</a:t>
             </a:r>
             <a:r>
               <a:rPr lang="en-US" dirty="0"/>
-              <a:t>an </a:t>
-            </a:r>
-            <a:r>
-              <a:rPr lang="en-US" dirty="0" smtClean="0"/>
-              <a:t>i2.4xlarge</a:t>
-            </a:r>
-          </a:p>
-          <a:p>
-            <a:r>
-              <a:rPr lang="en-US" dirty="0" smtClean="0"/>
-              <a:t>Created tooling to EBS snapshot based on Tags</a:t>
-            </a:r>
-          </a:p>
-          <a:p>
-            <a:pPr lvl="1"/>
-            <a:r>
-              <a:rPr lang="en-US" dirty="0" smtClean="0"/>
-              <a:t>allowed developers to backup work easily and without discussing with Operations</a:t>
-            </a:r>
-          </a:p>
-          <a:p>
+              <a:t>/</a:t>
+            </a:r>
+            <a:r>
+              <a:rPr lang="en-US" dirty="0" err="1"/>
+              <a:t>ebs</a:t>
+            </a:r>
             <a:r>
               <a:rPr lang="en-US" dirty="0"/>
-              <a:t>I’m eagerly awaiting the release of Amazon EFS</a:t>
-            </a:r>
-          </a:p>
-          <a:p>
-            <a:pPr lvl="1"/>
+              <a:t>/details/</a:t>
+            </a:r>
+          </a:p>
+          <a:p>
+            <a:pPr marL="0" indent="0">
+              <a:buNone/>
+            </a:pPr>
             <a:endParaRPr lang="en-US" dirty="0" smtClean="0"/>
           </a:p>
         </p:txBody>
@@ -20460,14 +21262,18 @@
           <a:p>
             <a:r>
               <a:rPr lang="en-US" dirty="0" smtClean="0"/>
-              <a:t>EBS and Instance Store:</a:t>
+              <a:t>EBS and Instance </a:t>
+            </a:r>
+            <a:r>
+              <a:rPr lang="en-US" dirty="0" smtClean="0"/>
+              <a:t>Store:</a:t>
             </a:r>
             <a:br>
               <a:rPr lang="en-US" dirty="0" smtClean="0"/>
             </a:br>
             <a:r>
               <a:rPr lang="en-US" dirty="0" smtClean="0"/>
-              <a:t>Practical Experience</a:t>
+              <a:t>Performance Options</a:t>
             </a:r>
             <a:endParaRPr lang="en-US" dirty="0"/>
           </a:p>
@@ -20476,7 +21282,7 @@
     </p:spTree>
     <p:extLst>
       <p:ext uri="{BB962C8B-B14F-4D97-AF65-F5344CB8AC3E}">
-        <p14:creationId xmlns:p14="http://schemas.microsoft.com/office/powerpoint/2010/main" val="3130577924"/>
+        <p14:creationId xmlns:p14="http://schemas.microsoft.com/office/powerpoint/2010/main" val="138577976"/>
       </p:ext>
     </p:extLst>
   </p:cSld>
@@ -20523,57 +21329,74 @@
         <p:spPr/>
         <p:txBody>
           <a:bodyPr>
-            <a:normAutofit/>
+            <a:normAutofit lnSpcReduction="10000"/>
           </a:bodyPr>
           <a:lstStyle/>
           <a:p>
             <a:r>
               <a:rPr lang="en-US" dirty="0" smtClean="0"/>
-              <a:t>Create an EBS Volume (20 GB in size)</a:t>
-            </a:r>
-          </a:p>
-          <a:p>
-            <a:r>
-              <a:rPr lang="en-US" dirty="0" smtClean="0"/>
-              <a:t>Attach to the www-</a:t>
+              <a:t>All Instances:</a:t>
+            </a:r>
+          </a:p>
+          <a:p>
+            <a:pPr lvl="1"/>
+            <a:r>
+              <a:rPr lang="en-US" dirty="0"/>
+              <a:t>Peak Throughput per Node: 800 MB/</a:t>
+            </a:r>
+            <a:r>
+              <a:rPr lang="en-US" dirty="0" smtClean="0"/>
+              <a:t>s</a:t>
+            </a:r>
+          </a:p>
+          <a:p>
+            <a:pPr lvl="1"/>
+            <a:r>
+              <a:rPr lang="en-US" dirty="0" smtClean="0"/>
+              <a:t>Maximum 48,000 IOPS @ 16K 10, limited by 10 </a:t>
             </a:r>
             <a:r>
               <a:rPr lang="en-US" dirty="0" err="1" smtClean="0"/>
-              <a:t>youname</a:t>
-            </a:r>
-            <a:r>
-              <a:rPr lang="en-US" dirty="0" smtClean="0"/>
-              <a:t> Instance</a:t>
-            </a:r>
-          </a:p>
-          <a:p>
-            <a:r>
-              <a:rPr lang="en-US" dirty="0" smtClean="0"/>
-              <a:t>Format the newly created EBS Volume</a:t>
-            </a:r>
-          </a:p>
-          <a:p>
-            <a:r>
-              <a:rPr lang="en-US" dirty="0" smtClean="0"/>
-              <a:t>Add data to the new EBS Volume</a:t>
-            </a:r>
-          </a:p>
-          <a:p>
-            <a:r>
-              <a:rPr lang="en-US" dirty="0" smtClean="0"/>
-              <a:t>Snapshot the new EBS volume</a:t>
-            </a:r>
-          </a:p>
-          <a:p>
-            <a:r>
-              <a:rPr lang="en-US" dirty="0" smtClean="0"/>
-              <a:t>Restore the EBS volume (60 GB in size, 1800 IOPS)</a:t>
-            </a:r>
-          </a:p>
-          <a:p>
-            <a:pPr marL="0" indent="0">
-              <a:buNone/>
-            </a:pPr>
+              <a:t>Gbps</a:t>
+            </a:r>
+            <a:r>
+              <a:rPr lang="en-US" dirty="0" smtClean="0"/>
+              <a:t> Network</a:t>
+            </a:r>
+            <a:endParaRPr lang="en-US" dirty="0"/>
+          </a:p>
+          <a:p>
+            <a:r>
+              <a:rPr lang="en-US" dirty="0" smtClean="0"/>
+              <a:t>EBS-Optimized Instances:</a:t>
+            </a:r>
+          </a:p>
+          <a:p>
+            <a:pPr lvl="1"/>
+            <a:r>
+              <a:rPr lang="en-US" dirty="0"/>
+              <a:t>d</a:t>
+            </a:r>
+            <a:r>
+              <a:rPr lang="en-US" dirty="0" smtClean="0"/>
+              <a:t>edicated EBS network, provides consistent performance</a:t>
+            </a:r>
+            <a:endParaRPr lang="en-US" dirty="0"/>
+          </a:p>
+          <a:p>
+            <a:r>
+              <a:rPr lang="en-US" dirty="0" smtClean="0"/>
+              <a:t>Not EBS-Optimized Instance:</a:t>
+            </a:r>
+          </a:p>
+          <a:p>
+            <a:pPr lvl="1"/>
+            <a:r>
+              <a:rPr lang="en-US" dirty="0" smtClean="0"/>
+              <a:t>Network and EBS compete for bandwidth</a:t>
+            </a:r>
+          </a:p>
+          <a:p>
             <a:endParaRPr lang="en-US" dirty="0" smtClean="0"/>
           </a:p>
         </p:txBody>
@@ -20597,7 +21420,19 @@
           <a:p>
             <a:r>
               <a:rPr lang="en-US" dirty="0" smtClean="0"/>
-              <a:t>Hands-On: Create, Snapshot and Resize EBS</a:t>
+              <a:t>EBS:</a:t>
+            </a:r>
+            <a:r>
+              <a:rPr lang="en-US" dirty="0"/>
+              <a:t> </a:t>
+            </a:r>
+            <a:r>
+              <a:rPr lang="en-US" dirty="0" smtClean="0"/>
+              <a:t>EC2 Instance Impac</a:t>
+            </a:r>
+            <a:r>
+              <a:rPr lang="en-US" dirty="0" smtClean="0"/>
+              <a:t>t on Performance</a:t>
             </a:r>
             <a:endParaRPr lang="en-US" dirty="0"/>
           </a:p>
@@ -20606,7 +21441,300 @@
     </p:spTree>
     <p:extLst>
       <p:ext uri="{BB962C8B-B14F-4D97-AF65-F5344CB8AC3E}">
-        <p14:creationId xmlns:p14="http://schemas.microsoft.com/office/powerpoint/2010/main" val="1488925175"/>
+        <p14:creationId xmlns:p14="http://schemas.microsoft.com/office/powerpoint/2010/main" val="1333738794"/>
+      </p:ext>
+    </p:extLst>
+  </p:cSld>
+  <p:clrMapOvr>
+    <a:masterClrMapping/>
+  </p:clrMapOvr>
+  <p:timing>
+    <p:tnLst>
+      <p:par>
+        <p:cTn xmlns:p14="http://schemas.microsoft.com/office/powerpoint/2010/main" id="1" dur="indefinite" restart="never" nodeType="tmRoot"/>
+      </p:par>
+    </p:tnLst>
+  </p:timing>
+</p:sld>
+</file>
+
+<file path=ppt/slides/slide28.xml><?xml version="1.0" encoding="utf-8"?>
+<p:sld xmlns:a="http://schemas.openxmlformats.org/drawingml/2006/main" xmlns:r="http://schemas.openxmlformats.org/officeDocument/2006/relationships" xmlns:p="http://schemas.openxmlformats.org/presentationml/2006/main">
+  <p:cSld>
+    <p:spTree>
+      <p:nvGrpSpPr>
+        <p:cNvPr id="1" name=""/>
+        <p:cNvGrpSpPr/>
+        <p:nvPr/>
+      </p:nvGrpSpPr>
+      <p:grpSpPr>
+        <a:xfrm>
+          <a:off x="0" y="0"/>
+          <a:ext cx="0" cy="0"/>
+          <a:chOff x="0" y="0"/>
+          <a:chExt cx="0" cy="0"/>
+        </a:xfrm>
+      </p:grpSpPr>
+      <p:sp>
+        <p:nvSpPr>
+          <p:cNvPr id="3" name="Content Placeholder 2"/>
+          <p:cNvSpPr>
+            <a:spLocks noGrp="1"/>
+          </p:cNvSpPr>
+          <p:nvPr>
+            <p:ph idx="1"/>
+          </p:nvPr>
+        </p:nvSpPr>
+        <p:spPr/>
+        <p:txBody>
+          <a:bodyPr>
+            <a:normAutofit fontScale="85000" lnSpcReduction="20000"/>
+          </a:bodyPr>
+          <a:lstStyle/>
+          <a:p>
+            <a:r>
+              <a:rPr lang="en-US" dirty="0" smtClean="0">
+                <a:solidFill>
+                  <a:srgbClr val="F5C040"/>
+                </a:solidFill>
+              </a:rPr>
+              <a:t>Disclaimer: numbers are not verified - from SDD416 Presentation at AWS </a:t>
+            </a:r>
+            <a:r>
+              <a:rPr lang="en-US" dirty="0" err="1" smtClean="0">
+                <a:solidFill>
+                  <a:srgbClr val="F5C040"/>
+                </a:solidFill>
+              </a:rPr>
+              <a:t>re:Invent</a:t>
+            </a:r>
+            <a:r>
+              <a:rPr lang="en-US" dirty="0" smtClean="0">
+                <a:solidFill>
+                  <a:srgbClr val="F5C040"/>
+                </a:solidFill>
+              </a:rPr>
+              <a:t> 2014.</a:t>
+            </a:r>
+          </a:p>
+          <a:p>
+            <a:r>
+              <a:rPr lang="en-US" dirty="0" smtClean="0"/>
+              <a:t>128 MB/s maximum throughput</a:t>
+            </a:r>
+          </a:p>
+          <a:p>
+            <a:r>
+              <a:rPr lang="en-US" dirty="0" smtClean="0"/>
+              <a:t>Any volume can provide 3,000 IOPS in Burst Configuration, larger volumes can burst longer.</a:t>
+            </a:r>
+          </a:p>
+          <a:p>
+            <a:r>
+              <a:rPr lang="en-US" dirty="0" smtClean="0"/>
+              <a:t>“IO Burst Bucket”</a:t>
+            </a:r>
+          </a:p>
+          <a:p>
+            <a:pPr lvl="1"/>
+            <a:r>
+              <a:rPr lang="en-US" dirty="0" smtClean="0"/>
+              <a:t>Start with 5.4M credits</a:t>
+            </a:r>
+          </a:p>
+          <a:p>
+            <a:pPr lvl="1"/>
+            <a:r>
+              <a:rPr lang="en-US" dirty="0"/>
+              <a:t>3 IOPS per/second GB </a:t>
+            </a:r>
+            <a:r>
+              <a:rPr lang="en-US" dirty="0" smtClean="0"/>
+              <a:t>accumulated</a:t>
+            </a:r>
+          </a:p>
+          <a:p>
+            <a:pPr lvl="1"/>
+            <a:r>
+              <a:rPr lang="en-US" dirty="0" smtClean="0"/>
+              <a:t>Use up to 3,000 IOPS per second</a:t>
+            </a:r>
+          </a:p>
+          <a:p>
+            <a:pPr lvl="1"/>
+            <a:r>
+              <a:rPr lang="en-US" dirty="0" smtClean="0"/>
+              <a:t>If Burst Bucket IOPS exhausted – drop to 3 IOPS/sec per GB</a:t>
+            </a:r>
+          </a:p>
+          <a:p>
+            <a:r>
+              <a:rPr lang="en-US" dirty="0" smtClean="0"/>
+              <a:t>Provision in RAID, increase IOPS (2 EBS = 6,000 Burst, 128 MB/s RAID)</a:t>
+            </a:r>
+          </a:p>
+        </p:txBody>
+      </p:sp>
+      <p:sp>
+        <p:nvSpPr>
+          <p:cNvPr id="2" name="Title 1"/>
+          <p:cNvSpPr>
+            <a:spLocks noGrp="1"/>
+          </p:cNvSpPr>
+          <p:nvPr>
+            <p:ph type="title"/>
+          </p:nvPr>
+        </p:nvSpPr>
+        <p:spPr/>
+        <p:txBody>
+          <a:bodyPr>
+            <a:normAutofit/>
+          </a:bodyPr>
+          <a:lstStyle/>
+          <a:p>
+            <a:r>
+              <a:rPr lang="en-US" dirty="0" smtClean="0"/>
+              <a:t>EBS: General Purpose SSD</a:t>
+            </a:r>
+            <a:endParaRPr lang="en-US" dirty="0"/>
+          </a:p>
+        </p:txBody>
+      </p:sp>
+    </p:spTree>
+    <p:extLst>
+      <p:ext uri="{BB962C8B-B14F-4D97-AF65-F5344CB8AC3E}">
+        <p14:creationId xmlns:p14="http://schemas.microsoft.com/office/powerpoint/2010/main" val="1818767331"/>
+      </p:ext>
+    </p:extLst>
+  </p:cSld>
+  <p:clrMapOvr>
+    <a:masterClrMapping/>
+  </p:clrMapOvr>
+  <p:timing>
+    <p:tnLst>
+      <p:par>
+        <p:cTn xmlns:p14="http://schemas.microsoft.com/office/powerpoint/2010/main" id="1" dur="indefinite" restart="never" nodeType="tmRoot"/>
+      </p:par>
+    </p:tnLst>
+  </p:timing>
+</p:sld>
+</file>
+
+<file path=ppt/slides/slide29.xml><?xml version="1.0" encoding="utf-8"?>
+<p:sld xmlns:a="http://schemas.openxmlformats.org/drawingml/2006/main" xmlns:r="http://schemas.openxmlformats.org/officeDocument/2006/relationships" xmlns:p="http://schemas.openxmlformats.org/presentationml/2006/main">
+  <p:cSld>
+    <p:spTree>
+      <p:nvGrpSpPr>
+        <p:cNvPr id="1" name=""/>
+        <p:cNvGrpSpPr/>
+        <p:nvPr/>
+      </p:nvGrpSpPr>
+      <p:grpSpPr>
+        <a:xfrm>
+          <a:off x="0" y="0"/>
+          <a:ext cx="0" cy="0"/>
+          <a:chOff x="0" y="0"/>
+          <a:chExt cx="0" cy="0"/>
+        </a:xfrm>
+      </p:grpSpPr>
+      <p:sp>
+        <p:nvSpPr>
+          <p:cNvPr id="3" name="Content Placeholder 2"/>
+          <p:cNvSpPr>
+            <a:spLocks noGrp="1"/>
+          </p:cNvSpPr>
+          <p:nvPr>
+            <p:ph idx="1"/>
+          </p:nvPr>
+        </p:nvSpPr>
+        <p:spPr/>
+        <p:txBody>
+          <a:bodyPr>
+            <a:normAutofit/>
+          </a:bodyPr>
+          <a:lstStyle/>
+          <a:p>
+            <a:r>
+              <a:rPr lang="en-US" dirty="0" smtClean="0">
+                <a:solidFill>
+                  <a:srgbClr val="F5C040"/>
+                </a:solidFill>
+              </a:rPr>
+              <a:t>Disclaimer: numbers are not verified - from SDD416 Presentation at AWS </a:t>
+            </a:r>
+            <a:r>
+              <a:rPr lang="en-US" dirty="0" err="1" smtClean="0">
+                <a:solidFill>
+                  <a:srgbClr val="F5C040"/>
+                </a:solidFill>
+              </a:rPr>
+              <a:t>re:Invent</a:t>
+            </a:r>
+            <a:r>
+              <a:rPr lang="en-US" dirty="0" smtClean="0">
+                <a:solidFill>
+                  <a:srgbClr val="F5C040"/>
+                </a:solidFill>
+              </a:rPr>
+              <a:t> 2014.</a:t>
+            </a:r>
+          </a:p>
+          <a:p>
+            <a:r>
+              <a:rPr lang="en-US" dirty="0" smtClean="0"/>
+              <a:t>Up to 4,000 IOPS per Volume</a:t>
+            </a:r>
+          </a:p>
+          <a:p>
+            <a:r>
+              <a:rPr lang="en-US" dirty="0"/>
+              <a:t>320 MB/s </a:t>
+            </a:r>
+            <a:r>
+              <a:rPr lang="en-US" dirty="0" smtClean="0"/>
+              <a:t>Throughput</a:t>
+            </a:r>
+          </a:p>
+          <a:p>
+            <a:r>
+              <a:rPr lang="en-US" dirty="0" smtClean="0"/>
+              <a:t>30 IOPS per GB (100 GB can only be 3,000 IOPS</a:t>
+            </a:r>
+          </a:p>
+          <a:p>
+            <a:endParaRPr lang="en-US" dirty="0" smtClean="0"/>
+          </a:p>
+        </p:txBody>
+      </p:sp>
+      <p:sp>
+        <p:nvSpPr>
+          <p:cNvPr id="2" name="Title 1"/>
+          <p:cNvSpPr>
+            <a:spLocks noGrp="1"/>
+          </p:cNvSpPr>
+          <p:nvPr>
+            <p:ph type="title"/>
+          </p:nvPr>
+        </p:nvSpPr>
+        <p:spPr/>
+        <p:txBody>
+          <a:bodyPr>
+            <a:normAutofit/>
+          </a:bodyPr>
+          <a:lstStyle/>
+          <a:p>
+            <a:r>
+              <a:rPr lang="en-US" dirty="0" smtClean="0"/>
+              <a:t>EBS: Provisioned IOPS</a:t>
+            </a:r>
+            <a:endParaRPr lang="en-US" dirty="0"/>
+          </a:p>
+        </p:txBody>
+      </p:sp>
+    </p:spTree>
+    <p:extLst>
+      <p:ext uri="{BB962C8B-B14F-4D97-AF65-F5344CB8AC3E}">
+        <p14:creationId xmlns:p14="http://schemas.microsoft.com/office/powerpoint/2010/main" val="469433254"/>
       </p:ext>
     </p:extLst>
   </p:cSld>
@@ -20728,6 +21856,267 @@
     <p:extLst>
       <p:ext uri="{BB962C8B-B14F-4D97-AF65-F5344CB8AC3E}">
         <p14:creationId xmlns:p14="http://schemas.microsoft.com/office/powerpoint/2010/main" val="3122286205"/>
+      </p:ext>
+    </p:extLst>
+  </p:cSld>
+  <p:clrMapOvr>
+    <a:masterClrMapping/>
+  </p:clrMapOvr>
+  <p:timing>
+    <p:tnLst>
+      <p:par>
+        <p:cTn xmlns:p14="http://schemas.microsoft.com/office/powerpoint/2010/main" id="1" dur="indefinite" restart="never" nodeType="tmRoot"/>
+      </p:par>
+    </p:tnLst>
+  </p:timing>
+</p:sld>
+</file>
+
+<file path=ppt/slides/slide30.xml><?xml version="1.0" encoding="utf-8"?>
+<p:sld xmlns:a="http://schemas.openxmlformats.org/drawingml/2006/main" xmlns:r="http://schemas.openxmlformats.org/officeDocument/2006/relationships" xmlns:p="http://schemas.openxmlformats.org/presentationml/2006/main">
+  <p:cSld>
+    <p:spTree>
+      <p:nvGrpSpPr>
+        <p:cNvPr id="1" name=""/>
+        <p:cNvGrpSpPr/>
+        <p:nvPr/>
+      </p:nvGrpSpPr>
+      <p:grpSpPr>
+        <a:xfrm>
+          <a:off x="0" y="0"/>
+          <a:ext cx="0" cy="0"/>
+          <a:chOff x="0" y="0"/>
+          <a:chExt cx="0" cy="0"/>
+        </a:xfrm>
+      </p:grpSpPr>
+      <p:sp>
+        <p:nvSpPr>
+          <p:cNvPr id="3" name="Content Placeholder 2"/>
+          <p:cNvSpPr>
+            <a:spLocks noGrp="1"/>
+          </p:cNvSpPr>
+          <p:nvPr>
+            <p:ph idx="1"/>
+          </p:nvPr>
+        </p:nvSpPr>
+        <p:spPr/>
+        <p:txBody>
+          <a:bodyPr>
+            <a:normAutofit/>
+          </a:bodyPr>
+          <a:lstStyle/>
+          <a:p>
+            <a:r>
+              <a:rPr lang="en-US" dirty="0" smtClean="0">
+                <a:solidFill>
+                  <a:srgbClr val="F5C040"/>
+                </a:solidFill>
+              </a:rPr>
+              <a:t>Disclaimer: numbers are not verified - from SDD416 Presentation at AWS </a:t>
+            </a:r>
+            <a:r>
+              <a:rPr lang="en-US" dirty="0" err="1" smtClean="0">
+                <a:solidFill>
+                  <a:srgbClr val="F5C040"/>
+                </a:solidFill>
+              </a:rPr>
+              <a:t>re:Invent</a:t>
+            </a:r>
+            <a:r>
+              <a:rPr lang="en-US" dirty="0" smtClean="0">
+                <a:solidFill>
+                  <a:srgbClr val="F5C040"/>
+                </a:solidFill>
+              </a:rPr>
+              <a:t> 2014.</a:t>
+            </a:r>
+          </a:p>
+          <a:p>
+            <a:r>
+              <a:rPr lang="en-US" dirty="0" smtClean="0"/>
+              <a:t>100 IOPS steady-state with best-effort burst</a:t>
+            </a:r>
+          </a:p>
+          <a:p>
+            <a:r>
+              <a:rPr lang="en-US" dirty="0" smtClean="0"/>
+              <a:t>“Best Effort” to 10 MB/s throughput</a:t>
+            </a:r>
+          </a:p>
+          <a:p>
+            <a:r>
+              <a:rPr lang="en-US" dirty="0" smtClean="0"/>
+              <a:t>Peak </a:t>
+            </a:r>
+            <a:r>
+              <a:rPr lang="en-US" dirty="0"/>
+              <a:t>Throughput per Node: 800 MB/s</a:t>
+            </a:r>
+          </a:p>
+          <a:p>
+            <a:endParaRPr lang="en-US" dirty="0" smtClean="0"/>
+          </a:p>
+        </p:txBody>
+      </p:sp>
+      <p:sp>
+        <p:nvSpPr>
+          <p:cNvPr id="2" name="Title 1"/>
+          <p:cNvSpPr>
+            <a:spLocks noGrp="1"/>
+          </p:cNvSpPr>
+          <p:nvPr>
+            <p:ph type="title"/>
+          </p:nvPr>
+        </p:nvSpPr>
+        <p:spPr/>
+        <p:txBody>
+          <a:bodyPr>
+            <a:normAutofit/>
+          </a:bodyPr>
+          <a:lstStyle/>
+          <a:p>
+            <a:r>
+              <a:rPr lang="en-US" dirty="0" smtClean="0"/>
+              <a:t>EBS: Magnetics</a:t>
+            </a:r>
+            <a:endParaRPr lang="en-US" dirty="0"/>
+          </a:p>
+        </p:txBody>
+      </p:sp>
+    </p:spTree>
+    <p:extLst>
+      <p:ext uri="{BB962C8B-B14F-4D97-AF65-F5344CB8AC3E}">
+        <p14:creationId xmlns:p14="http://schemas.microsoft.com/office/powerpoint/2010/main" val="2365770770"/>
+      </p:ext>
+    </p:extLst>
+  </p:cSld>
+  <p:clrMapOvr>
+    <a:masterClrMapping/>
+  </p:clrMapOvr>
+  <p:timing>
+    <p:tnLst>
+      <p:par>
+        <p:cTn xmlns:p14="http://schemas.microsoft.com/office/powerpoint/2010/main" id="1" dur="indefinite" restart="never" nodeType="tmRoot"/>
+      </p:par>
+    </p:tnLst>
+  </p:timing>
+</p:sld>
+</file>
+
+<file path=ppt/slides/slide31.xml><?xml version="1.0" encoding="utf-8"?>
+<p:sld xmlns:a="http://schemas.openxmlformats.org/drawingml/2006/main" xmlns:r="http://schemas.openxmlformats.org/officeDocument/2006/relationships" xmlns:p="http://schemas.openxmlformats.org/presentationml/2006/main">
+  <p:cSld>
+    <p:spTree>
+      <p:nvGrpSpPr>
+        <p:cNvPr id="1" name=""/>
+        <p:cNvGrpSpPr/>
+        <p:nvPr/>
+      </p:nvGrpSpPr>
+      <p:grpSpPr>
+        <a:xfrm>
+          <a:off x="0" y="0"/>
+          <a:ext cx="0" cy="0"/>
+          <a:chOff x="0" y="0"/>
+          <a:chExt cx="0" cy="0"/>
+        </a:xfrm>
+      </p:grpSpPr>
+      <p:sp>
+        <p:nvSpPr>
+          <p:cNvPr id="3" name="Content Placeholder 2"/>
+          <p:cNvSpPr>
+            <a:spLocks noGrp="1"/>
+          </p:cNvSpPr>
+          <p:nvPr>
+            <p:ph idx="1"/>
+          </p:nvPr>
+        </p:nvSpPr>
+        <p:spPr/>
+        <p:txBody>
+          <a:bodyPr>
+            <a:normAutofit/>
+          </a:bodyPr>
+          <a:lstStyle/>
+          <a:p>
+            <a:r>
+              <a:rPr lang="en-US" dirty="0" smtClean="0"/>
+              <a:t>Create an EBS Volume (20 GB in size)</a:t>
+            </a:r>
+          </a:p>
+          <a:p>
+            <a:r>
+              <a:rPr lang="en-US" dirty="0" smtClean="0"/>
+              <a:t>Attach to the www-</a:t>
+            </a:r>
+            <a:r>
+              <a:rPr lang="en-US" dirty="0" err="1" smtClean="0"/>
+              <a:t>youname</a:t>
+            </a:r>
+            <a:r>
+              <a:rPr lang="en-US" dirty="0" smtClean="0"/>
+              <a:t> Instance</a:t>
+            </a:r>
+          </a:p>
+          <a:p>
+            <a:r>
+              <a:rPr lang="en-US" dirty="0" smtClean="0"/>
+              <a:t>Format the newly created EBS Volume</a:t>
+            </a:r>
+          </a:p>
+          <a:p>
+            <a:r>
+              <a:rPr lang="en-US" dirty="0" smtClean="0"/>
+              <a:t>Add data to the new EBS Volume</a:t>
+            </a:r>
+          </a:p>
+          <a:p>
+            <a:r>
+              <a:rPr lang="en-US" dirty="0" smtClean="0"/>
+              <a:t>Snapshot the new EBS volume</a:t>
+            </a:r>
+          </a:p>
+          <a:p>
+            <a:r>
+              <a:rPr lang="en-US" dirty="0" smtClean="0"/>
+              <a:t>Restore the EBS volume (60 GB in size, 1800 IOPS)</a:t>
+            </a:r>
+          </a:p>
+          <a:p>
+            <a:pPr marL="0" indent="0">
+              <a:buNone/>
+            </a:pPr>
+            <a:endParaRPr lang="en-US" dirty="0" smtClean="0"/>
+          </a:p>
+        </p:txBody>
+      </p:sp>
+      <p:sp>
+        <p:nvSpPr>
+          <p:cNvPr id="2" name="Title 1"/>
+          <p:cNvSpPr>
+            <a:spLocks noGrp="1"/>
+          </p:cNvSpPr>
+          <p:nvPr>
+            <p:ph type="title"/>
+          </p:nvPr>
+        </p:nvSpPr>
+        <p:spPr/>
+        <p:txBody>
+          <a:bodyPr>
+            <a:normAutofit fontScale="90000"/>
+          </a:bodyPr>
+          <a:lstStyle/>
+          <a:p>
+            <a:r>
+              <a:rPr lang="en-US" dirty="0" smtClean="0"/>
+              <a:t>Hands-On: Create, Snapshot and Resize EBS</a:t>
+            </a:r>
+            <a:endParaRPr lang="en-US" dirty="0"/>
+          </a:p>
+        </p:txBody>
+      </p:sp>
+    </p:spTree>
+    <p:extLst>
+      <p:ext uri="{BB962C8B-B14F-4D97-AF65-F5344CB8AC3E}">
+        <p14:creationId xmlns:p14="http://schemas.microsoft.com/office/powerpoint/2010/main" val="1488925175"/>
       </p:ext>
     </p:extLst>
   </p:cSld>

</xml_diff>

<commit_message>
updates for November trainings
</commit_message>
<xml_diff>
--- a/aws-ec2/aws-ec2.pptx
+++ b/aws-ec2/aws-ec2.pptx
@@ -137,6 +137,22 @@
       </a:defRPr>
     </a:lvl9pPr>
   </p:defaultTextStyle>
+  <p:extLst>
+    <p:ext uri="{EFAFB233-063F-42B5-8137-9DF3F51BA10A}">
+      <p15:sldGuideLst xmlns:p15="http://schemas.microsoft.com/office/powerpoint/2012/main">
+        <p15:guide id="1" orient="horz" pos="2160">
+          <p15:clr>
+            <a:srgbClr val="A4A3A4"/>
+          </p15:clr>
+        </p15:guide>
+        <p15:guide id="2" pos="2880">
+          <p15:clr>
+            <a:srgbClr val="A4A3A4"/>
+          </p15:clr>
+        </p15:guide>
+      </p15:sldGuideLst>
+    </p:ext>
+  </p:extLst>
 </p:presentation>
 </file>
 
@@ -222,7 +238,7 @@
           <a:p>
             <a:fld id="{1B6676A5-1300-B945-98B1-DD92DDC3A3CB}" type="datetimeFigureOut">
               <a:rPr lang="en-US" smtClean="0"/>
-              <a:t>4/22/15</a:t>
+              <a:t>11/22/15</a:t>
             </a:fld>
             <a:endParaRPr lang="en-US"/>
           </a:p>
@@ -534,6 +550,23 @@
           <a:bodyPr/>
           <a:lstStyle/>
           <a:p>
+            <a:pPr marL="0" marR="0" indent="0" algn="l" defTabSz="457200" rtl="0" eaLnBrk="1" fontAlgn="auto" latinLnBrk="0" hangingPunct="1">
+              <a:lnSpc>
+                <a:spcPct val="100000"/>
+              </a:lnSpc>
+              <a:spcBef>
+                <a:spcPts val="0"/>
+              </a:spcBef>
+              <a:spcAft>
+                <a:spcPts val="0"/>
+              </a:spcAft>
+              <a:buClrTx/>
+              <a:buSzTx/>
+              <a:buFontTx/>
+              <a:buNone/>
+              <a:tabLst/>
+              <a:defRPr/>
+            </a:pPr>
             <a:r>
               <a:rPr lang="en-US" dirty="0" err="1" smtClean="0"/>
               <a:t>Stateful</a:t>
@@ -552,6 +585,64 @@
             </a:r>
           </a:p>
           <a:p>
+            <a:pPr marL="0" marR="0" indent="0" algn="l" defTabSz="457200" rtl="0" eaLnBrk="1" fontAlgn="auto" latinLnBrk="0" hangingPunct="1">
+              <a:lnSpc>
+                <a:spcPct val="100000"/>
+              </a:lnSpc>
+              <a:spcBef>
+                <a:spcPts val="0"/>
+              </a:spcBef>
+              <a:spcAft>
+                <a:spcPts val="0"/>
+              </a:spcAft>
+              <a:buClrTx/>
+              <a:buSzTx/>
+              <a:buFontTx/>
+              <a:buNone/>
+              <a:tabLst/>
+              <a:defRPr/>
+            </a:pPr>
+            <a:endParaRPr lang="en-US" dirty="0" smtClean="0"/>
+          </a:p>
+          <a:p>
+            <a:pPr marL="171450" indent="-171450">
+              <a:buFont typeface="Arial" charset="0"/>
+              <a:buChar char="•"/>
+            </a:pPr>
+            <a:r>
+              <a:rPr lang="en-US" dirty="0" smtClean="0"/>
+              <a:t>Security Groups are the “near” equivalent</a:t>
+            </a:r>
+            <a:r>
+              <a:rPr lang="en-US" baseline="0" dirty="0" smtClean="0"/>
+              <a:t> of a </a:t>
+            </a:r>
+            <a:r>
+              <a:rPr lang="en-US" baseline="0" dirty="0" err="1" smtClean="0"/>
+              <a:t>stateful</a:t>
+            </a:r>
+            <a:r>
+              <a:rPr lang="en-US" baseline="0" dirty="0" smtClean="0"/>
+              <a:t> firewall:</a:t>
+            </a:r>
+          </a:p>
+          <a:p>
+            <a:pPr marL="628650" lvl="1" indent="-171450">
+              <a:buFont typeface="Arial" charset="0"/>
+              <a:buChar char="•"/>
+            </a:pPr>
+            <a:r>
+              <a:rPr lang="en-US" dirty="0" smtClean="0"/>
+              <a:t>Security</a:t>
+            </a:r>
+            <a:r>
+              <a:rPr lang="en-US" baseline="0" dirty="0" smtClean="0"/>
+              <a:t> Groups are </a:t>
+            </a:r>
+            <a:r>
+              <a:rPr lang="en-US" baseline="0" dirty="0" err="1" smtClean="0"/>
+              <a:t>stateful</a:t>
+            </a:r>
             <a:endParaRPr lang="en-US" baseline="0" dirty="0" smtClean="0"/>
           </a:p>
         </p:txBody>
@@ -2291,7 +2382,6 @@
               <a:rPr lang="en-US" baseline="0" dirty="0" smtClean="0"/>
               <a:t> 2014</a:t>
             </a:r>
-            <a:endParaRPr lang="en-US" baseline="0" dirty="0" smtClean="0"/>
           </a:p>
         </p:txBody>
       </p:sp>
@@ -5676,7 +5766,7 @@
           <a:p>
             <a:fld id="{7CE38E4D-051A-41E1-86A4-E56916468FD0}" type="datetimeFigureOut">
               <a:rPr lang="en-US" smtClean="0"/>
-              <a:t>4/22/15</a:t>
+              <a:t>11/22/15</a:t>
             </a:fld>
             <a:endParaRPr lang="en-US"/>
           </a:p>
@@ -5857,7 +5947,7 @@
           <a:p>
             <a:fld id="{7CE38E4D-051A-41E1-86A4-E56916468FD0}" type="datetimeFigureOut">
               <a:rPr lang="en-US" smtClean="0"/>
-              <a:t>4/22/15</a:t>
+              <a:t>11/22/15</a:t>
             </a:fld>
             <a:endParaRPr lang="en-US"/>
           </a:p>
@@ -6008,7 +6098,7 @@
           <a:p>
             <a:fld id="{7CE38E4D-051A-41E1-86A4-E56916468FD0}" type="datetimeFigureOut">
               <a:rPr lang="en-US" smtClean="0"/>
-              <a:t>4/22/15</a:t>
+              <a:t>11/22/15</a:t>
             </a:fld>
             <a:endParaRPr lang="en-US"/>
           </a:p>
@@ -7834,7 +7924,7 @@
           <a:p>
             <a:fld id="{7CE38E4D-051A-41E1-86A4-E56916468FD0}" type="datetimeFigureOut">
               <a:rPr lang="en-US" smtClean="0"/>
-              <a:t>4/22/15</a:t>
+              <a:t>11/22/15</a:t>
             </a:fld>
             <a:endParaRPr lang="en-US"/>
           </a:p>
@@ -9704,7 +9794,7 @@
           <a:p>
             <a:fld id="{7CE38E4D-051A-41E1-86A4-E56916468FD0}" type="datetimeFigureOut">
               <a:rPr lang="en-US" smtClean="0"/>
-              <a:t>4/22/15</a:t>
+              <a:t>11/22/15</a:t>
             </a:fld>
             <a:endParaRPr lang="en-US"/>
           </a:p>
@@ -9817,7 +9907,7 @@
           <a:p>
             <a:fld id="{7CE38E4D-051A-41E1-86A4-E56916468FD0}" type="datetimeFigureOut">
               <a:rPr lang="en-US" smtClean="0"/>
-              <a:t>4/22/15</a:t>
+              <a:t>11/22/15</a:t>
             </a:fld>
             <a:endParaRPr lang="en-US"/>
           </a:p>
@@ -10358,7 +10448,7 @@
           <a:p>
             <a:fld id="{7CE38E4D-051A-41E1-86A4-E56916468FD0}" type="datetimeFigureOut">
               <a:rPr lang="en-US" smtClean="0"/>
-              <a:t>4/22/15</a:t>
+              <a:t>11/22/15</a:t>
             </a:fld>
             <a:endParaRPr lang="en-US"/>
           </a:p>
@@ -10471,7 +10561,7 @@
           <a:p>
             <a:fld id="{7CE38E4D-051A-41E1-86A4-E56916468FD0}" type="datetimeFigureOut">
               <a:rPr lang="en-US" smtClean="0"/>
-              <a:t>4/22/15</a:t>
+              <a:t>11/22/15</a:t>
             </a:fld>
             <a:endParaRPr lang="en-US"/>
           </a:p>
@@ -12182,7 +12272,7 @@
           <a:p>
             <a:fld id="{7CE38E4D-051A-41E1-86A4-E56916468FD0}" type="datetimeFigureOut">
               <a:rPr lang="en-US" smtClean="0"/>
-              <a:t>4/22/15</a:t>
+              <a:t>11/22/15</a:t>
             </a:fld>
             <a:endParaRPr lang="en-US"/>
           </a:p>
@@ -12333,7 +12423,7 @@
           <a:p>
             <a:fld id="{7CE38E4D-051A-41E1-86A4-E56916468FD0}" type="datetimeFigureOut">
               <a:rPr lang="en-US" smtClean="0"/>
-              <a:t>4/22/15</a:t>
+              <a:t>11/22/15</a:t>
             </a:fld>
             <a:endParaRPr lang="en-US"/>
           </a:p>
@@ -15948,7 +16038,7 @@
           <a:p>
             <a:fld id="{7CE38E4D-051A-41E1-86A4-E56916468FD0}" type="datetimeFigureOut">
               <a:rPr lang="en-US" smtClean="0"/>
-              <a:t>4/22/15</a:t>
+              <a:t>11/22/15</a:t>
             </a:fld>
             <a:endParaRPr lang="en-US"/>
           </a:p>
@@ -17807,7 +17897,7 @@
           <a:p>
             <a:fld id="{7CE38E4D-051A-41E1-86A4-E56916468FD0}" type="datetimeFigureOut">
               <a:rPr lang="en-US" smtClean="0"/>
-              <a:t>4/22/15</a:t>
+              <a:t>11/22/15</a:t>
             </a:fld>
             <a:endParaRPr lang="en-US"/>
           </a:p>
@@ -18388,7 +18478,7 @@
   <p:timing>
     <p:tnLst>
       <p:par>
-        <p:cTn xmlns:p14="http://schemas.microsoft.com/office/powerpoint/2010/main" id="1" dur="indefinite" restart="never" nodeType="tmRoot"/>
+        <p:cTn id="1" dur="indefinite" restart="never" nodeType="tmRoot"/>
       </p:par>
     </p:tnLst>
   </p:timing>
@@ -18530,7 +18620,7 @@
   <p:timing>
     <p:tnLst>
       <p:par>
-        <p:cTn xmlns:p14="http://schemas.microsoft.com/office/powerpoint/2010/main" id="1" dur="indefinite" restart="never" nodeType="tmRoot"/>
+        <p:cTn id="1" dur="indefinite" restart="never" nodeType="tmRoot"/>
       </p:par>
     </p:tnLst>
   </p:timing>
@@ -18698,7 +18788,7 @@
   <p:timing>
     <p:tnLst>
       <p:par>
-        <p:cTn xmlns:p14="http://schemas.microsoft.com/office/powerpoint/2010/main" id="1" dur="indefinite" restart="never" nodeType="tmRoot"/>
+        <p:cTn id="1" dur="indefinite" restart="never" nodeType="tmRoot"/>
       </p:par>
     </p:tnLst>
   </p:timing>
@@ -18788,7 +18878,7 @@
   <p:timing>
     <p:tnLst>
       <p:par>
-        <p:cTn xmlns:p14="http://schemas.microsoft.com/office/powerpoint/2010/main" id="1" dur="indefinite" restart="never" nodeType="tmRoot"/>
+        <p:cTn id="1" dur="indefinite" restart="never" nodeType="tmRoot"/>
       </p:par>
     </p:tnLst>
   </p:timing>
@@ -18967,7 +19057,7 @@
   <p:timing>
     <p:tnLst>
       <p:par>
-        <p:cTn xmlns:p14="http://schemas.microsoft.com/office/powerpoint/2010/main" id="1" dur="indefinite" restart="never" nodeType="tmRoot"/>
+        <p:cTn id="1" dur="indefinite" restart="never" nodeType="tmRoot"/>
       </p:par>
     </p:tnLst>
   </p:timing>
@@ -19135,7 +19225,7 @@
   <p:timing>
     <p:tnLst>
       <p:par>
-        <p:cTn xmlns:p14="http://schemas.microsoft.com/office/powerpoint/2010/main" id="1" dur="indefinite" restart="never" nodeType="tmRoot"/>
+        <p:cTn id="1" dur="indefinite" restart="never" nodeType="tmRoot"/>
       </p:par>
     </p:tnLst>
   </p:timing>
@@ -19346,7 +19436,7 @@
   <p:timing>
     <p:tnLst>
       <p:par>
-        <p:cTn xmlns:p14="http://schemas.microsoft.com/office/powerpoint/2010/main" id="1" dur="indefinite" restart="never" nodeType="tmRoot"/>
+        <p:cTn id="1" dur="indefinite" restart="never" nodeType="tmRoot"/>
       </p:par>
     </p:tnLst>
   </p:timing>
@@ -19551,7 +19641,7 @@
   <p:timing>
     <p:tnLst>
       <p:par>
-        <p:cTn xmlns:p14="http://schemas.microsoft.com/office/powerpoint/2010/main" id="1" dur="indefinite" restart="never" nodeType="tmRoot"/>
+        <p:cTn id="1" dur="indefinite" restart="never" nodeType="tmRoot"/>
       </p:par>
     </p:tnLst>
   </p:timing>
@@ -19724,7 +19814,7 @@
   <p:timing>
     <p:tnLst>
       <p:par>
-        <p:cTn xmlns:p14="http://schemas.microsoft.com/office/powerpoint/2010/main" id="1" dur="indefinite" restart="never" nodeType="tmRoot"/>
+        <p:cTn id="1" dur="indefinite" restart="never" nodeType="tmRoot"/>
       </p:par>
     </p:tnLst>
   </p:timing>
@@ -19916,7 +20006,7 @@
   <p:timing>
     <p:tnLst>
       <p:par>
-        <p:cTn xmlns:p14="http://schemas.microsoft.com/office/powerpoint/2010/main" id="1" dur="indefinite" restart="never" nodeType="tmRoot"/>
+        <p:cTn id="1" dur="indefinite" restart="never" nodeType="tmRoot"/>
       </p:par>
     </p:tnLst>
   </p:timing>
@@ -20044,7 +20134,7 @@
   <p:timing>
     <p:tnLst>
       <p:par>
-        <p:cTn xmlns:p14="http://schemas.microsoft.com/office/powerpoint/2010/main" id="1" dur="indefinite" restart="never" nodeType="tmRoot"/>
+        <p:cTn id="1" dur="indefinite" restart="never" nodeType="tmRoot"/>
       </p:par>
     </p:tnLst>
   </p:timing>
@@ -20184,7 +20274,7 @@
   <p:timing>
     <p:tnLst>
       <p:par>
-        <p:cTn xmlns:p14="http://schemas.microsoft.com/office/powerpoint/2010/main" id="1" dur="indefinite" restart="never" nodeType="tmRoot"/>
+        <p:cTn id="1" dur="indefinite" restart="never" nodeType="tmRoot"/>
       </p:par>
     </p:tnLst>
   </p:timing>
@@ -20397,7 +20487,7 @@
   <p:timing>
     <p:tnLst>
       <p:par>
-        <p:cTn xmlns:p14="http://schemas.microsoft.com/office/powerpoint/2010/main" id="1" dur="indefinite" restart="never" nodeType="tmRoot"/>
+        <p:cTn id="1" dur="indefinite" restart="never" nodeType="tmRoot"/>
       </p:par>
     </p:tnLst>
   </p:timing>
@@ -20493,7 +20583,7 @@
   <p:timing>
     <p:tnLst>
       <p:par>
-        <p:cTn xmlns:p14="http://schemas.microsoft.com/office/powerpoint/2010/main" id="1" dur="indefinite" restart="never" nodeType="tmRoot"/>
+        <p:cTn id="1" dur="indefinite" restart="never" nodeType="tmRoot"/>
       </p:par>
     </p:tnLst>
   </p:timing>
@@ -20658,7 +20748,7 @@
         <p:spPr/>
         <p:txBody>
           <a:bodyPr>
-            <a:normAutofit fontScale="92500"/>
+            <a:normAutofit fontScale="92500" lnSpcReduction="10000"/>
           </a:bodyPr>
           <a:lstStyle/>
           <a:p>
@@ -20724,7 +20814,7 @@
   <p:timing>
     <p:tnLst>
       <p:par>
-        <p:cTn xmlns:p14="http://schemas.microsoft.com/office/powerpoint/2010/main" id="1" dur="indefinite" restart="never" nodeType="tmRoot"/>
+        <p:cTn id="1" dur="indefinite" restart="never" nodeType="tmRoot"/>
       </p:par>
     </p:tnLst>
   </p:timing>
@@ -20789,16 +20879,11 @@
               <a:rPr lang="en-US" i="1" dirty="0" smtClean="0"/>
               <a:t>RAID-1 will ½ network bandwidth as 2x network is used</a:t>
             </a:r>
-            <a:endParaRPr lang="en-US" i="1" dirty="0" smtClean="0"/>
-          </a:p>
-          <a:p>
-            <a:r>
-              <a:rPr lang="en-US" dirty="0" smtClean="0"/>
-              <a:t>Provision </a:t>
-            </a:r>
-            <a:r>
-              <a:rPr lang="en-US" dirty="0" smtClean="0"/>
-              <a:t>storage in minutes</a:t>
+          </a:p>
+          <a:p>
+            <a:r>
+              <a:rPr lang="en-US" dirty="0" smtClean="0"/>
+              <a:t>Provision storage in minutes</a:t>
             </a:r>
           </a:p>
           <a:p>
@@ -20817,13 +20902,8 @@
             <a:pPr lvl="1"/>
             <a:r>
               <a:rPr lang="en-US" dirty="0" smtClean="0"/>
-              <a:t>Tag EBS volumes with “Backup=true” then utilize a script to backup all matching EBS </a:t>
-            </a:r>
-            <a:r>
-              <a:rPr lang="en-US" dirty="0" smtClean="0"/>
-              <a:t>volumes</a:t>
-            </a:r>
-            <a:endParaRPr lang="en-US" dirty="0" smtClean="0"/>
+              <a:t>Tag EBS volumes with “Backup=true” then utilize a script to backup all matching EBS volumes</a:t>
+            </a:r>
           </a:p>
         </p:txBody>
       </p:sp>
@@ -20865,7 +20945,7 @@
   <p:timing>
     <p:tnLst>
       <p:par>
-        <p:cTn xmlns:p14="http://schemas.microsoft.com/office/powerpoint/2010/main" id="1" dur="indefinite" restart="never" nodeType="tmRoot"/>
+        <p:cTn id="1" dur="indefinite" restart="never" nodeType="tmRoot"/>
       </p:par>
     </p:tnLst>
   </p:timing>
@@ -20975,7 +21055,7 @@
   <p:timing>
     <p:tnLst>
       <p:par>
-        <p:cTn xmlns:p14="http://schemas.microsoft.com/office/powerpoint/2010/main" id="1" dur="indefinite" restart="never" nodeType="tmRoot"/>
+        <p:cTn id="1" dur="indefinite" restart="never" nodeType="tmRoot"/>
       </p:par>
     </p:tnLst>
   </p:timing>
@@ -21089,11 +21169,7 @@
           <a:p>
             <a:r>
               <a:rPr lang="en-US" dirty="0" smtClean="0"/>
-              <a:t>EBS: </a:t>
-            </a:r>
-            <a:r>
-              <a:rPr lang="en-US" dirty="0" smtClean="0"/>
-              <a:t>Snapshots</a:t>
+              <a:t>EBS: Snapshots</a:t>
             </a:r>
             <a:endParaRPr lang="en-US" dirty="0"/>
           </a:p>
@@ -21112,7 +21188,7 @@
   <p:timing>
     <p:tnLst>
       <p:par>
-        <p:cTn xmlns:p14="http://schemas.microsoft.com/office/powerpoint/2010/main" id="1" dur="indefinite" restart="never" nodeType="tmRoot"/>
+        <p:cTn id="1" dur="indefinite" restart="never" nodeType="tmRoot"/>
       </p:par>
     </p:tnLst>
   </p:timing>
@@ -21262,11 +21338,7 @@
           <a:p>
             <a:r>
               <a:rPr lang="en-US" dirty="0" smtClean="0"/>
-              <a:t>EBS and Instance </a:t>
-            </a:r>
-            <a:r>
-              <a:rPr lang="en-US" dirty="0" smtClean="0"/>
-              <a:t>Store:</a:t>
+              <a:t>EBS and Instance Store:</a:t>
             </a:r>
             <a:br>
               <a:rPr lang="en-US" dirty="0" smtClean="0"/>
@@ -21292,7 +21364,7 @@
   <p:timing>
     <p:tnLst>
       <p:par>
-        <p:cTn xmlns:p14="http://schemas.microsoft.com/office/powerpoint/2010/main" id="1" dur="indefinite" restart="never" nodeType="tmRoot"/>
+        <p:cTn id="1" dur="indefinite" restart="never" nodeType="tmRoot"/>
       </p:par>
     </p:tnLst>
   </p:timing>
@@ -21428,11 +21500,7 @@
             </a:r>
             <a:r>
               <a:rPr lang="en-US" dirty="0" smtClean="0"/>
-              <a:t>EC2 Instance Impac</a:t>
-            </a:r>
-            <a:r>
-              <a:rPr lang="en-US" dirty="0" smtClean="0"/>
-              <a:t>t on Performance</a:t>
+              <a:t>EC2 Instance Impact on Performance</a:t>
             </a:r>
             <a:endParaRPr lang="en-US" dirty="0"/>
           </a:p>
@@ -21451,7 +21519,7 @@
   <p:timing>
     <p:tnLst>
       <p:par>
-        <p:cTn xmlns:p14="http://schemas.microsoft.com/office/powerpoint/2010/main" id="1" dur="indefinite" restart="never" nodeType="tmRoot"/>
+        <p:cTn id="1" dur="indefinite" restart="never" nodeType="tmRoot"/>
       </p:par>
     </p:tnLst>
   </p:timing>
@@ -21613,7 +21681,7 @@
   <p:timing>
     <p:tnLst>
       <p:par>
-        <p:cTn xmlns:p14="http://schemas.microsoft.com/office/powerpoint/2010/main" id="1" dur="indefinite" restart="never" nodeType="tmRoot"/>
+        <p:cTn id="1" dur="indefinite" restart="never" nodeType="tmRoot"/>
       </p:par>
     </p:tnLst>
   </p:timing>
@@ -21744,7 +21812,7 @@
   <p:timing>
     <p:tnLst>
       <p:par>
-        <p:cTn xmlns:p14="http://schemas.microsoft.com/office/powerpoint/2010/main" id="1" dur="indefinite" restart="never" nodeType="tmRoot"/>
+        <p:cTn id="1" dur="indefinite" restart="never" nodeType="tmRoot"/>
       </p:par>
     </p:tnLst>
   </p:timing>
@@ -21865,7 +21933,7 @@
   <p:timing>
     <p:tnLst>
       <p:par>
-        <p:cTn xmlns:p14="http://schemas.microsoft.com/office/powerpoint/2010/main" id="1" dur="indefinite" restart="never" nodeType="tmRoot"/>
+        <p:cTn id="1" dur="indefinite" restart="never" nodeType="tmRoot"/>
       </p:par>
     </p:tnLst>
   </p:timing>
@@ -21977,7 +22045,15 @@
           <a:p>
             <a:r>
               <a:rPr lang="en-US" dirty="0" smtClean="0"/>
-              <a:t>EBS: Magnetics</a:t>
+              <a:t>EBS</a:t>
+            </a:r>
+            <a:r>
+              <a:rPr lang="en-US" smtClean="0"/>
+              <a:t>: </a:t>
+            </a:r>
+            <a:r>
+              <a:rPr lang="en-US" smtClean="0"/>
+              <a:t>Magnetic</a:t>
             </a:r>
             <a:endParaRPr lang="en-US" dirty="0"/>
           </a:p>
@@ -21996,7 +22072,7 @@
   <p:timing>
     <p:tnLst>
       <p:par>
-        <p:cTn xmlns:p14="http://schemas.microsoft.com/office/powerpoint/2010/main" id="1" dur="indefinite" restart="never" nodeType="tmRoot"/>
+        <p:cTn id="1" dur="indefinite" restart="never" nodeType="tmRoot"/>
       </p:par>
     </p:tnLst>
   </p:timing>
@@ -22126,7 +22202,7 @@
   <p:timing>
     <p:tnLst>
       <p:par>
-        <p:cTn xmlns:p14="http://schemas.microsoft.com/office/powerpoint/2010/main" id="1" dur="indefinite" restart="never" nodeType="tmRoot"/>
+        <p:cTn id="1" dur="indefinite" restart="never" nodeType="tmRoot"/>
       </p:par>
     </p:tnLst>
   </p:timing>
@@ -22229,7 +22305,7 @@
   <p:timing>
     <p:tnLst>
       <p:par>
-        <p:cTn xmlns:p14="http://schemas.microsoft.com/office/powerpoint/2010/main" id="1" dur="indefinite" restart="never" nodeType="tmRoot"/>
+        <p:cTn id="1" dur="indefinite" restart="never" nodeType="tmRoot"/>
       </p:par>
     </p:tnLst>
   </p:timing>
@@ -22364,7 +22440,7 @@
   <p:timing>
     <p:tnLst>
       <p:par>
-        <p:cTn xmlns:p14="http://schemas.microsoft.com/office/powerpoint/2010/main" id="1" dur="indefinite" restart="never" nodeType="tmRoot"/>
+        <p:cTn id="1" dur="indefinite" restart="never" nodeType="tmRoot"/>
       </p:par>
     </p:tnLst>
   </p:timing>
@@ -22456,7 +22532,7 @@
   <p:timing>
     <p:tnLst>
       <p:par>
-        <p:cTn xmlns:p14="http://schemas.microsoft.com/office/powerpoint/2010/main" id="1" dur="indefinite" restart="never" nodeType="tmRoot"/>
+        <p:cTn id="1" dur="indefinite" restart="never" nodeType="tmRoot"/>
       </p:par>
     </p:tnLst>
   </p:timing>
@@ -22708,7 +22784,7 @@
   <p:timing>
     <p:tnLst>
       <p:par>
-        <p:cTn xmlns:p14="http://schemas.microsoft.com/office/powerpoint/2010/main" id="1" dur="indefinite" restart="never" nodeType="tmRoot"/>
+        <p:cTn id="1" dur="indefinite" restart="never" nodeType="tmRoot"/>
       </p:par>
     </p:tnLst>
   </p:timing>
@@ -22875,7 +22951,7 @@
   <p:timing>
     <p:tnLst>
       <p:par>
-        <p:cTn xmlns:p14="http://schemas.microsoft.com/office/powerpoint/2010/main" id="1" dur="indefinite" restart="never" nodeType="tmRoot"/>
+        <p:cTn id="1" dur="indefinite" restart="never" nodeType="tmRoot"/>
       </p:par>
     </p:tnLst>
   </p:timing>
@@ -22969,7 +23045,7 @@
   <p:timing>
     <p:tnLst>
       <p:par>
-        <p:cTn xmlns:p14="http://schemas.microsoft.com/office/powerpoint/2010/main" id="1" dur="indefinite" restart="never" nodeType="tmRoot"/>
+        <p:cTn id="1" dur="indefinite" restart="never" nodeType="tmRoot"/>
       </p:par>
     </p:tnLst>
   </p:timing>

</xml_diff>

<commit_message>
move security group intro to after ec2 intro
</commit_message>
<xml_diff>
--- a/aws-ec2/aws-ec2.pptx
+++ b/aws-ec2/aws-ec2.pptx
@@ -10,17 +10,17 @@
   <p:sldIdLst>
     <p:sldId id="256" r:id="rId2"/>
     <p:sldId id="258" r:id="rId3"/>
-    <p:sldId id="294" r:id="rId4"/>
-    <p:sldId id="296" r:id="rId5"/>
-    <p:sldId id="302" r:id="rId6"/>
-    <p:sldId id="295" r:id="rId7"/>
-    <p:sldId id="297" r:id="rId8"/>
-    <p:sldId id="277" r:id="rId9"/>
-    <p:sldId id="278" r:id="rId10"/>
-    <p:sldId id="287" r:id="rId11"/>
-    <p:sldId id="288" r:id="rId12"/>
-    <p:sldId id="289" r:id="rId13"/>
-    <p:sldId id="279" r:id="rId14"/>
+    <p:sldId id="277" r:id="rId4"/>
+    <p:sldId id="278" r:id="rId5"/>
+    <p:sldId id="287" r:id="rId6"/>
+    <p:sldId id="288" r:id="rId7"/>
+    <p:sldId id="289" r:id="rId8"/>
+    <p:sldId id="279" r:id="rId9"/>
+    <p:sldId id="294" r:id="rId10"/>
+    <p:sldId id="296" r:id="rId11"/>
+    <p:sldId id="302" r:id="rId12"/>
+    <p:sldId id="295" r:id="rId13"/>
+    <p:sldId id="297" r:id="rId14"/>
   </p:sldIdLst>
   <p:sldSz cx="9144000" cy="6858000" type="screen4x3"/>
   <p:notesSz cx="6858000" cy="9144000"/>
@@ -220,7 +220,7 @@
           <a:p>
             <a:fld id="{1B6676A5-1300-B945-98B1-DD92DDC3A3CB}" type="datetimeFigureOut">
               <a:rPr lang="en-US" smtClean="0"/>
-              <a:t>12/1/15</a:t>
+              <a:t>12/2/15</a:t>
             </a:fld>
             <a:endParaRPr lang="en-US"/>
           </a:p>
@@ -532,100 +532,83 @@
           <a:bodyPr/>
           <a:lstStyle/>
           <a:p>
-            <a:pPr marL="0" marR="0" indent="0" algn="l" defTabSz="457200" rtl="0" eaLnBrk="1" fontAlgn="auto" latinLnBrk="0" hangingPunct="1">
-              <a:lnSpc>
-                <a:spcPct val="100000"/>
-              </a:lnSpc>
-              <a:spcBef>
-                <a:spcPts val="0"/>
-              </a:spcBef>
-              <a:spcAft>
-                <a:spcPts val="0"/>
-              </a:spcAft>
-              <a:buClrTx/>
-              <a:buSzTx/>
-              <a:buFontTx/>
+            <a:r>
+              <a:rPr lang="en-US" dirty="0" smtClean="0"/>
+              <a:t>Backed by:</a:t>
+            </a:r>
+          </a:p>
+          <a:p>
+            <a:pPr marL="171450" indent="-171450">
+              <a:buFont typeface="Arial"/>
+              <a:buChar char="•"/>
+            </a:pPr>
+            <a:r>
+              <a:rPr lang="en-US" dirty="0" smtClean="0"/>
+              <a:t>EBS: also known as “persistent storage”</a:t>
+            </a:r>
+          </a:p>
+          <a:p>
+            <a:pPr marL="171450" indent="-171450">
+              <a:buFont typeface="Arial"/>
+              <a:buChar char="•"/>
+            </a:pPr>
+            <a:r>
+              <a:rPr lang="en-US" dirty="0" smtClean="0"/>
+              <a:t>Instance Store: also</a:t>
+            </a:r>
+            <a:r>
+              <a:rPr lang="en-US" baseline="0" dirty="0" smtClean="0"/>
+              <a:t> known as “ephemeral storage”</a:t>
+            </a:r>
+            <a:endParaRPr lang="en-US" dirty="0" smtClean="0"/>
+          </a:p>
+          <a:p>
+            <a:pPr marL="0" indent="0">
+              <a:buFont typeface="Arial"/>
               <a:buNone/>
-              <a:tabLst/>
-              <a:defRPr/>
-            </a:pPr>
-            <a:r>
-              <a:rPr lang="en-US" dirty="0" err="1" smtClean="0"/>
-              <a:t>Stateful</a:t>
-            </a:r>
-            <a:r>
-              <a:rPr lang="en-US" baseline="0" dirty="0" smtClean="0"/>
-              <a:t> versus Stateless: a </a:t>
-            </a:r>
-            <a:r>
-              <a:rPr lang="en-US" baseline="0" dirty="0" err="1" smtClean="0"/>
-              <a:t>stateful</a:t>
-            </a:r>
-            <a:r>
-              <a:rPr lang="en-US" baseline="0" dirty="0" smtClean="0"/>
-              <a:t> firewall allows return traffic from a host initiated outbound connection</a:t>
-            </a:r>
-          </a:p>
-          <a:p>
-            <a:pPr marL="0" marR="0" indent="0" algn="l" defTabSz="457200" rtl="0" eaLnBrk="1" fontAlgn="auto" latinLnBrk="0" hangingPunct="1">
-              <a:lnSpc>
-                <a:spcPct val="100000"/>
-              </a:lnSpc>
-              <a:spcBef>
-                <a:spcPts val="0"/>
-              </a:spcBef>
-              <a:spcAft>
-                <a:spcPts val="0"/>
-              </a:spcAft>
-              <a:buClrTx/>
-              <a:buSzTx/>
-              <a:buFontTx/>
-              <a:buNone/>
-              <a:tabLst/>
-              <a:defRPr/>
             </a:pPr>
             <a:endParaRPr lang="en-US" dirty="0" smtClean="0"/>
           </a:p>
           <a:p>
+            <a:pPr marL="0" indent="0">
+              <a:buFont typeface="Arial"/>
+              <a:buNone/>
+            </a:pPr>
+            <a:r>
+              <a:rPr lang="en-US" dirty="0" smtClean="0"/>
+              <a:t>References:</a:t>
+            </a:r>
+          </a:p>
+          <a:p>
             <a:pPr marL="171450" indent="-171450">
-              <a:buFont typeface="Arial" charset="0"/>
+              <a:buFont typeface="Arial"/>
               <a:buChar char="•"/>
             </a:pPr>
             <a:r>
               <a:rPr lang="en-US" dirty="0" smtClean="0"/>
-              <a:t>Security Groups are the “near” equivalent</a:t>
-            </a:r>
-            <a:r>
-              <a:rPr lang="en-US" baseline="0" dirty="0" smtClean="0"/>
-              <a:t> of a </a:t>
-            </a:r>
-            <a:r>
-              <a:rPr lang="en-US" baseline="0" dirty="0" err="1" smtClean="0"/>
-              <a:t>stateful</a:t>
-            </a:r>
-            <a:r>
-              <a:rPr lang="en-US" baseline="0" dirty="0" smtClean="0"/>
-              <a:t> firewall:</a:t>
-            </a:r>
-          </a:p>
-          <a:p>
-            <a:pPr marL="628650" lvl="1" indent="-171450">
-              <a:buFont typeface="Arial" charset="0"/>
-              <a:buChar char="•"/>
-            </a:pPr>
+              <a:t>http://</a:t>
+            </a:r>
+            <a:r>
+              <a:rPr lang="en-US" dirty="0" err="1" smtClean="0"/>
+              <a:t>docs.aws.amazon.com</a:t>
+            </a:r>
             <a:r>
               <a:rPr lang="en-US" dirty="0" smtClean="0"/>
-              <a:t>Security</a:t>
-            </a:r>
-            <a:r>
-              <a:rPr lang="en-US" baseline="0" dirty="0" smtClean="0"/>
-              <a:t> Groups are </a:t>
-            </a:r>
-            <a:r>
-              <a:rPr lang="en-US" baseline="0" dirty="0" err="1" smtClean="0"/>
-              <a:t>stateful</a:t>
-            </a:r>
-            <a:endParaRPr lang="en-US" baseline="0" dirty="0" smtClean="0"/>
+              <a:t>/AWSEC2/latest/</a:t>
+            </a:r>
+            <a:r>
+              <a:rPr lang="en-US" dirty="0" err="1" smtClean="0"/>
+              <a:t>UserGuide</a:t>
+            </a:r>
+            <a:r>
+              <a:rPr lang="en-US" dirty="0" smtClean="0"/>
+              <a:t>/user-</a:t>
+            </a:r>
+            <a:r>
+              <a:rPr lang="en-US" dirty="0" err="1" smtClean="0"/>
+              <a:t>data.html</a:t>
+            </a:r>
+            <a:endParaRPr lang="en-US" dirty="0" smtClean="0"/>
           </a:p>
         </p:txBody>
       </p:sp>
@@ -799,35 +782,49 @@
             </a:pPr>
             <a:r>
               <a:rPr lang="en-US" dirty="0" smtClean="0"/>
-              <a:t>HVM vs. </a:t>
-            </a:r>
-            <a:r>
-              <a:rPr lang="en-US" dirty="0" err="1" smtClean="0"/>
-              <a:t>Paravirtual</a:t>
-            </a:r>
+              <a:t>Create</a:t>
+            </a:r>
+            <a:r>
+              <a:rPr lang="en-US" baseline="0" dirty="0" smtClean="0"/>
+              <a:t> one Security Group per Application / Environment: one customer I’ve worked with utilizes over 80 security groups. Not a problem.</a:t>
+            </a:r>
+          </a:p>
+          <a:p>
+            <a:pPr marL="171450" indent="-171450">
+              <a:buFont typeface="Arial"/>
+              <a:buChar char="•"/>
+            </a:pPr>
             <a:r>
               <a:rPr lang="en-US" dirty="0" smtClean="0"/>
-              <a:t>: http://</a:t>
-            </a:r>
-            <a:r>
-              <a:rPr lang="en-US" dirty="0" err="1" smtClean="0"/>
-              <a:t>docs.aws.amazon.com</a:t>
-            </a:r>
-            <a:r>
-              <a:rPr lang="en-US" dirty="0" smtClean="0"/>
-              <a:t>/AWSEC2/latest/</a:t>
-            </a:r>
-            <a:r>
-              <a:rPr lang="en-US" dirty="0" err="1" smtClean="0"/>
-              <a:t>UserGuide</a:t>
-            </a:r>
-            <a:r>
-              <a:rPr lang="en-US" dirty="0" smtClean="0"/>
-              <a:t>/</a:t>
-            </a:r>
-            <a:r>
-              <a:rPr lang="en-US" dirty="0" err="1" smtClean="0"/>
-              <a:t>virtualization_types.html</a:t>
+              <a:t>Create one “Base” Security</a:t>
+            </a:r>
+            <a:r>
+              <a:rPr lang="en-US" baseline="0" dirty="0" smtClean="0"/>
+              <a:t> Group: if you do allow access from an IP, you can change en masse</a:t>
+            </a:r>
+          </a:p>
+          <a:p>
+            <a:pPr marL="171450" indent="-171450">
+              <a:buFont typeface="Arial"/>
+              <a:buChar char="•"/>
+            </a:pPr>
+            <a:r>
+              <a:rPr lang="en-US" i="0" baseline="0" dirty="0" smtClean="0">
+                <a:solidFill>
+                  <a:srgbClr val="FF0000"/>
+                </a:solidFill>
+              </a:rPr>
+              <a:t>Security Group Names are not Unique (try this for yourself)</a:t>
+            </a:r>
+          </a:p>
+          <a:p>
+            <a:pPr marL="171450" indent="-171450">
+              <a:buFont typeface="Arial"/>
+              <a:buChar char="•"/>
+            </a:pPr>
+            <a:r>
+              <a:rPr lang="en-US" baseline="0" dirty="0" smtClean="0"/>
+              <a:t>“Sharing” a Security Group between resources creates a situation where one change can have unintended consequences </a:t>
             </a:r>
             <a:endParaRPr lang="en-US" dirty="0"/>
           </a:p>
@@ -913,11 +910,45 @@
           <a:bodyPr/>
           <a:lstStyle/>
           <a:p>
-            <a:pPr marL="0" indent="0">
+            <a:r>
+              <a:rPr lang="en-US" dirty="0" smtClean="0"/>
+              <a:t>Reporting</a:t>
+            </a:r>
+            <a:r>
+              <a:rPr lang="en-US" baseline="0" dirty="0" smtClean="0"/>
+              <a:t> of disk usage and memory: available through either:</a:t>
+            </a:r>
+          </a:p>
+          <a:p>
+            <a:pPr marL="171450" indent="-171450">
               <a:buFont typeface="Arial"/>
-              <a:buNone/>
+              <a:buChar char="•"/>
             </a:pPr>
-            <a:endParaRPr lang="en-US" dirty="0"/>
+            <a:r>
+              <a:rPr lang="en-US" baseline="0" dirty="0" smtClean="0"/>
+              <a:t>http://</a:t>
+            </a:r>
+            <a:r>
+              <a:rPr lang="en-US" baseline="0" dirty="0" err="1" smtClean="0"/>
+              <a:t>docs.aws.amazon.com</a:t>
+            </a:r>
+            <a:r>
+              <a:rPr lang="en-US" baseline="0" dirty="0" smtClean="0"/>
+              <a:t>/AWSEC2/latest/</a:t>
+            </a:r>
+            <a:r>
+              <a:rPr lang="en-US" baseline="0" dirty="0" err="1" smtClean="0"/>
+              <a:t>UserGuide</a:t>
+            </a:r>
+            <a:r>
+              <a:rPr lang="en-US" baseline="0" dirty="0" smtClean="0"/>
+              <a:t>/</a:t>
+            </a:r>
+            <a:r>
+              <a:rPr lang="en-US" baseline="0" dirty="0" err="1" smtClean="0"/>
+              <a:t>mon-scripts.html</a:t>
+            </a:r>
+            <a:endParaRPr lang="en-US" baseline="0" dirty="0" smtClean="0"/>
           </a:p>
         </p:txBody>
       </p:sp>
@@ -1001,87 +1032,6 @@
           <a:bodyPr/>
           <a:lstStyle/>
           <a:p>
-            <a:pPr marL="171450" indent="-171450">
-              <a:buFont typeface="Arial"/>
-              <a:buChar char="•"/>
-            </a:pPr>
-            <a:r>
-              <a:rPr lang="en-US" dirty="0" smtClean="0"/>
-              <a:t>Duplicate</a:t>
-            </a:r>
-            <a:r>
-              <a:rPr lang="en-US" baseline="0" dirty="0" smtClean="0"/>
-              <a:t> Naming Problem: we had created a tool that referenced security groups by names when deleting them. This caused a problem.</a:t>
-            </a:r>
-            <a:endParaRPr lang="en-US" dirty="0" smtClean="0"/>
-          </a:p>
-          <a:p>
-            <a:pPr marL="171450" indent="-171450">
-              <a:buFont typeface="Arial"/>
-              <a:buChar char="•"/>
-            </a:pPr>
-            <a:r>
-              <a:rPr lang="en-US" dirty="0" smtClean="0"/>
-              <a:t>Dependency Problems: for example,</a:t>
-            </a:r>
-            <a:r>
-              <a:rPr lang="en-US" baseline="0" dirty="0" smtClean="0"/>
-              <a:t> you are creating a database server Security Group and an </a:t>
-            </a:r>
-            <a:r>
-              <a:rPr lang="en-US" baseline="0" dirty="0" err="1" smtClean="0"/>
-              <a:t>api</a:t>
-            </a:r>
-            <a:r>
-              <a:rPr lang="en-US" baseline="0" dirty="0" smtClean="0"/>
-              <a:t> server Security Group using an automated tool. The database server Security Group allows in </a:t>
-            </a:r>
-            <a:r>
-              <a:rPr lang="en-US" baseline="0" dirty="0" err="1" smtClean="0"/>
-              <a:t>api</a:t>
-            </a:r>
-            <a:r>
-              <a:rPr lang="en-US" baseline="0" dirty="0" smtClean="0"/>
-              <a:t> server Security Group on port 3306. Therefore, the </a:t>
-            </a:r>
-            <a:r>
-              <a:rPr lang="en-US" baseline="0" dirty="0" err="1" smtClean="0"/>
-              <a:t>api</a:t>
-            </a:r>
-            <a:r>
-              <a:rPr lang="en-US" baseline="0" dirty="0" smtClean="0"/>
-              <a:t> server Security Group must already exist in order to complete rule creation for the database server security group.</a:t>
-            </a:r>
-          </a:p>
-          <a:p>
-            <a:pPr marL="171450" marR="0" indent="-171450" algn="l" defTabSz="457200" rtl="0" eaLnBrk="1" fontAlgn="auto" latinLnBrk="0" hangingPunct="1">
-              <a:lnSpc>
-                <a:spcPct val="100000"/>
-              </a:lnSpc>
-              <a:spcBef>
-                <a:spcPts val="0"/>
-              </a:spcBef>
-              <a:spcAft>
-                <a:spcPts val="0"/>
-              </a:spcAft>
-              <a:buClrTx/>
-              <a:buSzTx/>
-              <a:buFont typeface="Arial"/>
-              <a:buChar char="•"/>
-              <a:tabLst/>
-              <a:defRPr/>
-            </a:pPr>
-            <a:r>
-              <a:rPr lang="en-US" baseline="0" dirty="0" smtClean="0"/>
-              <a:t>Deep Packet Inspection: Deep Packet Inspection allows the examination of either packet header or packet data in addition to IP Source / Destination Addresses and UDP/TCP Source Destination Ports</a:t>
-            </a:r>
-            <a:endParaRPr lang="en-US" dirty="0" smtClean="0"/>
-          </a:p>
-          <a:p>
-            <a:pPr marL="0" indent="0">
-              <a:buFont typeface="Arial"/>
-              <a:buNone/>
-            </a:pPr>
             <a:endParaRPr lang="en-US" dirty="0"/>
           </a:p>
         </p:txBody>
@@ -1250,56 +1200,6 @@
           <a:bodyPr/>
           <a:lstStyle/>
           <a:p>
-            <a:pPr marL="171450" indent="-171450">
-              <a:buFont typeface="Arial"/>
-              <a:buChar char="•"/>
-            </a:pPr>
-            <a:r>
-              <a:rPr lang="en-US" dirty="0" smtClean="0"/>
-              <a:t>Create</a:t>
-            </a:r>
-            <a:r>
-              <a:rPr lang="en-US" baseline="0" dirty="0" smtClean="0"/>
-              <a:t> one Security Group per Application / Environment: one customer I’ve worked with utilizes over 80 security groups. Not a problem.</a:t>
-            </a:r>
-          </a:p>
-          <a:p>
-            <a:pPr marL="171450" indent="-171450">
-              <a:buFont typeface="Arial"/>
-              <a:buChar char="•"/>
-            </a:pPr>
-            <a:r>
-              <a:rPr lang="en-US" dirty="0" smtClean="0"/>
-              <a:t>Create one “Base” Security</a:t>
-            </a:r>
-            <a:r>
-              <a:rPr lang="en-US" baseline="0" dirty="0" smtClean="0"/>
-              <a:t> Group: if you do allow access from an IP, you can change en masse</a:t>
-            </a:r>
-          </a:p>
-          <a:p>
-            <a:pPr marL="171450" indent="-171450">
-              <a:buFont typeface="Arial"/>
-              <a:buChar char="•"/>
-            </a:pPr>
-            <a:r>
-              <a:rPr lang="en-US" i="0" baseline="0" dirty="0" smtClean="0">
-                <a:solidFill>
-                  <a:srgbClr val="FF0000"/>
-                </a:solidFill>
-              </a:rPr>
-              <a:t>Security Group Names are not Unique (try this for yourself)</a:t>
-            </a:r>
-          </a:p>
-          <a:p>
-            <a:pPr marL="171450" indent="-171450">
-              <a:buFont typeface="Arial"/>
-              <a:buChar char="•"/>
-            </a:pPr>
-            <a:r>
-              <a:rPr lang="en-US" baseline="0" dirty="0" smtClean="0"/>
-              <a:t>“Sharing” a Security Group between resources creates a situation where one change can have unintended consequences </a:t>
-            </a:r>
             <a:endParaRPr lang="en-US" dirty="0"/>
           </a:p>
         </p:txBody>
@@ -1384,61 +1284,21 @@
           <a:bodyPr/>
           <a:lstStyle/>
           <a:p>
-            <a:r>
-              <a:rPr lang="en-US" dirty="0" smtClean="0"/>
-              <a:t>Backed by:</a:t>
-            </a:r>
-          </a:p>
-          <a:p>
             <a:pPr marL="171450" indent="-171450">
               <a:buFont typeface="Arial"/>
               <a:buChar char="•"/>
             </a:pPr>
             <a:r>
               <a:rPr lang="en-US" dirty="0" smtClean="0"/>
-              <a:t>EBS: also known as “persistent storage”</a:t>
-            </a:r>
-          </a:p>
-          <a:p>
-            <a:pPr marL="171450" indent="-171450">
-              <a:buFont typeface="Arial"/>
-              <a:buChar char="•"/>
-            </a:pPr>
+              <a:t>HVM vs. </a:t>
+            </a:r>
+            <a:r>
+              <a:rPr lang="en-US" dirty="0" err="1" smtClean="0"/>
+              <a:t>Paravirtual</a:t>
+            </a:r>
             <a:r>
               <a:rPr lang="en-US" dirty="0" smtClean="0"/>
-              <a:t>Instance Store: also</a:t>
-            </a:r>
-            <a:r>
-              <a:rPr lang="en-US" baseline="0" dirty="0" smtClean="0"/>
-              <a:t> known as “ephemeral storage”</a:t>
-            </a:r>
-            <a:endParaRPr lang="en-US" dirty="0" smtClean="0"/>
-          </a:p>
-          <a:p>
-            <a:pPr marL="0" indent="0">
-              <a:buFont typeface="Arial"/>
-              <a:buNone/>
-            </a:pPr>
-            <a:endParaRPr lang="en-US" dirty="0" smtClean="0"/>
-          </a:p>
-          <a:p>
-            <a:pPr marL="0" indent="0">
-              <a:buFont typeface="Arial"/>
-              <a:buNone/>
-            </a:pPr>
-            <a:r>
-              <a:rPr lang="en-US" dirty="0" smtClean="0"/>
-              <a:t>References:</a:t>
-            </a:r>
-          </a:p>
-          <a:p>
-            <a:pPr marL="171450" indent="-171450">
-              <a:buFont typeface="Arial"/>
-              <a:buChar char="•"/>
-            </a:pPr>
-            <a:r>
-              <a:rPr lang="en-US" dirty="0" smtClean="0"/>
-              <a:t>http://</a:t>
+              <a:t>: http://</a:t>
             </a:r>
             <a:r>
               <a:rPr lang="en-US" dirty="0" err="1" smtClean="0"/>
@@ -1454,13 +1314,13 @@
             </a:r>
             <a:r>
               <a:rPr lang="en-US" dirty="0" smtClean="0"/>
-              <a:t>/user-</a:t>
+              <a:t>/</a:t>
             </a:r>
             <a:r>
               <a:rPr lang="en-US" dirty="0" err="1" smtClean="0"/>
-              <a:t>data.html</a:t>
-            </a:r>
-            <a:endParaRPr lang="en-US" dirty="0" smtClean="0"/>
+              <a:t>virtualization_types.html</a:t>
+            </a:r>
+            <a:endParaRPr lang="en-US" dirty="0"/>
           </a:p>
         </p:txBody>
       </p:sp>
@@ -1544,43 +1404,98 @@
           <a:bodyPr/>
           <a:lstStyle/>
           <a:p>
-            <a:r>
-              <a:rPr lang="en-US" dirty="0" smtClean="0"/>
-              <a:t>Reporting</a:t>
+            <a:pPr marL="0" marR="0" indent="0" algn="l" defTabSz="457200" rtl="0" eaLnBrk="1" fontAlgn="auto" latinLnBrk="0" hangingPunct="1">
+              <a:lnSpc>
+                <a:spcPct val="100000"/>
+              </a:lnSpc>
+              <a:spcBef>
+                <a:spcPts val="0"/>
+              </a:spcBef>
+              <a:spcAft>
+                <a:spcPts val="0"/>
+              </a:spcAft>
+              <a:buClrTx/>
+              <a:buSzTx/>
+              <a:buFontTx/>
+              <a:buNone/>
+              <a:tabLst/>
+              <a:defRPr/>
+            </a:pPr>
+            <a:r>
+              <a:rPr lang="en-US" dirty="0" err="1" smtClean="0"/>
+              <a:t>Stateful</a:t>
             </a:r>
             <a:r>
               <a:rPr lang="en-US" baseline="0" dirty="0" smtClean="0"/>
-              <a:t> of disk usage and memory: available through either:</a:t>
-            </a:r>
+              <a:t> versus Stateless: a </a:t>
+            </a:r>
+            <a:r>
+              <a:rPr lang="en-US" baseline="0" dirty="0" err="1" smtClean="0"/>
+              <a:t>stateful</a:t>
+            </a:r>
+            <a:r>
+              <a:rPr lang="en-US" baseline="0" dirty="0" smtClean="0"/>
+              <a:t> firewall allows return traffic from a host initiated outbound connection</a:t>
+            </a:r>
+          </a:p>
+          <a:p>
+            <a:pPr marL="0" marR="0" indent="0" algn="l" defTabSz="457200" rtl="0" eaLnBrk="1" fontAlgn="auto" latinLnBrk="0" hangingPunct="1">
+              <a:lnSpc>
+                <a:spcPct val="100000"/>
+              </a:lnSpc>
+              <a:spcBef>
+                <a:spcPts val="0"/>
+              </a:spcBef>
+              <a:spcAft>
+                <a:spcPts val="0"/>
+              </a:spcAft>
+              <a:buClrTx/>
+              <a:buSzTx/>
+              <a:buFontTx/>
+              <a:buNone/>
+              <a:tabLst/>
+              <a:defRPr/>
+            </a:pPr>
+            <a:endParaRPr lang="en-US" dirty="0" smtClean="0"/>
           </a:p>
           <a:p>
             <a:pPr marL="171450" indent="-171450">
-              <a:buFont typeface="Arial"/>
+              <a:buFont typeface="Arial" charset="0"/>
               <a:buChar char="•"/>
             </a:pPr>
             <a:r>
+              <a:rPr lang="en-US" dirty="0" smtClean="0"/>
+              <a:t>Security Groups are the “near” equivalent</a:t>
+            </a:r>
+            <a:r>
               <a:rPr lang="en-US" baseline="0" dirty="0" smtClean="0"/>
-              <a:t>http://</a:t>
+              <a:t> of a </a:t>
             </a:r>
             <a:r>
               <a:rPr lang="en-US" baseline="0" dirty="0" err="1" smtClean="0"/>
-              <a:t>docs.aws.amazon.com</a:t>
+              <a:t>stateful</a:t>
             </a:r>
             <a:r>
               <a:rPr lang="en-US" baseline="0" dirty="0" smtClean="0"/>
-              <a:t>/AWSEC2/latest/</a:t>
+              <a:t> firewall:</a:t>
+            </a:r>
+          </a:p>
+          <a:p>
+            <a:pPr marL="628650" lvl="1" indent="-171450">
+              <a:buFont typeface="Arial" charset="0"/>
+              <a:buChar char="•"/>
+            </a:pPr>
+            <a:r>
+              <a:rPr lang="en-US" dirty="0" smtClean="0"/>
+              <a:t>Security</a:t>
+            </a:r>
+            <a:r>
+              <a:rPr lang="en-US" baseline="0" dirty="0" smtClean="0"/>
+              <a:t> Groups are </a:t>
             </a:r>
             <a:r>
               <a:rPr lang="en-US" baseline="0" dirty="0" err="1" smtClean="0"/>
-              <a:t>UserGuide</a:t>
-            </a:r>
-            <a:r>
-              <a:rPr lang="en-US" baseline="0" dirty="0" smtClean="0"/>
-              <a:t>/</a:t>
-            </a:r>
-            <a:r>
-              <a:rPr lang="en-US" baseline="0" dirty="0" err="1" smtClean="0"/>
-              <a:t>mon-scripts.html</a:t>
+              <a:t>stateful</a:t>
             </a:r>
             <a:endParaRPr lang="en-US" baseline="0" dirty="0" smtClean="0"/>
           </a:p>
@@ -1666,6 +1581,10 @@
           <a:bodyPr/>
           <a:lstStyle/>
           <a:p>
+            <a:pPr marL="0" indent="0">
+              <a:buFont typeface="Arial"/>
+              <a:buNone/>
+            </a:pPr>
             <a:endParaRPr lang="en-US" dirty="0"/>
           </a:p>
         </p:txBody>
@@ -1750,6 +1669,87 @@
           <a:bodyPr/>
           <a:lstStyle/>
           <a:p>
+            <a:pPr marL="171450" indent="-171450">
+              <a:buFont typeface="Arial"/>
+              <a:buChar char="•"/>
+            </a:pPr>
+            <a:r>
+              <a:rPr lang="en-US" dirty="0" smtClean="0"/>
+              <a:t>Duplicate</a:t>
+            </a:r>
+            <a:r>
+              <a:rPr lang="en-US" baseline="0" dirty="0" smtClean="0"/>
+              <a:t> Naming Problem: we had created a tool that referenced security groups by names when deleting them. This caused a problem.</a:t>
+            </a:r>
+            <a:endParaRPr lang="en-US" dirty="0" smtClean="0"/>
+          </a:p>
+          <a:p>
+            <a:pPr marL="171450" indent="-171450">
+              <a:buFont typeface="Arial"/>
+              <a:buChar char="•"/>
+            </a:pPr>
+            <a:r>
+              <a:rPr lang="en-US" dirty="0" smtClean="0"/>
+              <a:t>Dependency Problems: for example,</a:t>
+            </a:r>
+            <a:r>
+              <a:rPr lang="en-US" baseline="0" dirty="0" smtClean="0"/>
+              <a:t> you are creating a database server Security Group and an </a:t>
+            </a:r>
+            <a:r>
+              <a:rPr lang="en-US" baseline="0" dirty="0" err="1" smtClean="0"/>
+              <a:t>api</a:t>
+            </a:r>
+            <a:r>
+              <a:rPr lang="en-US" baseline="0" dirty="0" smtClean="0"/>
+              <a:t> server Security Group using an automated tool. The database server Security Group allows in </a:t>
+            </a:r>
+            <a:r>
+              <a:rPr lang="en-US" baseline="0" dirty="0" err="1" smtClean="0"/>
+              <a:t>api</a:t>
+            </a:r>
+            <a:r>
+              <a:rPr lang="en-US" baseline="0" dirty="0" smtClean="0"/>
+              <a:t> server Security Group on port 3306. Therefore, the </a:t>
+            </a:r>
+            <a:r>
+              <a:rPr lang="en-US" baseline="0" dirty="0" err="1" smtClean="0"/>
+              <a:t>api</a:t>
+            </a:r>
+            <a:r>
+              <a:rPr lang="en-US" baseline="0" dirty="0" smtClean="0"/>
+              <a:t> server Security Group must already exist in order to complete rule creation for the database server security group.</a:t>
+            </a:r>
+          </a:p>
+          <a:p>
+            <a:pPr marL="171450" marR="0" indent="-171450" algn="l" defTabSz="457200" rtl="0" eaLnBrk="1" fontAlgn="auto" latinLnBrk="0" hangingPunct="1">
+              <a:lnSpc>
+                <a:spcPct val="100000"/>
+              </a:lnSpc>
+              <a:spcBef>
+                <a:spcPts val="0"/>
+              </a:spcBef>
+              <a:spcAft>
+                <a:spcPts val="0"/>
+              </a:spcAft>
+              <a:buClrTx/>
+              <a:buSzTx/>
+              <a:buFont typeface="Arial"/>
+              <a:buChar char="•"/>
+              <a:tabLst/>
+              <a:defRPr/>
+            </a:pPr>
+            <a:r>
+              <a:rPr lang="en-US" baseline="0" dirty="0" smtClean="0"/>
+              <a:t>Deep Packet Inspection: Deep Packet Inspection allows the examination of either packet header or packet data in addition to IP Source / Destination Addresses and UDP/TCP Source Destination Ports</a:t>
+            </a:r>
+            <a:endParaRPr lang="en-US" dirty="0" smtClean="0"/>
+          </a:p>
+          <a:p>
+            <a:pPr marL="0" indent="0">
+              <a:buFont typeface="Arial"/>
+              <a:buNone/>
+            </a:pPr>
             <a:endParaRPr lang="en-US" dirty="0"/>
           </a:p>
         </p:txBody>
@@ -3602,7 +3602,7 @@
           <a:p>
             <a:fld id="{7CE38E4D-051A-41E1-86A4-E56916468FD0}" type="datetimeFigureOut">
               <a:rPr lang="en-US" smtClean="0"/>
-              <a:t>12/1/15</a:t>
+              <a:t>12/2/15</a:t>
             </a:fld>
             <a:endParaRPr lang="en-US"/>
           </a:p>
@@ -3783,7 +3783,7 @@
           <a:p>
             <a:fld id="{7CE38E4D-051A-41E1-86A4-E56916468FD0}" type="datetimeFigureOut">
               <a:rPr lang="en-US" smtClean="0"/>
-              <a:t>12/1/15</a:t>
+              <a:t>12/2/15</a:t>
             </a:fld>
             <a:endParaRPr lang="en-US"/>
           </a:p>
@@ -3934,7 +3934,7 @@
           <a:p>
             <a:fld id="{7CE38E4D-051A-41E1-86A4-E56916468FD0}" type="datetimeFigureOut">
               <a:rPr lang="en-US" smtClean="0"/>
-              <a:t>12/1/15</a:t>
+              <a:t>12/2/15</a:t>
             </a:fld>
             <a:endParaRPr lang="en-US"/>
           </a:p>
@@ -5760,7 +5760,7 @@
           <a:p>
             <a:fld id="{7CE38E4D-051A-41E1-86A4-E56916468FD0}" type="datetimeFigureOut">
               <a:rPr lang="en-US" smtClean="0"/>
-              <a:t>12/1/15</a:t>
+              <a:t>12/2/15</a:t>
             </a:fld>
             <a:endParaRPr lang="en-US"/>
           </a:p>
@@ -7630,7 +7630,7 @@
           <a:p>
             <a:fld id="{7CE38E4D-051A-41E1-86A4-E56916468FD0}" type="datetimeFigureOut">
               <a:rPr lang="en-US" smtClean="0"/>
-              <a:t>12/1/15</a:t>
+              <a:t>12/2/15</a:t>
             </a:fld>
             <a:endParaRPr lang="en-US"/>
           </a:p>
@@ -7743,7 +7743,7 @@
           <a:p>
             <a:fld id="{7CE38E4D-051A-41E1-86A4-E56916468FD0}" type="datetimeFigureOut">
               <a:rPr lang="en-US" smtClean="0"/>
-              <a:t>12/1/15</a:t>
+              <a:t>12/2/15</a:t>
             </a:fld>
             <a:endParaRPr lang="en-US"/>
           </a:p>
@@ -8284,7 +8284,7 @@
           <a:p>
             <a:fld id="{7CE38E4D-051A-41E1-86A4-E56916468FD0}" type="datetimeFigureOut">
               <a:rPr lang="en-US" smtClean="0"/>
-              <a:t>12/1/15</a:t>
+              <a:t>12/2/15</a:t>
             </a:fld>
             <a:endParaRPr lang="en-US"/>
           </a:p>
@@ -8397,7 +8397,7 @@
           <a:p>
             <a:fld id="{7CE38E4D-051A-41E1-86A4-E56916468FD0}" type="datetimeFigureOut">
               <a:rPr lang="en-US" smtClean="0"/>
-              <a:t>12/1/15</a:t>
+              <a:t>12/2/15</a:t>
             </a:fld>
             <a:endParaRPr lang="en-US"/>
           </a:p>
@@ -10108,7 +10108,7 @@
           <a:p>
             <a:fld id="{7CE38E4D-051A-41E1-86A4-E56916468FD0}" type="datetimeFigureOut">
               <a:rPr lang="en-US" smtClean="0"/>
-              <a:t>12/1/15</a:t>
+              <a:t>12/2/15</a:t>
             </a:fld>
             <a:endParaRPr lang="en-US"/>
           </a:p>
@@ -10259,7 +10259,7 @@
           <a:p>
             <a:fld id="{7CE38E4D-051A-41E1-86A4-E56916468FD0}" type="datetimeFigureOut">
               <a:rPr lang="en-US" smtClean="0"/>
-              <a:t>12/1/15</a:t>
+              <a:t>12/2/15</a:t>
             </a:fld>
             <a:endParaRPr lang="en-US"/>
           </a:p>
@@ -13874,7 +13874,7 @@
           <a:p>
             <a:fld id="{7CE38E4D-051A-41E1-86A4-E56916468FD0}" type="datetimeFigureOut">
               <a:rPr lang="en-US" smtClean="0"/>
-              <a:t>12/1/15</a:t>
+              <a:t>12/2/15</a:t>
             </a:fld>
             <a:endParaRPr lang="en-US"/>
           </a:p>
@@ -15733,7 +15733,7 @@
           <a:p>
             <a:fld id="{7CE38E4D-051A-41E1-86A4-E56916468FD0}" type="datetimeFigureOut">
               <a:rPr lang="en-US" smtClean="0"/>
-              <a:t>12/1/15</a:t>
+              <a:t>12/2/15</a:t>
             </a:fld>
             <a:endParaRPr lang="en-US"/>
           </a:p>
@@ -16357,50 +16357,27 @@
           <a:p>
             <a:r>
               <a:rPr lang="en-US" dirty="0" smtClean="0"/>
-              <a:t>EC2 Instances run “User data” at boot time.</a:t>
-            </a:r>
-          </a:p>
-          <a:p>
+              <a:t>Work in tandem with Auto Scaling</a:t>
+            </a:r>
+          </a:p>
+          <a:p>
+            <a:pPr lvl="1"/>
             <a:r>
               <a:rPr lang="en-US" dirty="0" smtClean="0"/>
-              <a:t>User data can be used to:</a:t>
-            </a:r>
-          </a:p>
-          <a:p>
-            <a:pPr lvl="1"/>
-            <a:r>
-              <a:rPr lang="en-US" dirty="0"/>
-              <a:t>Run configuration management </a:t>
-            </a:r>
+              <a:t>If built correctly, scaling activities require no modification to Security Groups</a:t>
+            </a:r>
+          </a:p>
+          <a:p>
             <a:r>
               <a:rPr lang="en-US" dirty="0" smtClean="0"/>
-              <a:t>software</a:t>
-            </a:r>
-          </a:p>
-          <a:p>
-            <a:pPr lvl="1"/>
+              <a:t>Change dynamically with changes in Infrastructure</a:t>
+            </a:r>
+          </a:p>
+          <a:p>
             <a:r>
               <a:rPr lang="en-US" dirty="0" smtClean="0"/>
-              <a:t>Run a shell script</a:t>
-            </a:r>
-          </a:p>
-          <a:p>
-            <a:pPr lvl="1"/>
-            <a:r>
-              <a:rPr lang="en-US" dirty="0" smtClean="0"/>
-              <a:t>Fetch application code from S3</a:t>
-            </a:r>
-          </a:p>
-          <a:p>
-            <a:pPr lvl="1"/>
-            <a:r>
-              <a:rPr lang="en-US" dirty="0" smtClean="0"/>
-              <a:t>Anything else…</a:t>
-            </a:r>
-          </a:p>
-          <a:p>
-            <a:pPr lvl="1"/>
-            <a:endParaRPr lang="en-US" dirty="0"/>
+              <a:t>Fast and easy to implement</a:t>
+            </a:r>
           </a:p>
         </p:txBody>
       </p:sp>
@@ -16416,14 +16393,12 @@
         </p:nvSpPr>
         <p:spPr/>
         <p:txBody>
-          <a:bodyPr>
-            <a:normAutofit/>
-          </a:bodyPr>
+          <a:bodyPr/>
           <a:lstStyle/>
           <a:p>
             <a:r>
               <a:rPr lang="en-US" dirty="0" smtClean="0"/>
-              <a:t>EC2: User Data</a:t>
+              <a:t>Security Groups: Benefits</a:t>
             </a:r>
             <a:endParaRPr lang="en-US" dirty="0"/>
           </a:p>
@@ -16432,7 +16407,7 @@
     </p:spTree>
     <p:extLst>
       <p:ext uri="{BB962C8B-B14F-4D97-AF65-F5344CB8AC3E}">
-        <p14:creationId xmlns:p14="http://schemas.microsoft.com/office/powerpoint/2010/main" val="2695657908"/>
+        <p14:creationId xmlns:p14="http://schemas.microsoft.com/office/powerpoint/2010/main" val="3689451645"/>
       </p:ext>
     </p:extLst>
   </p:cSld>
@@ -16479,141 +16454,65 @@
         <p:spPr/>
         <p:txBody>
           <a:bodyPr>
-            <a:normAutofit fontScale="92500"/>
+            <a:normAutofit lnSpcReduction="10000"/>
           </a:bodyPr>
           <a:lstStyle/>
           <a:p>
-            <a:pPr marL="0" indent="0">
-              <a:buNone/>
-            </a:pPr>
             <a:r>
               <a:rPr lang="en-US" dirty="0" smtClean="0"/>
-              <a:t>I run boot scripts on both Vagrant and AWS EC2 and AWS Auto Scaling. I used Vagrant for testing. Here is how:</a:t>
+              <a:t>Duplicate names are allowed</a:t>
             </a:r>
           </a:p>
           <a:p>
             <a:r>
               <a:rPr lang="en-US" dirty="0" smtClean="0"/>
-              <a:t>If Vagrant:</a:t>
+              <a:t>With automated infrastructure, referencing Not Yet Created Security Groups may Cause Dependency Problems</a:t>
+            </a:r>
+          </a:p>
+          <a:p>
+            <a:r>
+              <a:rPr lang="en-US" dirty="0" smtClean="0"/>
+              <a:t>Security Groups not </a:t>
+            </a:r>
+            <a:r>
+              <a:rPr lang="en-US" i="1" dirty="0"/>
+              <a:t>e</a:t>
+            </a:r>
+            <a:r>
+              <a:rPr lang="en-US" i="1" dirty="0" smtClean="0"/>
+              <a:t>xactly</a:t>
+            </a:r>
+            <a:r>
+              <a:rPr lang="en-US" dirty="0" smtClean="0"/>
+              <a:t> a Firewall, provides no:</a:t>
             </a:r>
           </a:p>
           <a:p>
             <a:pPr lvl="1"/>
             <a:r>
               <a:rPr lang="en-US" dirty="0" smtClean="0"/>
-              <a:t>vagrant up</a:t>
+              <a:t>Deep Packet Inspection (content of packets)</a:t>
             </a:r>
           </a:p>
           <a:p>
             <a:pPr lvl="1"/>
             <a:r>
-              <a:rPr lang="en-US" dirty="0" err="1" smtClean="0"/>
-              <a:t>Vagrantfile</a:t>
-            </a:r>
-            <a:r>
-              <a:rPr lang="en-US" dirty="0"/>
-              <a:t>: </a:t>
-            </a:r>
-            <a:r>
-              <a:rPr lang="en-US" dirty="0" err="1"/>
-              <a:t>config.vm.provision</a:t>
-            </a:r>
-            <a:r>
-              <a:rPr lang="en-US" dirty="0"/>
-              <a:t> "shell", path: "../deploy/</a:t>
-            </a:r>
-            <a:r>
-              <a:rPr lang="en-US" dirty="0" err="1" smtClean="0"/>
-              <a:t>deploy.sh</a:t>
-            </a:r>
-            <a:r>
               <a:rPr lang="en-US" dirty="0" smtClean="0"/>
-              <a:t>”</a:t>
-            </a:r>
-          </a:p>
-          <a:p>
+              <a:t>Bandwidth Management</a:t>
+            </a:r>
+          </a:p>
+          <a:p>
+            <a:pPr lvl="1"/>
             <a:r>
               <a:rPr lang="en-US" dirty="0" smtClean="0"/>
-              <a:t>If AWS:</a:t>
-            </a:r>
-          </a:p>
-          <a:p>
-            <a:pPr lvl="1"/>
-            <a:r>
-              <a:rPr lang="en-US" dirty="0"/>
-              <a:t>tar </a:t>
-            </a:r>
-            <a:r>
-              <a:rPr lang="en-US" dirty="0" err="1"/>
-              <a:t>xzf</a:t>
-            </a:r>
-            <a:r>
-              <a:rPr lang="en-US" dirty="0"/>
-              <a:t> /</a:t>
-            </a:r>
-            <a:r>
-              <a:rPr lang="en-US" dirty="0" err="1"/>
-              <a:t>var</a:t>
-            </a:r>
-            <a:r>
-              <a:rPr lang="en-US" dirty="0"/>
-              <a:t>/</a:t>
-            </a:r>
-            <a:r>
-              <a:rPr lang="en-US" dirty="0" err="1"/>
-              <a:t>tmp</a:t>
-            </a:r>
-            <a:r>
-              <a:rPr lang="en-US" dirty="0"/>
-              <a:t>/${project}-${version}.</a:t>
-            </a:r>
-            <a:r>
-              <a:rPr lang="en-US" dirty="0" err="1"/>
-              <a:t>tar.gz</a:t>
-            </a:r>
-            <a:r>
-              <a:rPr lang="en-US" dirty="0"/>
-              <a:t> -C /</a:t>
-            </a:r>
-            <a:r>
-              <a:rPr lang="en-US" dirty="0" err="1"/>
-              <a:t>srv</a:t>
-            </a:r>
-            <a:r>
-              <a:rPr lang="en-US" dirty="0"/>
-              <a:t>/${project}</a:t>
-            </a:r>
-          </a:p>
-          <a:p>
-            <a:pPr lvl="1"/>
-            <a:r>
-              <a:rPr lang="en-US" dirty="0"/>
-              <a:t>bash /</a:t>
-            </a:r>
-            <a:r>
-              <a:rPr lang="en-US" dirty="0" err="1"/>
-              <a:t>srv</a:t>
-            </a:r>
-            <a:r>
-              <a:rPr lang="en-US" dirty="0"/>
-              <a:t>/${project}/deploy/</a:t>
-            </a:r>
-            <a:r>
-              <a:rPr lang="en-US" dirty="0" err="1"/>
-              <a:t>deploy.sh</a:t>
-            </a:r>
-            <a:endParaRPr lang="en-US" dirty="0"/>
-          </a:p>
-          <a:p>
-            <a:endParaRPr lang="en-US" dirty="0" smtClean="0"/>
-          </a:p>
-          <a:p>
-            <a:pPr lvl="1"/>
-            <a:endParaRPr lang="en-US" dirty="0" smtClean="0"/>
-          </a:p>
-          <a:p>
-            <a:pPr lvl="1"/>
-            <a:endParaRPr lang="en-US" dirty="0"/>
+              <a:t>Logging of Access</a:t>
+            </a:r>
+          </a:p>
+          <a:p>
+            <a:r>
+              <a:rPr lang="en-US" dirty="0" smtClean="0"/>
+              <a:t>No Security Group Configuration Backup</a:t>
+            </a:r>
           </a:p>
         </p:txBody>
       </p:sp>
@@ -16629,14 +16528,12 @@
         </p:nvSpPr>
         <p:spPr/>
         <p:txBody>
-          <a:bodyPr>
-            <a:normAutofit fontScale="90000"/>
-          </a:bodyPr>
+          <a:bodyPr/>
           <a:lstStyle/>
           <a:p>
             <a:r>
               <a:rPr lang="en-US" dirty="0" smtClean="0"/>
-              <a:t>Practical Experience: running on hybrid Infrastructure</a:t>
+              <a:t>Security Groups: Challenges</a:t>
             </a:r>
             <a:endParaRPr lang="en-US" dirty="0"/>
           </a:p>
@@ -16645,7 +16542,7 @@
     </p:spTree>
     <p:extLst>
       <p:ext uri="{BB962C8B-B14F-4D97-AF65-F5344CB8AC3E}">
-        <p14:creationId xmlns:p14="http://schemas.microsoft.com/office/powerpoint/2010/main" val="1209400510"/>
+        <p14:creationId xmlns:p14="http://schemas.microsoft.com/office/powerpoint/2010/main" val="1371890023"/>
       </p:ext>
     </p:extLst>
   </p:cSld>
@@ -16681,47 +16578,6 @@
       </p:grpSpPr>
       <p:sp>
         <p:nvSpPr>
-          <p:cNvPr id="3" name="Content Placeholder 2"/>
-          <p:cNvSpPr>
-            <a:spLocks noGrp="1"/>
-          </p:cNvSpPr>
-          <p:nvPr>
-            <p:ph idx="1"/>
-          </p:nvPr>
-        </p:nvSpPr>
-        <p:spPr/>
-        <p:txBody>
-          <a:bodyPr>
-            <a:normAutofit/>
-          </a:bodyPr>
-          <a:lstStyle/>
-          <a:p>
-            <a:r>
-              <a:rPr lang="en-US" dirty="0" smtClean="0"/>
-              <a:t>Can Developers use pre-built images or user data from an Operations department to run code on “similar to production servers”?</a:t>
-            </a:r>
-          </a:p>
-          <a:p>
-            <a:r>
-              <a:rPr lang="en-US" dirty="0" smtClean="0"/>
-              <a:t>Are AMIs or User-Data a better fit for an organization?</a:t>
-            </a:r>
-          </a:p>
-          <a:p>
-            <a:r>
-              <a:rPr lang="en-US" dirty="0" smtClean="0"/>
-              <a:t>How does the performance of existing applications vary when running on physical versus </a:t>
-            </a:r>
-            <a:r>
-              <a:rPr lang="en-US" smtClean="0"/>
-              <a:t>virtual hardware?</a:t>
-            </a:r>
-            <a:endParaRPr lang="en-US" dirty="0" smtClean="0"/>
-          </a:p>
-        </p:txBody>
-      </p:sp>
-      <p:sp>
-        <p:nvSpPr>
           <p:cNvPr id="2" name="Title 1"/>
           <p:cNvSpPr>
             <a:spLocks noGrp="1"/>
@@ -16732,21 +16588,53 @@
         </p:nvSpPr>
         <p:spPr/>
         <p:txBody>
-          <a:bodyPr/>
+          <a:bodyPr>
+            <a:normAutofit fontScale="90000"/>
+          </a:bodyPr>
           <a:lstStyle/>
           <a:p>
             <a:r>
               <a:rPr lang="en-US" dirty="0" smtClean="0"/>
-              <a:t>EC2: What Next?</a:t>
+              <a:t>Security Groups: What is Evaluated?</a:t>
             </a:r>
             <a:endParaRPr lang="en-US" dirty="0"/>
           </a:p>
         </p:txBody>
       </p:sp>
+      <p:pic>
+        <p:nvPicPr>
+          <p:cNvPr id="6" name="Content Placeholder 5" descr="aws-ec2-security-group-what-is-evaluated.pdf"/>
+          <p:cNvPicPr>
+            <a:picLocks noGrp="1" noChangeAspect="1"/>
+          </p:cNvPicPr>
+          <p:nvPr>
+            <p:ph idx="1"/>
+          </p:nvPr>
+        </p:nvPicPr>
+        <p:blipFill>
+          <a:blip r:embed="rId3">
+            <a:extLst>
+              <a:ext uri="{28A0092B-C50C-407E-A947-70E740481C1C}">
+                <a14:useLocalDpi xmlns:a14="http://schemas.microsoft.com/office/drawing/2010/main" val="0"/>
+              </a:ext>
+            </a:extLst>
+          </a:blip>
+          <a:srcRect l="-10411" r="-10411"/>
+          <a:stretch>
+            <a:fillRect/>
+          </a:stretch>
+        </p:blipFill>
+        <p:spPr>
+          <a:xfrm>
+            <a:off x="19847" y="2357508"/>
+            <a:ext cx="9124154" cy="4249901"/>
+          </a:xfrm>
+        </p:spPr>
+      </p:pic>
     </p:spTree>
     <p:extLst>
       <p:ext uri="{BB962C8B-B14F-4D97-AF65-F5344CB8AC3E}">
-        <p14:creationId xmlns:p14="http://schemas.microsoft.com/office/powerpoint/2010/main" val="2148188877"/>
+        <p14:creationId xmlns:p14="http://schemas.microsoft.com/office/powerpoint/2010/main" val="1664482785"/>
       </p:ext>
     </p:extLst>
   </p:cSld>
@@ -16793,7 +16681,7 @@
         <p:spPr/>
         <p:txBody>
           <a:bodyPr>
-            <a:normAutofit fontScale="92500" lnSpcReduction="10000"/>
+            <a:normAutofit fontScale="85000" lnSpcReduction="20000"/>
           </a:bodyPr>
           <a:lstStyle/>
           <a:p>
@@ -16803,25 +16691,63 @@
                   <a:srgbClr val="008000"/>
                 </a:solidFill>
               </a:rPr>
-              <a:t>build redundant EC2 servers across Availability Zones</a:t>
-            </a:r>
-          </a:p>
-          <a:p>
+              <a:t>Reference other Security Groups in Security Groups:</a:t>
+            </a:r>
+            <a:endParaRPr lang="en-US" dirty="0">
+              <a:solidFill>
+                <a:srgbClr val="008000"/>
+              </a:solidFill>
+            </a:endParaRPr>
+          </a:p>
+          <a:p>
+            <a:pPr lvl="1"/>
+            <a:r>
+              <a:rPr lang="en-US" dirty="0" smtClean="0"/>
+              <a:t>Inbound: gateway-servers-</a:t>
+            </a:r>
+            <a:r>
+              <a:rPr lang="en-US" dirty="0" err="1" smtClean="0"/>
+              <a:t>sg</a:t>
+            </a:r>
+            <a:r>
+              <a:rPr lang="en-US" dirty="0" smtClean="0"/>
+              <a:t>, </a:t>
+            </a:r>
+            <a:r>
+              <a:rPr lang="en-US" dirty="0" err="1" smtClean="0"/>
+              <a:t>tcp</a:t>
+            </a:r>
+            <a:r>
+              <a:rPr lang="en-US" dirty="0" smtClean="0"/>
+              <a:t> port 22</a:t>
+            </a:r>
+          </a:p>
+          <a:p>
+            <a:r>
+              <a:rPr lang="en-US" dirty="0" smtClean="0">
+                <a:solidFill>
+                  <a:srgbClr val="008000"/>
+                </a:solidFill>
+              </a:rPr>
+              <a:t>Create </a:t>
+            </a:r>
             <a:r>
               <a:rPr lang="en-US" dirty="0">
                 <a:solidFill>
                   <a:srgbClr val="008000"/>
                 </a:solidFill>
               </a:rPr>
-              <a:t>use </a:t>
-            </a:r>
+              <a:t>a “Base” Group for sweeping changes</a:t>
+            </a:r>
+          </a:p>
+          <a:p>
             <a:r>
               <a:rPr lang="en-US" dirty="0" smtClean="0">
                 <a:solidFill>
                   <a:srgbClr val="008000"/>
                 </a:solidFill>
               </a:rPr>
-              <a:t>Tags to identify and select instances</a:t>
+              <a:t>Create one Security Group per Application and Environment (example: web-prod01)</a:t>
             </a:r>
           </a:p>
           <a:p>
@@ -16831,7 +16757,7 @@
                   <a:srgbClr val="008000"/>
                 </a:solidFill>
               </a:rPr>
-              <a:t>use same configuration management in EC2 as in Vagrant or other cloud providers</a:t>
+              <a:t>Automate the Creation of Security Groups</a:t>
             </a:r>
           </a:p>
           <a:p>
@@ -16841,27 +16767,33 @@
                   <a:srgbClr val="008000"/>
                 </a:solidFill>
               </a:rPr>
-              <a:t>Test Performance using different Instance Types</a:t>
-            </a:r>
-          </a:p>
-          <a:p>
+              <a:t>Use multiple Security </a:t>
+            </a:r>
+            <a:r>
+              <a:rPr lang="en-US" dirty="0">
+                <a:solidFill>
+                  <a:srgbClr val="008000"/>
+                </a:solidFill>
+              </a:rPr>
+              <a:t>G</a:t>
+            </a:r>
             <a:r>
               <a:rPr lang="en-US" dirty="0" smtClean="0">
                 <a:solidFill>
                   <a:srgbClr val="008000"/>
                 </a:solidFill>
               </a:rPr>
-              <a:t>use HVM Virtualization Type</a:t>
+              <a:t>roups for Instances</a:t>
             </a:r>
           </a:p>
           <a:p>
             <a:r>
               <a:rPr lang="en-US" dirty="0" smtClean="0">
                 <a:solidFill>
-                  <a:srgbClr val="000000"/>
+                  <a:srgbClr val="008000"/>
                 </a:solidFill>
               </a:rPr>
-              <a:t>Use IAM Roles, if AWS lock-in not a concern</a:t>
+              <a:t>Allow only ELB traffic in for Web Servers</a:t>
             </a:r>
           </a:p>
           <a:p>
@@ -16871,25 +16803,60 @@
                   <a:srgbClr val="FF0000"/>
                 </a:solidFill>
               </a:rPr>
-              <a:t>Do not build instances “by hand”</a:t>
-            </a:r>
-          </a:p>
-          <a:p>
+              <a:t>Do </a:t>
+            </a:r>
+            <a:r>
+              <a:rPr lang="en-US" dirty="0">
+                <a:solidFill>
+                  <a:srgbClr val="FF0000"/>
+                </a:solidFill>
+              </a:rPr>
+              <a:t>not use IP addresses for </a:t>
+            </a:r>
             <a:r>
               <a:rPr lang="en-US" dirty="0" smtClean="0">
                 <a:solidFill>
                   <a:srgbClr val="FF0000"/>
                 </a:solidFill>
               </a:rPr>
-              <a:t>Do not store data on EC2 Instances</a:t>
-            </a:r>
-          </a:p>
-          <a:p>
-            <a:endParaRPr lang="en-US" dirty="0" smtClean="0">
-              <a:solidFill>
-                <a:srgbClr val="FF0000"/>
-              </a:solidFill>
-            </a:endParaRPr>
+              <a:t>Rules</a:t>
+            </a:r>
+          </a:p>
+          <a:p>
+            <a:r>
+              <a:rPr lang="en-US" dirty="0" smtClean="0">
+                <a:solidFill>
+                  <a:srgbClr val="FF0000"/>
+                </a:solidFill>
+              </a:rPr>
+              <a:t>Do not rely on Security Group Names</a:t>
+            </a:r>
+          </a:p>
+          <a:p>
+            <a:r>
+              <a:rPr lang="en-US" dirty="0" smtClean="0">
+                <a:solidFill>
+                  <a:srgbClr val="FF0000"/>
+                </a:solidFill>
+              </a:rPr>
+              <a:t>Do not “share” Security </a:t>
+            </a:r>
+            <a:r>
+              <a:rPr lang="en-US" dirty="0">
+                <a:solidFill>
+                  <a:srgbClr val="FF0000"/>
+                </a:solidFill>
+              </a:rPr>
+              <a:t>G</a:t>
+            </a:r>
+            <a:r>
+              <a:rPr lang="en-US" dirty="0" smtClean="0">
+                <a:solidFill>
+                  <a:srgbClr val="FF0000"/>
+                </a:solidFill>
+              </a:rPr>
+              <a:t>roups between resources</a:t>
+            </a:r>
           </a:p>
         </p:txBody>
       </p:sp>
@@ -16910,7 +16877,7 @@
           <a:p>
             <a:r>
               <a:rPr lang="en-US" dirty="0" smtClean="0"/>
-              <a:t>EC2: Best Practices</a:t>
+              <a:t>Security Groups: Best Practices</a:t>
             </a:r>
             <a:endParaRPr lang="en-US" dirty="0"/>
           </a:p>
@@ -16919,7 +16886,7 @@
     </p:spTree>
     <p:extLst>
       <p:ext uri="{BB962C8B-B14F-4D97-AF65-F5344CB8AC3E}">
-        <p14:creationId xmlns:p14="http://schemas.microsoft.com/office/powerpoint/2010/main" val="1232898389"/>
+        <p14:creationId xmlns:p14="http://schemas.microsoft.com/office/powerpoint/2010/main" val="1057597965"/>
       </p:ext>
     </p:extLst>
   </p:cSld>
@@ -17106,51 +17073,72 @@
         <p:spPr/>
         <p:txBody>
           <a:bodyPr>
-            <a:normAutofit/>
+            <a:normAutofit fontScale="92500" lnSpcReduction="10000"/>
           </a:bodyPr>
           <a:lstStyle/>
           <a:p>
+            <a:pPr marL="0" indent="0">
+              <a:buNone/>
+            </a:pPr>
             <a:r>
               <a:rPr lang="en-US" dirty="0" smtClean="0"/>
-              <a:t>Security Groups are Region-Specific</a:t>
-            </a:r>
+              <a:t>EC2 Instances are:</a:t>
+            </a:r>
+            <a:endParaRPr lang="en-US" i="1" dirty="0" smtClean="0"/>
           </a:p>
           <a:p>
             <a:r>
               <a:rPr lang="en-US" dirty="0" smtClean="0"/>
-              <a:t>Security Groups are the </a:t>
+              <a:t>Classified by Type</a:t>
+            </a:r>
+          </a:p>
+          <a:p>
+            <a:r>
+              <a:rPr lang="en-US" dirty="0" smtClean="0"/>
+              <a:t>Cost: on-demand, reserved or spot</a:t>
+            </a:r>
+          </a:p>
+          <a:p>
+            <a:r>
+              <a:rPr lang="en-US" dirty="0" smtClean="0"/>
+              <a:t>Built on an AMI, typically Linux or Windows</a:t>
+            </a:r>
+          </a:p>
+          <a:p>
+            <a:pPr lvl="1"/>
+            <a:r>
+              <a:rPr lang="en-US" dirty="0" smtClean="0"/>
+              <a:t>AMI can be Public, Paid (Marketplace) or Private</a:t>
+            </a:r>
+          </a:p>
+          <a:p>
+            <a:r>
+              <a:rPr lang="en-US" dirty="0" smtClean="0"/>
+              <a:t>Backed by either EBS or Instance Store</a:t>
+            </a:r>
+          </a:p>
+          <a:p>
+            <a:r>
+              <a:rPr lang="en-US" dirty="0" smtClean="0"/>
+              <a:t>Bootstrapped using user-data</a:t>
+            </a:r>
+          </a:p>
+          <a:p>
+            <a:r>
+              <a:rPr lang="en-US" dirty="0" smtClean="0"/>
+              <a:t>On shared infrastructure, unless </a:t>
             </a:r>
             <a:r>
               <a:rPr lang="en-US" i="1" dirty="0" smtClean="0"/>
-              <a:t>near</a:t>
+              <a:t>Dedicated Tenancy in VPC </a:t>
             </a:r>
             <a:r>
               <a:rPr lang="en-US" dirty="0" smtClean="0"/>
-              <a:t> equivalent of a </a:t>
-            </a:r>
-            <a:r>
-              <a:rPr lang="en-US" dirty="0" err="1" smtClean="0"/>
-              <a:t>stateful</a:t>
-            </a:r>
-            <a:r>
-              <a:rPr lang="en-US" dirty="0" smtClean="0"/>
-              <a:t> Firewall</a:t>
-            </a:r>
-          </a:p>
-          <a:p>
-            <a:r>
-              <a:rPr lang="en-US" dirty="0" smtClean="0"/>
-              <a:t>Security Groups are applied to EC2 resources, as well as RDS, </a:t>
-            </a:r>
-            <a:r>
-              <a:rPr lang="en-US" dirty="0" err="1" smtClean="0"/>
-              <a:t>ElastiCache</a:t>
-            </a:r>
-            <a:r>
-              <a:rPr lang="en-US" dirty="0" smtClean="0"/>
-              <a:t> and potentially other resources</a:t>
-            </a:r>
-            <a:endParaRPr lang="en-US" i="1" dirty="0" smtClean="0"/>
+              <a:t>is Requested</a:t>
+            </a:r>
+          </a:p>
+          <a:p>
+            <a:endParaRPr lang="en-US" dirty="0" smtClean="0"/>
           </a:p>
         </p:txBody>
       </p:sp>
@@ -17171,7 +17159,7 @@
           <a:p>
             <a:r>
               <a:rPr lang="en-US" dirty="0" smtClean="0"/>
-              <a:t>Security Groups: Introduction</a:t>
+              <a:t>EC2: Introduction</a:t>
             </a:r>
             <a:endParaRPr lang="en-US" dirty="0"/>
           </a:p>
@@ -17180,7 +17168,7 @@
     </p:spTree>
     <p:extLst>
       <p:ext uri="{BB962C8B-B14F-4D97-AF65-F5344CB8AC3E}">
-        <p14:creationId xmlns:p14="http://schemas.microsoft.com/office/powerpoint/2010/main" val="3122286205"/>
+        <p14:creationId xmlns:p14="http://schemas.microsoft.com/office/powerpoint/2010/main" val="1683326622"/>
       </p:ext>
     </p:extLst>
   </p:cSld>
@@ -17216,49 +17204,6 @@
       </p:grpSpPr>
       <p:sp>
         <p:nvSpPr>
-          <p:cNvPr id="3" name="Content Placeholder 2"/>
-          <p:cNvSpPr>
-            <a:spLocks noGrp="1"/>
-          </p:cNvSpPr>
-          <p:nvPr>
-            <p:ph idx="1"/>
-          </p:nvPr>
-        </p:nvSpPr>
-        <p:spPr/>
-        <p:txBody>
-          <a:bodyPr>
-            <a:normAutofit/>
-          </a:bodyPr>
-          <a:lstStyle/>
-          <a:p>
-            <a:r>
-              <a:rPr lang="en-US" dirty="0" smtClean="0"/>
-              <a:t>Work in tandem with Auto Scaling</a:t>
-            </a:r>
-          </a:p>
-          <a:p>
-            <a:pPr lvl="1"/>
-            <a:r>
-              <a:rPr lang="en-US" dirty="0" smtClean="0"/>
-              <a:t>If built correctly, scaling activities require no modification to Security Groups</a:t>
-            </a:r>
-          </a:p>
-          <a:p>
-            <a:r>
-              <a:rPr lang="en-US" dirty="0" smtClean="0"/>
-              <a:t>Change dynamically with changes in Infrastructure</a:t>
-            </a:r>
-          </a:p>
-          <a:p>
-            <a:r>
-              <a:rPr lang="en-US" dirty="0" smtClean="0"/>
-              <a:t>Fast and easy to implement</a:t>
-            </a:r>
-          </a:p>
-        </p:txBody>
-      </p:sp>
-      <p:sp>
-        <p:nvSpPr>
           <p:cNvPr id="2" name="Title 1"/>
           <p:cNvSpPr>
             <a:spLocks noGrp="1"/>
@@ -17274,7 +17219,115 @@
           <a:p>
             <a:r>
               <a:rPr lang="en-US" dirty="0" smtClean="0"/>
-              <a:t>Security Groups: Benefits</a:t>
+              <a:t>EC2: Benefits and Challenges</a:t>
+            </a:r>
+            <a:endParaRPr lang="en-US" dirty="0"/>
+          </a:p>
+        </p:txBody>
+      </p:sp>
+      <p:sp>
+        <p:nvSpPr>
+          <p:cNvPr id="3" name="Content Placeholder 2"/>
+          <p:cNvSpPr>
+            <a:spLocks noGrp="1"/>
+          </p:cNvSpPr>
+          <p:nvPr>
+            <p:ph sz="quarter" idx="13"/>
+          </p:nvPr>
+        </p:nvSpPr>
+        <p:spPr/>
+        <p:txBody>
+          <a:bodyPr>
+            <a:normAutofit/>
+          </a:bodyPr>
+          <a:lstStyle/>
+          <a:p>
+            <a:pPr marL="0" indent="0">
+              <a:buNone/>
+            </a:pPr>
+            <a:r>
+              <a:rPr lang="en-US" dirty="0" smtClean="0"/>
+              <a:t>Benefits:</a:t>
+            </a:r>
+          </a:p>
+          <a:p>
+            <a:r>
+              <a:rPr lang="en-US" dirty="0" smtClean="0"/>
+              <a:t>Provisioned in Minutes</a:t>
+            </a:r>
+          </a:p>
+          <a:p>
+            <a:r>
+              <a:rPr lang="en-US" dirty="0" smtClean="0"/>
+              <a:t>Resize Easily</a:t>
+            </a:r>
+          </a:p>
+          <a:p>
+            <a:r>
+              <a:rPr lang="en-US" dirty="0" smtClean="0"/>
+              <a:t>Variety of pre-built images</a:t>
+            </a:r>
+          </a:p>
+          <a:p>
+            <a:r>
+              <a:rPr lang="en-US" dirty="0" smtClean="0"/>
+              <a:t>Pay as you Go</a:t>
+            </a:r>
+          </a:p>
+          <a:p>
+            <a:r>
+              <a:rPr lang="en-US" dirty="0" smtClean="0"/>
+              <a:t>Provisioned through API</a:t>
+            </a:r>
+          </a:p>
+        </p:txBody>
+      </p:sp>
+      <p:sp>
+        <p:nvSpPr>
+          <p:cNvPr id="4" name="Content Placeholder 3"/>
+          <p:cNvSpPr>
+            <a:spLocks noGrp="1"/>
+          </p:cNvSpPr>
+          <p:nvPr>
+            <p:ph sz="quarter" idx="14"/>
+          </p:nvPr>
+        </p:nvSpPr>
+        <p:spPr/>
+        <p:txBody>
+          <a:bodyPr/>
+          <a:lstStyle/>
+          <a:p>
+            <a:r>
+              <a:rPr lang="en-US" dirty="0" smtClean="0"/>
+              <a:t>Challenges</a:t>
+            </a:r>
+          </a:p>
+          <a:p>
+            <a:pPr lvl="1"/>
+            <a:r>
+              <a:rPr lang="en-US" dirty="0" smtClean="0"/>
+              <a:t>Single Availability Zone</a:t>
+            </a:r>
+          </a:p>
+          <a:p>
+            <a:pPr lvl="1"/>
+            <a:r>
+              <a:rPr lang="en-US" dirty="0" smtClean="0"/>
+              <a:t>Right-size Instance Type may not be available</a:t>
+            </a:r>
+          </a:p>
+          <a:p>
+            <a:pPr lvl="1"/>
+            <a:r>
+              <a:rPr lang="en-US" dirty="0" smtClean="0"/>
+              <a:t>Reporting of disk usage and memory not available by default</a:t>
+            </a:r>
+          </a:p>
+          <a:p>
+            <a:pPr lvl="1"/>
+            <a:r>
+              <a:rPr lang="en-US" dirty="0" smtClean="0"/>
+              <a:t>Performance</a:t>
             </a:r>
             <a:endParaRPr lang="en-US" dirty="0"/>
           </a:p>
@@ -17283,7 +17336,7 @@
     </p:spTree>
     <p:extLst>
       <p:ext uri="{BB962C8B-B14F-4D97-AF65-F5344CB8AC3E}">
-        <p14:creationId xmlns:p14="http://schemas.microsoft.com/office/powerpoint/2010/main" val="3689451645"/>
+        <p14:creationId xmlns:p14="http://schemas.microsoft.com/office/powerpoint/2010/main" val="4257900755"/>
       </p:ext>
     </p:extLst>
   </p:cSld>
@@ -17330,65 +17383,56 @@
         <p:spPr/>
         <p:txBody>
           <a:bodyPr>
-            <a:normAutofit lnSpcReduction="10000"/>
+            <a:normAutofit/>
           </a:bodyPr>
           <a:lstStyle/>
           <a:p>
             <a:r>
               <a:rPr lang="en-US" dirty="0" smtClean="0"/>
-              <a:t>Duplicate names are allowed</a:t>
+              <a:t>EC2 Instances run “User data” at boot time.</a:t>
             </a:r>
           </a:p>
           <a:p>
             <a:r>
               <a:rPr lang="en-US" dirty="0" smtClean="0"/>
-              <a:t>With automated infrastructure, referencing Not Yet Created Security Groups may Cause Dependency Problems</a:t>
-            </a:r>
-          </a:p>
-          <a:p>
+              <a:t>User data can be used to:</a:t>
+            </a:r>
+          </a:p>
+          <a:p>
+            <a:pPr lvl="1"/>
+            <a:r>
+              <a:rPr lang="en-US" dirty="0"/>
+              <a:t>Run configuration management </a:t>
+            </a:r>
             <a:r>
               <a:rPr lang="en-US" dirty="0" smtClean="0"/>
-              <a:t>Security Groups not </a:t>
-            </a:r>
-            <a:r>
-              <a:rPr lang="en-US" i="1" dirty="0"/>
-              <a:t>e</a:t>
-            </a:r>
-            <a:r>
-              <a:rPr lang="en-US" i="1" dirty="0" smtClean="0"/>
-              <a:t>xactly</a:t>
-            </a:r>
+              <a:t>software</a:t>
+            </a:r>
+          </a:p>
+          <a:p>
+            <a:pPr lvl="1"/>
             <a:r>
               <a:rPr lang="en-US" dirty="0" smtClean="0"/>
-              <a:t> a Firewall, provides no:</a:t>
+              <a:t>Run a shell script</a:t>
             </a:r>
           </a:p>
           <a:p>
             <a:pPr lvl="1"/>
             <a:r>
               <a:rPr lang="en-US" dirty="0" smtClean="0"/>
-              <a:t>Deep Packet Inspection (content of packets)</a:t>
+              <a:t>Fetch application code from S3</a:t>
             </a:r>
           </a:p>
           <a:p>
             <a:pPr lvl="1"/>
             <a:r>
               <a:rPr lang="en-US" dirty="0" smtClean="0"/>
-              <a:t>Bandwidth Management</a:t>
+              <a:t>Anything else…</a:t>
             </a:r>
           </a:p>
           <a:p>
             <a:pPr lvl="1"/>
-            <a:r>
-              <a:rPr lang="en-US" dirty="0" smtClean="0"/>
-              <a:t>Logging of Access</a:t>
-            </a:r>
-          </a:p>
-          <a:p>
-            <a:r>
-              <a:rPr lang="en-US" dirty="0" smtClean="0"/>
-              <a:t>No Security Group Configuration Backup</a:t>
-            </a:r>
+            <a:endParaRPr lang="en-US" dirty="0"/>
           </a:p>
         </p:txBody>
       </p:sp>
@@ -17404,12 +17448,14 @@
         </p:nvSpPr>
         <p:spPr/>
         <p:txBody>
-          <a:bodyPr/>
+          <a:bodyPr>
+            <a:normAutofit/>
+          </a:bodyPr>
           <a:lstStyle/>
           <a:p>
             <a:r>
               <a:rPr lang="en-US" dirty="0" smtClean="0"/>
-              <a:t>Security Groups: Challenges</a:t>
+              <a:t>EC2: User Data</a:t>
             </a:r>
             <a:endParaRPr lang="en-US" dirty="0"/>
           </a:p>
@@ -17418,7 +17464,7 @@
     </p:spTree>
     <p:extLst>
       <p:ext uri="{BB962C8B-B14F-4D97-AF65-F5344CB8AC3E}">
-        <p14:creationId xmlns:p14="http://schemas.microsoft.com/office/powerpoint/2010/main" val="1371890023"/>
+        <p14:creationId xmlns:p14="http://schemas.microsoft.com/office/powerpoint/2010/main" val="2695657908"/>
       </p:ext>
     </p:extLst>
   </p:cSld>
@@ -17454,6 +17500,157 @@
       </p:grpSpPr>
       <p:sp>
         <p:nvSpPr>
+          <p:cNvPr id="3" name="Content Placeholder 2"/>
+          <p:cNvSpPr>
+            <a:spLocks noGrp="1"/>
+          </p:cNvSpPr>
+          <p:nvPr>
+            <p:ph idx="1"/>
+          </p:nvPr>
+        </p:nvSpPr>
+        <p:spPr/>
+        <p:txBody>
+          <a:bodyPr>
+            <a:normAutofit fontScale="92500"/>
+          </a:bodyPr>
+          <a:lstStyle/>
+          <a:p>
+            <a:pPr marL="0" indent="0">
+              <a:buNone/>
+            </a:pPr>
+            <a:r>
+              <a:rPr lang="en-US" dirty="0" smtClean="0"/>
+              <a:t>I run boot scripts on both Vagrant and AWS EC2 and AWS Auto Scaling. I used Vagrant for testing. Here is how:</a:t>
+            </a:r>
+          </a:p>
+          <a:p>
+            <a:r>
+              <a:rPr lang="en-US" dirty="0" smtClean="0"/>
+              <a:t>If Vagrant:</a:t>
+            </a:r>
+          </a:p>
+          <a:p>
+            <a:pPr lvl="1"/>
+            <a:r>
+              <a:rPr lang="en-US" dirty="0" smtClean="0"/>
+              <a:t>vagrant up</a:t>
+            </a:r>
+          </a:p>
+          <a:p>
+            <a:pPr lvl="1"/>
+            <a:r>
+              <a:rPr lang="en-US" dirty="0" err="1" smtClean="0"/>
+              <a:t>Vagrantfile</a:t>
+            </a:r>
+            <a:r>
+              <a:rPr lang="en-US" dirty="0"/>
+              <a:t>: </a:t>
+            </a:r>
+            <a:r>
+              <a:rPr lang="en-US" dirty="0" err="1"/>
+              <a:t>config.vm.provision</a:t>
+            </a:r>
+            <a:r>
+              <a:rPr lang="en-US" dirty="0"/>
+              <a:t> "shell", path: "../deploy/</a:t>
+            </a:r>
+            <a:r>
+              <a:rPr lang="en-US" dirty="0" err="1" smtClean="0"/>
+              <a:t>deploy.sh</a:t>
+            </a:r>
+            <a:r>
+              <a:rPr lang="en-US" dirty="0" smtClean="0"/>
+              <a:t>”</a:t>
+            </a:r>
+          </a:p>
+          <a:p>
+            <a:r>
+              <a:rPr lang="en-US" dirty="0" smtClean="0"/>
+              <a:t>If AWS:</a:t>
+            </a:r>
+          </a:p>
+          <a:p>
+            <a:pPr lvl="1"/>
+            <a:r>
+              <a:rPr lang="en-US" dirty="0"/>
+              <a:t>tar </a:t>
+            </a:r>
+            <a:r>
+              <a:rPr lang="en-US" dirty="0" err="1"/>
+              <a:t>xzf</a:t>
+            </a:r>
+            <a:r>
+              <a:rPr lang="en-US" dirty="0"/>
+              <a:t> /</a:t>
+            </a:r>
+            <a:r>
+              <a:rPr lang="en-US" dirty="0" err="1"/>
+              <a:t>var</a:t>
+            </a:r>
+            <a:r>
+              <a:rPr lang="en-US" dirty="0"/>
+              <a:t>/</a:t>
+            </a:r>
+            <a:r>
+              <a:rPr lang="en-US" dirty="0" err="1"/>
+              <a:t>tmp</a:t>
+            </a:r>
+            <a:r>
+              <a:rPr lang="en-US" dirty="0"/>
+              <a:t>/${project}-${version}.</a:t>
+            </a:r>
+            <a:r>
+              <a:rPr lang="en-US" dirty="0" err="1"/>
+              <a:t>tar.gz</a:t>
+            </a:r>
+            <a:r>
+              <a:rPr lang="en-US" dirty="0"/>
+              <a:t> -C /</a:t>
+            </a:r>
+            <a:r>
+              <a:rPr lang="en-US" dirty="0" err="1"/>
+              <a:t>srv</a:t>
+            </a:r>
+            <a:r>
+              <a:rPr lang="en-US" dirty="0"/>
+              <a:t>/${project}</a:t>
+            </a:r>
+          </a:p>
+          <a:p>
+            <a:pPr lvl="1"/>
+            <a:r>
+              <a:rPr lang="en-US" dirty="0"/>
+              <a:t>bash /</a:t>
+            </a:r>
+            <a:r>
+              <a:rPr lang="en-US" dirty="0" err="1"/>
+              <a:t>srv</a:t>
+            </a:r>
+            <a:r>
+              <a:rPr lang="en-US" dirty="0"/>
+              <a:t>/${project}/deploy/</a:t>
+            </a:r>
+            <a:r>
+              <a:rPr lang="en-US" dirty="0" err="1"/>
+              <a:t>deploy.sh</a:t>
+            </a:r>
+            <a:endParaRPr lang="en-US" dirty="0"/>
+          </a:p>
+          <a:p>
+            <a:endParaRPr lang="en-US" dirty="0" smtClean="0"/>
+          </a:p>
+          <a:p>
+            <a:pPr lvl="1"/>
+            <a:endParaRPr lang="en-US" dirty="0" smtClean="0"/>
+          </a:p>
+          <a:p>
+            <a:pPr lvl="1"/>
+            <a:endParaRPr lang="en-US" dirty="0"/>
+          </a:p>
+        </p:txBody>
+      </p:sp>
+      <p:sp>
+        <p:nvSpPr>
           <p:cNvPr id="2" name="Title 1"/>
           <p:cNvSpPr>
             <a:spLocks noGrp="1"/>
@@ -17471,46 +17668,16 @@
           <a:p>
             <a:r>
               <a:rPr lang="en-US" dirty="0" smtClean="0"/>
-              <a:t>Security Groups: What is Evaluated?</a:t>
+              <a:t>Practical Experience: running on hybrid Infrastructure</a:t>
             </a:r>
             <a:endParaRPr lang="en-US" dirty="0"/>
           </a:p>
         </p:txBody>
       </p:sp>
-      <p:pic>
-        <p:nvPicPr>
-          <p:cNvPr id="6" name="Content Placeholder 5" descr="aws-ec2-security-group-what-is-evaluated.pdf"/>
-          <p:cNvPicPr>
-            <a:picLocks noGrp="1" noChangeAspect="1"/>
-          </p:cNvPicPr>
-          <p:nvPr>
-            <p:ph idx="1"/>
-          </p:nvPr>
-        </p:nvPicPr>
-        <p:blipFill>
-          <a:blip r:embed="rId3">
-            <a:extLst>
-              <a:ext uri="{28A0092B-C50C-407E-A947-70E740481C1C}">
-                <a14:useLocalDpi xmlns:a14="http://schemas.microsoft.com/office/drawing/2010/main" val="0"/>
-              </a:ext>
-            </a:extLst>
-          </a:blip>
-          <a:srcRect l="-10411" r="-10411"/>
-          <a:stretch>
-            <a:fillRect/>
-          </a:stretch>
-        </p:blipFill>
-        <p:spPr>
-          <a:xfrm>
-            <a:off x="19847" y="2357508"/>
-            <a:ext cx="9124154" cy="4249901"/>
-          </a:xfrm>
-        </p:spPr>
-      </p:pic>
     </p:spTree>
     <p:extLst>
       <p:ext uri="{BB962C8B-B14F-4D97-AF65-F5344CB8AC3E}">
-        <p14:creationId xmlns:p14="http://schemas.microsoft.com/office/powerpoint/2010/main" val="1664482785"/>
+        <p14:creationId xmlns:p14="http://schemas.microsoft.com/office/powerpoint/2010/main" val="1209400510"/>
       </p:ext>
     </p:extLst>
   </p:cSld>
@@ -17557,182 +17724,31 @@
         <p:spPr/>
         <p:txBody>
           <a:bodyPr>
-            <a:normAutofit fontScale="85000" lnSpcReduction="20000"/>
+            <a:normAutofit/>
           </a:bodyPr>
           <a:lstStyle/>
           <a:p>
             <a:r>
-              <a:rPr lang="en-US" dirty="0" smtClean="0">
-                <a:solidFill>
-                  <a:srgbClr val="008000"/>
-                </a:solidFill>
-              </a:rPr>
-              <a:t>Reference other Security Groups in Security Groups:</a:t>
-            </a:r>
-            <a:endParaRPr lang="en-US" dirty="0">
-              <a:solidFill>
-                <a:srgbClr val="008000"/>
-              </a:solidFill>
-            </a:endParaRPr>
-          </a:p>
-          <a:p>
-            <a:pPr lvl="1"/>
-            <a:r>
               <a:rPr lang="en-US" dirty="0" smtClean="0"/>
-              <a:t>Inbound: gateway-servers-</a:t>
-            </a:r>
-            <a:r>
-              <a:rPr lang="en-US" dirty="0" err="1" smtClean="0"/>
-              <a:t>sg</a:t>
-            </a:r>
+              <a:t>Can Developers use pre-built images or user data from an Operations department to run code on “similar to production servers”?</a:t>
+            </a:r>
+          </a:p>
+          <a:p>
             <a:r>
               <a:rPr lang="en-US" dirty="0" smtClean="0"/>
-              <a:t>, </a:t>
-            </a:r>
-            <a:r>
-              <a:rPr lang="en-US" dirty="0" err="1" smtClean="0"/>
-              <a:t>tcp</a:t>
-            </a:r>
+              <a:t>Are AMIs or User-Data a better fit for an organization?</a:t>
+            </a:r>
+          </a:p>
+          <a:p>
             <a:r>
               <a:rPr lang="en-US" dirty="0" smtClean="0"/>
-              <a:t> port 22</a:t>
-            </a:r>
-          </a:p>
-          <a:p>
-            <a:r>
-              <a:rPr lang="en-US" dirty="0" smtClean="0">
-                <a:solidFill>
-                  <a:srgbClr val="008000"/>
-                </a:solidFill>
-              </a:rPr>
-              <a:t>Create </a:t>
-            </a:r>
-            <a:r>
-              <a:rPr lang="en-US" dirty="0">
-                <a:solidFill>
-                  <a:srgbClr val="008000"/>
-                </a:solidFill>
-              </a:rPr>
-              <a:t>a “Base” Group for sweeping changes</a:t>
-            </a:r>
-          </a:p>
-          <a:p>
-            <a:r>
-              <a:rPr lang="en-US" dirty="0" smtClean="0">
-                <a:solidFill>
-                  <a:srgbClr val="008000"/>
-                </a:solidFill>
-              </a:rPr>
-              <a:t>Create one Security Group per Application and Environment (example: web-prod01)</a:t>
-            </a:r>
-          </a:p>
-          <a:p>
-            <a:r>
-              <a:rPr lang="en-US" dirty="0" smtClean="0">
-                <a:solidFill>
-                  <a:srgbClr val="008000"/>
-                </a:solidFill>
-              </a:rPr>
-              <a:t>Automate the Creation of Security Groups</a:t>
-            </a:r>
-          </a:p>
-          <a:p>
-            <a:r>
-              <a:rPr lang="en-US" dirty="0" smtClean="0">
-                <a:solidFill>
-                  <a:srgbClr val="008000"/>
-                </a:solidFill>
-              </a:rPr>
-              <a:t>Use multiple Security </a:t>
-            </a:r>
-            <a:r>
-              <a:rPr lang="en-US" dirty="0">
-                <a:solidFill>
-                  <a:srgbClr val="008000"/>
-                </a:solidFill>
-              </a:rPr>
-              <a:t>G</a:t>
-            </a:r>
-            <a:r>
-              <a:rPr lang="en-US" dirty="0" smtClean="0">
-                <a:solidFill>
-                  <a:srgbClr val="008000"/>
-                </a:solidFill>
-              </a:rPr>
-              <a:t>roups for Instances</a:t>
-            </a:r>
-          </a:p>
-          <a:p>
-            <a:r>
-              <a:rPr lang="en-US" dirty="0" smtClean="0">
-                <a:solidFill>
-                  <a:srgbClr val="008000"/>
-                </a:solidFill>
-              </a:rPr>
-              <a:t>Allow only ELB traffic in for Web Servers</a:t>
-            </a:r>
-          </a:p>
-          <a:p>
-            <a:r>
-              <a:rPr lang="en-US" dirty="0" smtClean="0">
-                <a:solidFill>
-                  <a:srgbClr val="FF0000"/>
-                </a:solidFill>
-              </a:rPr>
-              <a:t>Do </a:t>
-            </a:r>
-            <a:r>
-              <a:rPr lang="en-US" dirty="0">
-                <a:solidFill>
-                  <a:srgbClr val="FF0000"/>
-                </a:solidFill>
-              </a:rPr>
-              <a:t>not use IP addresses for </a:t>
-            </a:r>
-            <a:r>
-              <a:rPr lang="en-US" dirty="0" smtClean="0">
-                <a:solidFill>
-                  <a:srgbClr val="FF0000"/>
-                </a:solidFill>
-              </a:rPr>
-              <a:t>Rules</a:t>
-            </a:r>
-          </a:p>
-          <a:p>
-            <a:r>
-              <a:rPr lang="en-US" dirty="0" smtClean="0">
-                <a:solidFill>
-                  <a:srgbClr val="FF0000"/>
-                </a:solidFill>
-              </a:rPr>
-              <a:t>Do not rely on Security Group Names</a:t>
-            </a:r>
-          </a:p>
-          <a:p>
-            <a:r>
-              <a:rPr lang="en-US" dirty="0" smtClean="0">
-                <a:solidFill>
-                  <a:srgbClr val="FF0000"/>
-                </a:solidFill>
-              </a:rPr>
-              <a:t>Do not “share” Security </a:t>
-            </a:r>
-            <a:r>
-              <a:rPr lang="en-US" dirty="0">
-                <a:solidFill>
-                  <a:srgbClr val="FF0000"/>
-                </a:solidFill>
-              </a:rPr>
-              <a:t>G</a:t>
-            </a:r>
-            <a:r>
-              <a:rPr lang="en-US" dirty="0" smtClean="0">
-                <a:solidFill>
-                  <a:srgbClr val="FF0000"/>
-                </a:solidFill>
-              </a:rPr>
-              <a:t>roups between resources</a:t>
-            </a:r>
+              <a:t>How does the performance of existing applications vary when running on physical versus </a:t>
+            </a:r>
+            <a:r>
+              <a:rPr lang="en-US" smtClean="0"/>
+              <a:t>virtual hardware?</a:t>
+            </a:r>
+            <a:endParaRPr lang="en-US" dirty="0" smtClean="0"/>
           </a:p>
         </p:txBody>
       </p:sp>
@@ -17753,7 +17769,7 @@
           <a:p>
             <a:r>
               <a:rPr lang="en-US" dirty="0" smtClean="0"/>
-              <a:t>Security Groups: Best Practices</a:t>
+              <a:t>EC2: What Next?</a:t>
             </a:r>
             <a:endParaRPr lang="en-US" dirty="0"/>
           </a:p>
@@ -17762,7 +17778,7 @@
     </p:spTree>
     <p:extLst>
       <p:ext uri="{BB962C8B-B14F-4D97-AF65-F5344CB8AC3E}">
-        <p14:creationId xmlns:p14="http://schemas.microsoft.com/office/powerpoint/2010/main" val="1057597965"/>
+        <p14:creationId xmlns:p14="http://schemas.microsoft.com/office/powerpoint/2010/main" val="2148188877"/>
       </p:ext>
     </p:extLst>
   </p:cSld>
@@ -17813,68 +17829,99 @@
           </a:bodyPr>
           <a:lstStyle/>
           <a:p>
-            <a:pPr marL="0" indent="0">
-              <a:buNone/>
-            </a:pPr>
-            <a:r>
-              <a:rPr lang="en-US" dirty="0" smtClean="0"/>
-              <a:t>EC2 Instances are:</a:t>
-            </a:r>
-            <a:endParaRPr lang="en-US" i="1" dirty="0" smtClean="0"/>
-          </a:p>
-          <a:p>
-            <a:r>
-              <a:rPr lang="en-US" dirty="0" smtClean="0"/>
-              <a:t>Classified by Type</a:t>
-            </a:r>
-          </a:p>
-          <a:p>
-            <a:r>
-              <a:rPr lang="en-US" dirty="0" smtClean="0"/>
-              <a:t>Cost: on-demand, reserved or spot</a:t>
-            </a:r>
-          </a:p>
-          <a:p>
-            <a:r>
-              <a:rPr lang="en-US" dirty="0" smtClean="0"/>
-              <a:t>Built on an AMI, typically Linux or Windows</a:t>
-            </a:r>
-          </a:p>
-          <a:p>
-            <a:pPr lvl="1"/>
-            <a:r>
-              <a:rPr lang="en-US" dirty="0" smtClean="0"/>
-              <a:t>AMI can be Public, Paid (Marketplace) or Private</a:t>
-            </a:r>
-          </a:p>
-          <a:p>
-            <a:r>
-              <a:rPr lang="en-US" dirty="0" smtClean="0"/>
-              <a:t>Backed by either EBS or Instance Store</a:t>
-            </a:r>
-          </a:p>
-          <a:p>
-            <a:r>
-              <a:rPr lang="en-US" dirty="0" smtClean="0"/>
-              <a:t>Bootstrapped using user-data</a:t>
-            </a:r>
-          </a:p>
-          <a:p>
-            <a:r>
-              <a:rPr lang="en-US" dirty="0" smtClean="0"/>
-              <a:t>On shared infrastructure, unless </a:t>
-            </a:r>
-            <a:r>
-              <a:rPr lang="en-US" i="1" dirty="0" smtClean="0"/>
-              <a:t>Dedicated Tenancy in VPC </a:t>
-            </a:r>
-            <a:r>
-              <a:rPr lang="en-US" dirty="0" smtClean="0"/>
-              <a:t>is Requested</a:t>
-            </a:r>
-          </a:p>
-          <a:p>
-            <a:endParaRPr lang="en-US" dirty="0" smtClean="0"/>
+            <a:r>
+              <a:rPr lang="en-US" dirty="0" smtClean="0">
+                <a:solidFill>
+                  <a:srgbClr val="008000"/>
+                </a:solidFill>
+              </a:rPr>
+              <a:t>build redundant EC2 servers across Availability Zones</a:t>
+            </a:r>
+          </a:p>
+          <a:p>
+            <a:r>
+              <a:rPr lang="en-US" dirty="0">
+                <a:solidFill>
+                  <a:srgbClr val="008000"/>
+                </a:solidFill>
+              </a:rPr>
+              <a:t>use </a:t>
+            </a:r>
+            <a:r>
+              <a:rPr lang="en-US" dirty="0" smtClean="0">
+                <a:solidFill>
+                  <a:srgbClr val="008000"/>
+                </a:solidFill>
+              </a:rPr>
+              <a:t>Tags to identify and select instances</a:t>
+            </a:r>
+          </a:p>
+          <a:p>
+            <a:r>
+              <a:rPr lang="en-US" dirty="0" smtClean="0">
+                <a:solidFill>
+                  <a:srgbClr val="008000"/>
+                </a:solidFill>
+              </a:rPr>
+              <a:t>use same configuration management in EC2 as in Vagrant or other cloud providers</a:t>
+            </a:r>
+          </a:p>
+          <a:p>
+            <a:r>
+              <a:rPr lang="en-US" dirty="0" smtClean="0">
+                <a:solidFill>
+                  <a:srgbClr val="008000"/>
+                </a:solidFill>
+              </a:rPr>
+              <a:t>Test Performance using different Instance Types</a:t>
+            </a:r>
+          </a:p>
+          <a:p>
+            <a:r>
+              <a:rPr lang="en-US" dirty="0" smtClean="0">
+                <a:solidFill>
+                  <a:srgbClr val="008000"/>
+                </a:solidFill>
+              </a:rPr>
+              <a:t>use HVM Virtualization Type</a:t>
+            </a:r>
+          </a:p>
+          <a:p>
+            <a:r>
+              <a:rPr lang="en-US" dirty="0" smtClean="0">
+                <a:solidFill>
+                  <a:srgbClr val="000000"/>
+                </a:solidFill>
+              </a:rPr>
+              <a:t>Use IAM Roles, if AWS lock-in not a concern</a:t>
+            </a:r>
+          </a:p>
+          <a:p>
+            <a:r>
+              <a:rPr lang="en-US" dirty="0" smtClean="0">
+                <a:solidFill>
+                  <a:srgbClr val="FF0000"/>
+                </a:solidFill>
+              </a:rPr>
+              <a:t>Do not build instances “by hand”</a:t>
+            </a:r>
+          </a:p>
+          <a:p>
+            <a:r>
+              <a:rPr lang="en-US" dirty="0" smtClean="0">
+                <a:solidFill>
+                  <a:srgbClr val="FF0000"/>
+                </a:solidFill>
+              </a:rPr>
+              <a:t>Do not store data on EC2 Instances</a:t>
+            </a:r>
+          </a:p>
+          <a:p>
+            <a:endParaRPr lang="en-US" dirty="0" smtClean="0">
+              <a:solidFill>
+                <a:srgbClr val="FF0000"/>
+              </a:solidFill>
+            </a:endParaRPr>
           </a:p>
         </p:txBody>
       </p:sp>
@@ -17895,7 +17942,7 @@
           <a:p>
             <a:r>
               <a:rPr lang="en-US" dirty="0" smtClean="0"/>
-              <a:t>EC2: Introduction</a:t>
+              <a:t>EC2: Best Practices</a:t>
             </a:r>
             <a:endParaRPr lang="en-US" dirty="0"/>
           </a:p>
@@ -17904,7 +17951,7 @@
     </p:spTree>
     <p:extLst>
       <p:ext uri="{BB962C8B-B14F-4D97-AF65-F5344CB8AC3E}">
-        <p14:creationId xmlns:p14="http://schemas.microsoft.com/office/powerpoint/2010/main" val="1683326622"/>
+        <p14:creationId xmlns:p14="http://schemas.microsoft.com/office/powerpoint/2010/main" val="1232898389"/>
       </p:ext>
     </p:extLst>
   </p:cSld>
@@ -17940,6 +17987,67 @@
       </p:grpSpPr>
       <p:sp>
         <p:nvSpPr>
+          <p:cNvPr id="3" name="Content Placeholder 2"/>
+          <p:cNvSpPr>
+            <a:spLocks noGrp="1"/>
+          </p:cNvSpPr>
+          <p:nvPr>
+            <p:ph idx="1"/>
+          </p:nvPr>
+        </p:nvSpPr>
+        <p:spPr/>
+        <p:txBody>
+          <a:bodyPr>
+            <a:normAutofit/>
+          </a:bodyPr>
+          <a:lstStyle/>
+          <a:p>
+            <a:r>
+              <a:rPr lang="en-US" dirty="0" smtClean="0"/>
+              <a:t>Security Groups are Region-Specific</a:t>
+            </a:r>
+          </a:p>
+          <a:p>
+            <a:r>
+              <a:rPr lang="en-US" dirty="0" smtClean="0"/>
+              <a:t>Security Groups are the </a:t>
+            </a:r>
+            <a:r>
+              <a:rPr lang="en-US" i="1" dirty="0" smtClean="0"/>
+              <a:t>near</a:t>
+            </a:r>
+            <a:r>
+              <a:rPr lang="en-US" dirty="0" smtClean="0"/>
+              <a:t> equivalent of a </a:t>
+            </a:r>
+            <a:r>
+              <a:rPr lang="en-US" dirty="0" err="1" smtClean="0"/>
+              <a:t>stateful</a:t>
+            </a:r>
+            <a:r>
+              <a:rPr lang="en-US" dirty="0" smtClean="0"/>
+              <a:t> Firewall</a:t>
+            </a:r>
+          </a:p>
+          <a:p>
+            <a:r>
+              <a:rPr lang="en-US" dirty="0" smtClean="0"/>
+              <a:t>Security Groups are applied to EC2 resources, as well as RDS, </a:t>
+            </a:r>
+            <a:r>
+              <a:rPr lang="en-US" dirty="0" err="1" smtClean="0"/>
+              <a:t>ElastiCache</a:t>
+            </a:r>
+            <a:r>
+              <a:rPr lang="en-US" dirty="0" smtClean="0"/>
+              <a:t> and potentially other resources</a:t>
+            </a:r>
+            <a:endParaRPr lang="en-US" i="1" dirty="0" smtClean="0"/>
+          </a:p>
+        </p:txBody>
+      </p:sp>
+      <p:sp>
+        <p:nvSpPr>
           <p:cNvPr id="2" name="Title 1"/>
           <p:cNvSpPr>
             <a:spLocks noGrp="1"/>
@@ -17955,115 +18063,7 @@
           <a:p>
             <a:r>
               <a:rPr lang="en-US" dirty="0" smtClean="0"/>
-              <a:t>EC2: Benefits and Challenges</a:t>
-            </a:r>
-            <a:endParaRPr lang="en-US" dirty="0"/>
-          </a:p>
-        </p:txBody>
-      </p:sp>
-      <p:sp>
-        <p:nvSpPr>
-          <p:cNvPr id="3" name="Content Placeholder 2"/>
-          <p:cNvSpPr>
-            <a:spLocks noGrp="1"/>
-          </p:cNvSpPr>
-          <p:nvPr>
-            <p:ph sz="quarter" idx="13"/>
-          </p:nvPr>
-        </p:nvSpPr>
-        <p:spPr/>
-        <p:txBody>
-          <a:bodyPr>
-            <a:normAutofit/>
-          </a:bodyPr>
-          <a:lstStyle/>
-          <a:p>
-            <a:pPr marL="0" indent="0">
-              <a:buNone/>
-            </a:pPr>
-            <a:r>
-              <a:rPr lang="en-US" dirty="0" smtClean="0"/>
-              <a:t>Benefits:</a:t>
-            </a:r>
-          </a:p>
-          <a:p>
-            <a:r>
-              <a:rPr lang="en-US" dirty="0" smtClean="0"/>
-              <a:t>Provisioned in Minutes</a:t>
-            </a:r>
-          </a:p>
-          <a:p>
-            <a:r>
-              <a:rPr lang="en-US" dirty="0" smtClean="0"/>
-              <a:t>Resize Easily</a:t>
-            </a:r>
-          </a:p>
-          <a:p>
-            <a:r>
-              <a:rPr lang="en-US" dirty="0" smtClean="0"/>
-              <a:t>Variety of pre-built images</a:t>
-            </a:r>
-          </a:p>
-          <a:p>
-            <a:r>
-              <a:rPr lang="en-US" dirty="0" smtClean="0"/>
-              <a:t>Pay as you Go</a:t>
-            </a:r>
-          </a:p>
-          <a:p>
-            <a:r>
-              <a:rPr lang="en-US" dirty="0" smtClean="0"/>
-              <a:t>Provisioned through API</a:t>
-            </a:r>
-          </a:p>
-        </p:txBody>
-      </p:sp>
-      <p:sp>
-        <p:nvSpPr>
-          <p:cNvPr id="4" name="Content Placeholder 3"/>
-          <p:cNvSpPr>
-            <a:spLocks noGrp="1"/>
-          </p:cNvSpPr>
-          <p:nvPr>
-            <p:ph sz="quarter" idx="14"/>
-          </p:nvPr>
-        </p:nvSpPr>
-        <p:spPr/>
-        <p:txBody>
-          <a:bodyPr/>
-          <a:lstStyle/>
-          <a:p>
-            <a:r>
-              <a:rPr lang="en-US" dirty="0" smtClean="0"/>
-              <a:t>Challenges</a:t>
-            </a:r>
-          </a:p>
-          <a:p>
-            <a:pPr lvl="1"/>
-            <a:r>
-              <a:rPr lang="en-US" dirty="0" smtClean="0"/>
-              <a:t>Single Availability Zone</a:t>
-            </a:r>
-          </a:p>
-          <a:p>
-            <a:pPr lvl="1"/>
-            <a:r>
-              <a:rPr lang="en-US" dirty="0" smtClean="0"/>
-              <a:t>Right-size Instance Type may not be available</a:t>
-            </a:r>
-          </a:p>
-          <a:p>
-            <a:pPr lvl="1"/>
-            <a:r>
-              <a:rPr lang="en-US" dirty="0" smtClean="0"/>
-              <a:t>Reporting of disk usage and memory not available by default</a:t>
-            </a:r>
-          </a:p>
-          <a:p>
-            <a:pPr lvl="1"/>
-            <a:r>
-              <a:rPr lang="en-US" dirty="0" smtClean="0"/>
-              <a:t>Performance</a:t>
+              <a:t>Security Groups: Introduction</a:t>
             </a:r>
             <a:endParaRPr lang="en-US" dirty="0"/>
           </a:p>
@@ -18072,7 +18072,7 @@
     </p:spTree>
     <p:extLst>
       <p:ext uri="{BB962C8B-B14F-4D97-AF65-F5344CB8AC3E}">
-        <p14:creationId xmlns:p14="http://schemas.microsoft.com/office/powerpoint/2010/main" val="4257900755"/>
+        <p14:creationId xmlns:p14="http://schemas.microsoft.com/office/powerpoint/2010/main" val="3122286205"/>
       </p:ext>
     </p:extLst>
   </p:cSld>

</xml_diff>